<commit_message>
nueva pestaña con las asignaciones de teclas y act. doc
</commit_message>
<xml_diff>
--- a/DOC/Esquema.pptx
+++ b/DOC/Esquema.pptx
@@ -4,8 +4,12 @@
   <p:sldMasterIdLst>
     <p:sldMasterId id="2147483648" r:id="rId1"/>
   </p:sldMasterIdLst>
+  <p:notesMasterIdLst>
+    <p:notesMasterId r:id="rId4"/>
+  </p:notesMasterIdLst>
   <p:sldIdLst>
     <p:sldId id="256" r:id="rId2"/>
+    <p:sldId id="257" r:id="rId3"/>
   </p:sldIdLst>
   <p:sldSz cx="12192000" cy="6858000"/>
   <p:notesSz cx="6858000" cy="9144000"/>
@@ -104,7 +108,445 @@
       </a:defRPr>
     </a:lvl9pPr>
   </p:defaultTextStyle>
+  <p:extLst>
+    <p:ext uri="{EFAFB233-063F-42B5-8137-9DF3F51BA10A}">
+      <p15:sldGuideLst xmlns:p15="http://schemas.microsoft.com/office/powerpoint/2012/main"/>
+    </p:ext>
+  </p:extLst>
 </p:presentation>
+</file>
+
+<file path=ppt/notesMasters/notesMaster1.xml><?xml version="1.0" encoding="utf-8"?>
+<p:notesMaster xmlns:a="http://schemas.openxmlformats.org/drawingml/2006/main" xmlns:r="http://schemas.openxmlformats.org/officeDocument/2006/relationships" xmlns:p="http://schemas.openxmlformats.org/presentationml/2006/main">
+  <p:cSld>
+    <p:bg>
+      <p:bgRef idx="1001">
+        <a:schemeClr val="bg1"/>
+      </p:bgRef>
+    </p:bg>
+    <p:spTree>
+      <p:nvGrpSpPr>
+        <p:cNvPr id="1" name=""/>
+        <p:cNvGrpSpPr/>
+        <p:nvPr/>
+      </p:nvGrpSpPr>
+      <p:grpSpPr>
+        <a:xfrm>
+          <a:off x="0" y="0"/>
+          <a:ext cx="0" cy="0"/>
+          <a:chOff x="0" y="0"/>
+          <a:chExt cx="0" cy="0"/>
+        </a:xfrm>
+      </p:grpSpPr>
+      <p:sp>
+        <p:nvSpPr>
+          <p:cNvPr id="2" name="Marcador de encabezado 1"/>
+          <p:cNvSpPr>
+            <a:spLocks noGrp="1"/>
+          </p:cNvSpPr>
+          <p:nvPr>
+            <p:ph type="hdr" sz="quarter"/>
+          </p:nvPr>
+        </p:nvSpPr>
+        <p:spPr>
+          <a:xfrm>
+            <a:off x="0" y="0"/>
+            <a:ext cx="2971800" cy="458788"/>
+          </a:xfrm>
+          <a:prstGeom prst="rect">
+            <a:avLst/>
+          </a:prstGeom>
+        </p:spPr>
+        <p:txBody>
+          <a:bodyPr vert="horz" lIns="91440" tIns="45720" rIns="91440" bIns="45720" rtlCol="0"/>
+          <a:lstStyle>
+            <a:lvl1pPr algn="l">
+              <a:defRPr sz="1200"/>
+            </a:lvl1pPr>
+          </a:lstStyle>
+          <a:p>
+            <a:endParaRPr lang="es-ES"/>
+          </a:p>
+        </p:txBody>
+      </p:sp>
+      <p:sp>
+        <p:nvSpPr>
+          <p:cNvPr id="3" name="Marcador de fecha 2"/>
+          <p:cNvSpPr>
+            <a:spLocks noGrp="1"/>
+          </p:cNvSpPr>
+          <p:nvPr>
+            <p:ph type="dt" idx="1"/>
+          </p:nvPr>
+        </p:nvSpPr>
+        <p:spPr>
+          <a:xfrm>
+            <a:off x="3884613" y="0"/>
+            <a:ext cx="2971800" cy="458788"/>
+          </a:xfrm>
+          <a:prstGeom prst="rect">
+            <a:avLst/>
+          </a:prstGeom>
+        </p:spPr>
+        <p:txBody>
+          <a:bodyPr vert="horz" lIns="91440" tIns="45720" rIns="91440" bIns="45720" rtlCol="0"/>
+          <a:lstStyle>
+            <a:lvl1pPr algn="r">
+              <a:defRPr sz="1200"/>
+            </a:lvl1pPr>
+          </a:lstStyle>
+          <a:p>
+            <a:fld id="{A7B985E7-405D-41BF-9F4C-FB894C0ED85B}" type="datetimeFigureOut">
+              <a:rPr lang="es-ES" smtClean="0"/>
+              <a:t>24/12/2022</a:t>
+            </a:fld>
+            <a:endParaRPr lang="es-ES"/>
+          </a:p>
+        </p:txBody>
+      </p:sp>
+      <p:sp>
+        <p:nvSpPr>
+          <p:cNvPr id="4" name="Marcador de imagen de diapositiva 3"/>
+          <p:cNvSpPr>
+            <a:spLocks noGrp="1" noRot="1" noChangeAspect="1"/>
+          </p:cNvSpPr>
+          <p:nvPr>
+            <p:ph type="sldImg" idx="2"/>
+          </p:nvPr>
+        </p:nvSpPr>
+        <p:spPr>
+          <a:xfrm>
+            <a:off x="685800" y="1143000"/>
+            <a:ext cx="5486400" cy="3086100"/>
+          </a:xfrm>
+          <a:prstGeom prst="rect">
+            <a:avLst/>
+          </a:prstGeom>
+          <a:noFill/>
+          <a:ln w="12700">
+            <a:solidFill>
+              <a:prstClr val="black"/>
+            </a:solidFill>
+          </a:ln>
+        </p:spPr>
+        <p:txBody>
+          <a:bodyPr vert="horz" lIns="91440" tIns="45720" rIns="91440" bIns="45720" rtlCol="0" anchor="ctr"/>
+          <a:lstStyle/>
+          <a:p>
+            <a:endParaRPr lang="es-ES"/>
+          </a:p>
+        </p:txBody>
+      </p:sp>
+      <p:sp>
+        <p:nvSpPr>
+          <p:cNvPr id="5" name="Marcador de notas 4"/>
+          <p:cNvSpPr>
+            <a:spLocks noGrp="1"/>
+          </p:cNvSpPr>
+          <p:nvPr>
+            <p:ph type="body" sz="quarter" idx="3"/>
+          </p:nvPr>
+        </p:nvSpPr>
+        <p:spPr>
+          <a:xfrm>
+            <a:off x="685800" y="4400550"/>
+            <a:ext cx="5486400" cy="3600450"/>
+          </a:xfrm>
+          <a:prstGeom prst="rect">
+            <a:avLst/>
+          </a:prstGeom>
+        </p:spPr>
+        <p:txBody>
+          <a:bodyPr vert="horz" lIns="91440" tIns="45720" rIns="91440" bIns="45720" rtlCol="0"/>
+          <a:lstStyle/>
+          <a:p>
+            <a:pPr lvl="0"/>
+            <a:r>
+              <a:rPr lang="es-ES"/>
+              <a:t>Haga clic para modificar los estilos de texto del patrón</a:t>
+            </a:r>
+          </a:p>
+          <a:p>
+            <a:pPr lvl="1"/>
+            <a:r>
+              <a:rPr lang="es-ES"/>
+              <a:t>Segundo nivel</a:t>
+            </a:r>
+          </a:p>
+          <a:p>
+            <a:pPr lvl="2"/>
+            <a:r>
+              <a:rPr lang="es-ES"/>
+              <a:t>Tercer nivel</a:t>
+            </a:r>
+          </a:p>
+          <a:p>
+            <a:pPr lvl="3"/>
+            <a:r>
+              <a:rPr lang="es-ES"/>
+              <a:t>Cuarto nivel</a:t>
+            </a:r>
+          </a:p>
+          <a:p>
+            <a:pPr lvl="4"/>
+            <a:r>
+              <a:rPr lang="es-ES"/>
+              <a:t>Quinto nivel</a:t>
+            </a:r>
+          </a:p>
+        </p:txBody>
+      </p:sp>
+      <p:sp>
+        <p:nvSpPr>
+          <p:cNvPr id="6" name="Marcador de pie de página 5"/>
+          <p:cNvSpPr>
+            <a:spLocks noGrp="1"/>
+          </p:cNvSpPr>
+          <p:nvPr>
+            <p:ph type="ftr" sz="quarter" idx="4"/>
+          </p:nvPr>
+        </p:nvSpPr>
+        <p:spPr>
+          <a:xfrm>
+            <a:off x="0" y="8685213"/>
+            <a:ext cx="2971800" cy="458787"/>
+          </a:xfrm>
+          <a:prstGeom prst="rect">
+            <a:avLst/>
+          </a:prstGeom>
+        </p:spPr>
+        <p:txBody>
+          <a:bodyPr vert="horz" lIns="91440" tIns="45720" rIns="91440" bIns="45720" rtlCol="0" anchor="b"/>
+          <a:lstStyle>
+            <a:lvl1pPr algn="l">
+              <a:defRPr sz="1200"/>
+            </a:lvl1pPr>
+          </a:lstStyle>
+          <a:p>
+            <a:endParaRPr lang="es-ES"/>
+          </a:p>
+        </p:txBody>
+      </p:sp>
+      <p:sp>
+        <p:nvSpPr>
+          <p:cNvPr id="7" name="Marcador de número de diapositiva 6"/>
+          <p:cNvSpPr>
+            <a:spLocks noGrp="1"/>
+          </p:cNvSpPr>
+          <p:nvPr>
+            <p:ph type="sldNum" sz="quarter" idx="5"/>
+          </p:nvPr>
+        </p:nvSpPr>
+        <p:spPr>
+          <a:xfrm>
+            <a:off x="3884613" y="8685213"/>
+            <a:ext cx="2971800" cy="458787"/>
+          </a:xfrm>
+          <a:prstGeom prst="rect">
+            <a:avLst/>
+          </a:prstGeom>
+        </p:spPr>
+        <p:txBody>
+          <a:bodyPr vert="horz" lIns="91440" tIns="45720" rIns="91440" bIns="45720" rtlCol="0" anchor="b"/>
+          <a:lstStyle>
+            <a:lvl1pPr algn="r">
+              <a:defRPr sz="1200"/>
+            </a:lvl1pPr>
+          </a:lstStyle>
+          <a:p>
+            <a:fld id="{183A5C34-54E5-41EE-A8DA-4D599ACEFC63}" type="slidenum">
+              <a:rPr lang="es-ES" smtClean="0"/>
+              <a:t>‹Nº›</a:t>
+            </a:fld>
+            <a:endParaRPr lang="es-ES"/>
+          </a:p>
+        </p:txBody>
+      </p:sp>
+    </p:spTree>
+    <p:extLst>
+      <p:ext uri="{BB962C8B-B14F-4D97-AF65-F5344CB8AC3E}">
+        <p14:creationId xmlns:p14="http://schemas.microsoft.com/office/powerpoint/2010/main" val="2756857904"/>
+      </p:ext>
+    </p:extLst>
+  </p:cSld>
+  <p:clrMap bg1="lt1" tx1="dk1" bg2="lt2" tx2="dk2" accent1="accent1" accent2="accent2" accent3="accent3" accent4="accent4" accent5="accent5" accent6="accent6" hlink="hlink" folHlink="folHlink"/>
+  <p:notesStyle>
+    <a:lvl1pPr marL="0" algn="l" defTabSz="914400" rtl="0" eaLnBrk="1" latinLnBrk="0" hangingPunct="1">
+      <a:defRPr sz="1200" kern="1200">
+        <a:solidFill>
+          <a:schemeClr val="tx1"/>
+        </a:solidFill>
+        <a:latin typeface="+mn-lt"/>
+        <a:ea typeface="+mn-ea"/>
+        <a:cs typeface="+mn-cs"/>
+      </a:defRPr>
+    </a:lvl1pPr>
+    <a:lvl2pPr marL="457200" algn="l" defTabSz="914400" rtl="0" eaLnBrk="1" latinLnBrk="0" hangingPunct="1">
+      <a:defRPr sz="1200" kern="1200">
+        <a:solidFill>
+          <a:schemeClr val="tx1"/>
+        </a:solidFill>
+        <a:latin typeface="+mn-lt"/>
+        <a:ea typeface="+mn-ea"/>
+        <a:cs typeface="+mn-cs"/>
+      </a:defRPr>
+    </a:lvl2pPr>
+    <a:lvl3pPr marL="914400" algn="l" defTabSz="914400" rtl="0" eaLnBrk="1" latinLnBrk="0" hangingPunct="1">
+      <a:defRPr sz="1200" kern="1200">
+        <a:solidFill>
+          <a:schemeClr val="tx1"/>
+        </a:solidFill>
+        <a:latin typeface="+mn-lt"/>
+        <a:ea typeface="+mn-ea"/>
+        <a:cs typeface="+mn-cs"/>
+      </a:defRPr>
+    </a:lvl3pPr>
+    <a:lvl4pPr marL="1371600" algn="l" defTabSz="914400" rtl="0" eaLnBrk="1" latinLnBrk="0" hangingPunct="1">
+      <a:defRPr sz="1200" kern="1200">
+        <a:solidFill>
+          <a:schemeClr val="tx1"/>
+        </a:solidFill>
+        <a:latin typeface="+mn-lt"/>
+        <a:ea typeface="+mn-ea"/>
+        <a:cs typeface="+mn-cs"/>
+      </a:defRPr>
+    </a:lvl4pPr>
+    <a:lvl5pPr marL="1828800" algn="l" defTabSz="914400" rtl="0" eaLnBrk="1" latinLnBrk="0" hangingPunct="1">
+      <a:defRPr sz="1200" kern="1200">
+        <a:solidFill>
+          <a:schemeClr val="tx1"/>
+        </a:solidFill>
+        <a:latin typeface="+mn-lt"/>
+        <a:ea typeface="+mn-ea"/>
+        <a:cs typeface="+mn-cs"/>
+      </a:defRPr>
+    </a:lvl5pPr>
+    <a:lvl6pPr marL="2286000" algn="l" defTabSz="914400" rtl="0" eaLnBrk="1" latinLnBrk="0" hangingPunct="1">
+      <a:defRPr sz="1200" kern="1200">
+        <a:solidFill>
+          <a:schemeClr val="tx1"/>
+        </a:solidFill>
+        <a:latin typeface="+mn-lt"/>
+        <a:ea typeface="+mn-ea"/>
+        <a:cs typeface="+mn-cs"/>
+      </a:defRPr>
+    </a:lvl6pPr>
+    <a:lvl7pPr marL="2743200" algn="l" defTabSz="914400" rtl="0" eaLnBrk="1" latinLnBrk="0" hangingPunct="1">
+      <a:defRPr sz="1200" kern="1200">
+        <a:solidFill>
+          <a:schemeClr val="tx1"/>
+        </a:solidFill>
+        <a:latin typeface="+mn-lt"/>
+        <a:ea typeface="+mn-ea"/>
+        <a:cs typeface="+mn-cs"/>
+      </a:defRPr>
+    </a:lvl7pPr>
+    <a:lvl8pPr marL="3200400" algn="l" defTabSz="914400" rtl="0" eaLnBrk="1" latinLnBrk="0" hangingPunct="1">
+      <a:defRPr sz="1200" kern="1200">
+        <a:solidFill>
+          <a:schemeClr val="tx1"/>
+        </a:solidFill>
+        <a:latin typeface="+mn-lt"/>
+        <a:ea typeface="+mn-ea"/>
+        <a:cs typeface="+mn-cs"/>
+      </a:defRPr>
+    </a:lvl8pPr>
+    <a:lvl9pPr marL="3657600" algn="l" defTabSz="914400" rtl="0" eaLnBrk="1" latinLnBrk="0" hangingPunct="1">
+      <a:defRPr sz="1200" kern="1200">
+        <a:solidFill>
+          <a:schemeClr val="tx1"/>
+        </a:solidFill>
+        <a:latin typeface="+mn-lt"/>
+        <a:ea typeface="+mn-ea"/>
+        <a:cs typeface="+mn-cs"/>
+      </a:defRPr>
+    </a:lvl9pPr>
+  </p:notesStyle>
+</p:notesMaster>
+</file>
+
+<file path=ppt/notesSlides/notesSlide1.xml><?xml version="1.0" encoding="utf-8"?>
+<p:notes xmlns:a="http://schemas.openxmlformats.org/drawingml/2006/main" xmlns:r="http://schemas.openxmlformats.org/officeDocument/2006/relationships" xmlns:p="http://schemas.openxmlformats.org/presentationml/2006/main">
+  <p:cSld>
+    <p:spTree>
+      <p:nvGrpSpPr>
+        <p:cNvPr id="1" name=""/>
+        <p:cNvGrpSpPr/>
+        <p:nvPr/>
+      </p:nvGrpSpPr>
+      <p:grpSpPr>
+        <a:xfrm>
+          <a:off x="0" y="0"/>
+          <a:ext cx="0" cy="0"/>
+          <a:chOff x="0" y="0"/>
+          <a:chExt cx="0" cy="0"/>
+        </a:xfrm>
+      </p:grpSpPr>
+      <p:sp>
+        <p:nvSpPr>
+          <p:cNvPr id="2" name="Marcador de imagen de diapositiva 1"/>
+          <p:cNvSpPr>
+            <a:spLocks noGrp="1" noRot="1" noChangeAspect="1"/>
+          </p:cNvSpPr>
+          <p:nvPr>
+            <p:ph type="sldImg"/>
+          </p:nvPr>
+        </p:nvSpPr>
+        <p:spPr/>
+      </p:sp>
+      <p:sp>
+        <p:nvSpPr>
+          <p:cNvPr id="3" name="Marcador de notas 2"/>
+          <p:cNvSpPr>
+            <a:spLocks noGrp="1"/>
+          </p:cNvSpPr>
+          <p:nvPr>
+            <p:ph type="body" idx="1"/>
+          </p:nvPr>
+        </p:nvSpPr>
+        <p:spPr/>
+        <p:txBody>
+          <a:bodyPr/>
+          <a:lstStyle/>
+          <a:p>
+            <a:endParaRPr lang="es-ES" dirty="0"/>
+          </a:p>
+        </p:txBody>
+      </p:sp>
+      <p:sp>
+        <p:nvSpPr>
+          <p:cNvPr id="4" name="Marcador de número de diapositiva 3"/>
+          <p:cNvSpPr>
+            <a:spLocks noGrp="1"/>
+          </p:cNvSpPr>
+          <p:nvPr>
+            <p:ph type="sldNum" sz="quarter" idx="5"/>
+          </p:nvPr>
+        </p:nvSpPr>
+        <p:spPr/>
+        <p:txBody>
+          <a:bodyPr/>
+          <a:lstStyle/>
+          <a:p>
+            <a:fld id="{183A5C34-54E5-41EE-A8DA-4D599ACEFC63}" type="slidenum">
+              <a:rPr lang="es-ES" smtClean="0"/>
+              <a:t>2</a:t>
+            </a:fld>
+            <a:endParaRPr lang="es-ES"/>
+          </a:p>
+        </p:txBody>
+      </p:sp>
+    </p:spTree>
+    <p:extLst>
+      <p:ext uri="{BB962C8B-B14F-4D97-AF65-F5344CB8AC3E}">
+        <p14:creationId xmlns:p14="http://schemas.microsoft.com/office/powerpoint/2010/main" val="2869662638"/>
+      </p:ext>
+    </p:extLst>
+  </p:cSld>
+  <p:clrMapOvr>
+    <a:masterClrMapping/>
+  </p:clrMapOvr>
+</p:notes>
 </file>
 
 <file path=ppt/slideLayouts/slideLayout1.xml><?xml version="1.0" encoding="utf-8"?>
@@ -254,7 +696,7 @@
           <a:p>
             <a:fld id="{39AD9A35-D595-4934-8AAA-9408787DB05C}" type="datetimeFigureOut">
               <a:rPr lang="es-ES" smtClean="0"/>
-              <a:t>23/12/2022</a:t>
+              <a:t>24/12/2022</a:t>
             </a:fld>
             <a:endParaRPr lang="es-ES"/>
           </a:p>
@@ -452,7 +894,7 @@
           <a:p>
             <a:fld id="{39AD9A35-D595-4934-8AAA-9408787DB05C}" type="datetimeFigureOut">
               <a:rPr lang="es-ES" smtClean="0"/>
-              <a:t>23/12/2022</a:t>
+              <a:t>24/12/2022</a:t>
             </a:fld>
             <a:endParaRPr lang="es-ES"/>
           </a:p>
@@ -660,7 +1102,7 @@
           <a:p>
             <a:fld id="{39AD9A35-D595-4934-8AAA-9408787DB05C}" type="datetimeFigureOut">
               <a:rPr lang="es-ES" smtClean="0"/>
-              <a:t>23/12/2022</a:t>
+              <a:t>24/12/2022</a:t>
             </a:fld>
             <a:endParaRPr lang="es-ES"/>
           </a:p>
@@ -858,7 +1300,7 @@
           <a:p>
             <a:fld id="{39AD9A35-D595-4934-8AAA-9408787DB05C}" type="datetimeFigureOut">
               <a:rPr lang="es-ES" smtClean="0"/>
-              <a:t>23/12/2022</a:t>
+              <a:t>24/12/2022</a:t>
             </a:fld>
             <a:endParaRPr lang="es-ES"/>
           </a:p>
@@ -1133,7 +1575,7 @@
           <a:p>
             <a:fld id="{39AD9A35-D595-4934-8AAA-9408787DB05C}" type="datetimeFigureOut">
               <a:rPr lang="es-ES" smtClean="0"/>
-              <a:t>23/12/2022</a:t>
+              <a:t>24/12/2022</a:t>
             </a:fld>
             <a:endParaRPr lang="es-ES"/>
           </a:p>
@@ -1398,7 +1840,7 @@
           <a:p>
             <a:fld id="{39AD9A35-D595-4934-8AAA-9408787DB05C}" type="datetimeFigureOut">
               <a:rPr lang="es-ES" smtClean="0"/>
-              <a:t>23/12/2022</a:t>
+              <a:t>24/12/2022</a:t>
             </a:fld>
             <a:endParaRPr lang="es-ES"/>
           </a:p>
@@ -1810,7 +2252,7 @@
           <a:p>
             <a:fld id="{39AD9A35-D595-4934-8AAA-9408787DB05C}" type="datetimeFigureOut">
               <a:rPr lang="es-ES" smtClean="0"/>
-              <a:t>23/12/2022</a:t>
+              <a:t>24/12/2022</a:t>
             </a:fld>
             <a:endParaRPr lang="es-ES"/>
           </a:p>
@@ -1951,7 +2393,7 @@
           <a:p>
             <a:fld id="{39AD9A35-D595-4934-8AAA-9408787DB05C}" type="datetimeFigureOut">
               <a:rPr lang="es-ES" smtClean="0"/>
-              <a:t>23/12/2022</a:t>
+              <a:t>24/12/2022</a:t>
             </a:fld>
             <a:endParaRPr lang="es-ES"/>
           </a:p>
@@ -2064,7 +2506,7 @@
           <a:p>
             <a:fld id="{39AD9A35-D595-4934-8AAA-9408787DB05C}" type="datetimeFigureOut">
               <a:rPr lang="es-ES" smtClean="0"/>
-              <a:t>23/12/2022</a:t>
+              <a:t>24/12/2022</a:t>
             </a:fld>
             <a:endParaRPr lang="es-ES"/>
           </a:p>
@@ -2375,7 +2817,7 @@
           <a:p>
             <a:fld id="{39AD9A35-D595-4934-8AAA-9408787DB05C}" type="datetimeFigureOut">
               <a:rPr lang="es-ES" smtClean="0"/>
-              <a:t>23/12/2022</a:t>
+              <a:t>24/12/2022</a:t>
             </a:fld>
             <a:endParaRPr lang="es-ES"/>
           </a:p>
@@ -2663,7 +3105,7 @@
           <a:p>
             <a:fld id="{39AD9A35-D595-4934-8AAA-9408787DB05C}" type="datetimeFigureOut">
               <a:rPr lang="es-ES" smtClean="0"/>
-              <a:t>23/12/2022</a:t>
+              <a:t>24/12/2022</a:t>
             </a:fld>
             <a:endParaRPr lang="es-ES"/>
           </a:p>
@@ -2904,7 +3346,7 @@
           <a:p>
             <a:fld id="{39AD9A35-D595-4934-8AAA-9408787DB05C}" type="datetimeFigureOut">
               <a:rPr lang="es-ES" smtClean="0"/>
-              <a:t>23/12/2022</a:t>
+              <a:t>24/12/2022</a:t>
             </a:fld>
             <a:endParaRPr lang="es-ES"/>
           </a:p>
@@ -3878,7 +4320,7 @@
         </p:blipFill>
         <p:spPr>
           <a:xfrm>
-            <a:off x="9814745" y="16542"/>
+            <a:off x="9286969" y="288933"/>
             <a:ext cx="1990694" cy="2075093"/>
           </a:xfrm>
           <a:prstGeom prst="rect">
@@ -6882,6 +7324,2638 @@
     <p:extLst>
       <p:ext uri="{BB962C8B-B14F-4D97-AF65-F5344CB8AC3E}">
         <p14:creationId xmlns:p14="http://schemas.microsoft.com/office/powerpoint/2010/main" val="583834966"/>
+      </p:ext>
+    </p:extLst>
+  </p:cSld>
+  <p:clrMapOvr>
+    <a:masterClrMapping/>
+  </p:clrMapOvr>
+</p:sld>
+</file>
+
+<file path=ppt/slides/slide2.xml><?xml version="1.0" encoding="utf-8"?>
+<p:sld xmlns:a="http://schemas.openxmlformats.org/drawingml/2006/main" xmlns:r="http://schemas.openxmlformats.org/officeDocument/2006/relationships" xmlns:p="http://schemas.openxmlformats.org/presentationml/2006/main">
+  <p:cSld>
+    <p:spTree>
+      <p:nvGrpSpPr>
+        <p:cNvPr id="1" name=""/>
+        <p:cNvGrpSpPr/>
+        <p:nvPr/>
+      </p:nvGrpSpPr>
+      <p:grpSpPr>
+        <a:xfrm>
+          <a:off x="0" y="0"/>
+          <a:ext cx="0" cy="0"/>
+          <a:chOff x="0" y="0"/>
+          <a:chExt cx="0" cy="0"/>
+        </a:xfrm>
+      </p:grpSpPr>
+      <p:graphicFrame>
+        <p:nvGraphicFramePr>
+          <p:cNvPr id="5" name="Tabla 4">
+            <a:extLst>
+              <a:ext uri="{FF2B5EF4-FFF2-40B4-BE49-F238E27FC236}">
+                <a16:creationId xmlns:a16="http://schemas.microsoft.com/office/drawing/2014/main" id="{CC546006-C893-CECC-3757-406643956FD2}"/>
+              </a:ext>
+            </a:extLst>
+          </p:cNvPr>
+          <p:cNvGraphicFramePr>
+            <a:graphicFrameLocks noGrp="1"/>
+          </p:cNvGraphicFramePr>
+          <p:nvPr>
+            <p:extLst>
+              <p:ext uri="{D42A27DB-BD31-4B8C-83A1-F6EECF244321}">
+                <p14:modId xmlns:p14="http://schemas.microsoft.com/office/powerpoint/2010/main" val="3492759816"/>
+              </p:ext>
+            </p:extLst>
+          </p:nvPr>
+        </p:nvGraphicFramePr>
+        <p:xfrm>
+          <a:off x="1307180" y="1775093"/>
+          <a:ext cx="6318739" cy="4726924"/>
+        </p:xfrm>
+        <a:graphic>
+          <a:graphicData uri="http://schemas.openxmlformats.org/drawingml/2006/table">
+            <a:tbl>
+              <a:tblPr firstRow="1" bandRow="1">
+                <a:tableStyleId>{5C22544A-7EE6-4342-B048-85BDC9FD1C3A}</a:tableStyleId>
+              </a:tblPr>
+              <a:tblGrid>
+                <a:gridCol w="1579685">
+                  <a:extLst>
+                    <a:ext uri="{9D8B030D-6E8A-4147-A177-3AD203B41FA5}">
+                      <a16:colId xmlns:a16="http://schemas.microsoft.com/office/drawing/2014/main" val="1839756769"/>
+                    </a:ext>
+                  </a:extLst>
+                </a:gridCol>
+                <a:gridCol w="1577259">
+                  <a:extLst>
+                    <a:ext uri="{9D8B030D-6E8A-4147-A177-3AD203B41FA5}">
+                      <a16:colId xmlns:a16="http://schemas.microsoft.com/office/drawing/2014/main" val="3629000199"/>
+                    </a:ext>
+                  </a:extLst>
+                </a:gridCol>
+                <a:gridCol w="1582110">
+                  <a:extLst>
+                    <a:ext uri="{9D8B030D-6E8A-4147-A177-3AD203B41FA5}">
+                      <a16:colId xmlns:a16="http://schemas.microsoft.com/office/drawing/2014/main" val="230538060"/>
+                    </a:ext>
+                  </a:extLst>
+                </a:gridCol>
+                <a:gridCol w="1579685">
+                  <a:extLst>
+                    <a:ext uri="{9D8B030D-6E8A-4147-A177-3AD203B41FA5}">
+                      <a16:colId xmlns:a16="http://schemas.microsoft.com/office/drawing/2014/main" val="2555434188"/>
+                    </a:ext>
+                  </a:extLst>
+                </a:gridCol>
+              </a:tblGrid>
+              <a:tr h="1181731">
+                <a:tc>
+                  <a:txBody>
+                    <a:bodyPr/>
+                    <a:lstStyle/>
+                    <a:p>
+                      <a:r>
+                        <a:rPr lang="es-ES" sz="1800" b="1" i="1" dirty="0">
+                          <a:gradFill flip="none" rotWithShape="1">
+                            <a:gsLst>
+                              <a:gs pos="35000">
+                                <a:srgbClr val="E0A883"/>
+                              </a:gs>
+                              <a:gs pos="0">
+                                <a:schemeClr val="accent2">
+                                  <a:lumMod val="40000"/>
+                                  <a:lumOff val="60000"/>
+                                </a:schemeClr>
+                              </a:gs>
+                              <a:gs pos="100000">
+                                <a:schemeClr val="accent2">
+                                  <a:lumMod val="60000"/>
+                                </a:schemeClr>
+                              </a:gs>
+                            </a:gsLst>
+                            <a:lin ang="16200000" scaled="0"/>
+                            <a:tileRect/>
+                          </a:gradFill>
+                        </a:rPr>
+                        <a:t>1</a:t>
+                      </a:r>
+                    </a:p>
+                  </a:txBody>
+                  <a:tcPr>
+                    <a:gradFill>
+                      <a:gsLst>
+                        <a:gs pos="0">
+                          <a:schemeClr val="accent1">
+                            <a:lumMod val="5000"/>
+                            <a:lumOff val="95000"/>
+                          </a:schemeClr>
+                        </a:gs>
+                        <a:gs pos="74000">
+                          <a:schemeClr val="accent1">
+                            <a:lumMod val="45000"/>
+                            <a:lumOff val="55000"/>
+                          </a:schemeClr>
+                        </a:gs>
+                        <a:gs pos="83000">
+                          <a:schemeClr val="accent1">
+                            <a:lumMod val="45000"/>
+                            <a:lumOff val="55000"/>
+                          </a:schemeClr>
+                        </a:gs>
+                        <a:gs pos="100000">
+                          <a:schemeClr val="accent1">
+                            <a:lumMod val="30000"/>
+                            <a:lumOff val="70000"/>
+                          </a:schemeClr>
+                        </a:gs>
+                      </a:gsLst>
+                      <a:lin ang="5400000" scaled="1"/>
+                    </a:gradFill>
+                  </a:tcPr>
+                </a:tc>
+                <a:tc>
+                  <a:txBody>
+                    <a:bodyPr/>
+                    <a:lstStyle/>
+                    <a:p>
+                      <a:r>
+                        <a:rPr lang="es-ES" sz="1800" b="1" i="1" dirty="0">
+                          <a:gradFill flip="none" rotWithShape="1">
+                            <a:gsLst>
+                              <a:gs pos="35000">
+                                <a:srgbClr val="E0A883"/>
+                              </a:gs>
+                              <a:gs pos="0">
+                                <a:schemeClr val="accent2">
+                                  <a:lumMod val="40000"/>
+                                  <a:lumOff val="60000"/>
+                                </a:schemeClr>
+                              </a:gs>
+                              <a:gs pos="100000">
+                                <a:schemeClr val="accent2">
+                                  <a:lumMod val="60000"/>
+                                </a:schemeClr>
+                              </a:gs>
+                            </a:gsLst>
+                            <a:lin ang="16200000" scaled="0"/>
+                            <a:tileRect/>
+                          </a:gradFill>
+                        </a:rPr>
+                        <a:t>2</a:t>
+                      </a:r>
+                    </a:p>
+                  </a:txBody>
+                  <a:tcPr>
+                    <a:gradFill>
+                      <a:gsLst>
+                        <a:gs pos="0">
+                          <a:schemeClr val="accent1">
+                            <a:lumMod val="5000"/>
+                            <a:lumOff val="95000"/>
+                          </a:schemeClr>
+                        </a:gs>
+                        <a:gs pos="74000">
+                          <a:schemeClr val="accent1">
+                            <a:lumMod val="45000"/>
+                            <a:lumOff val="55000"/>
+                          </a:schemeClr>
+                        </a:gs>
+                        <a:gs pos="83000">
+                          <a:schemeClr val="accent1">
+                            <a:lumMod val="45000"/>
+                            <a:lumOff val="55000"/>
+                          </a:schemeClr>
+                        </a:gs>
+                        <a:gs pos="100000">
+                          <a:schemeClr val="accent1">
+                            <a:lumMod val="30000"/>
+                            <a:lumOff val="70000"/>
+                          </a:schemeClr>
+                        </a:gs>
+                      </a:gsLst>
+                      <a:lin ang="5400000" scaled="1"/>
+                    </a:gradFill>
+                  </a:tcPr>
+                </a:tc>
+                <a:tc>
+                  <a:txBody>
+                    <a:bodyPr/>
+                    <a:lstStyle/>
+                    <a:p>
+                      <a:r>
+                        <a:rPr lang="es-ES" sz="1800" b="1" i="1" dirty="0">
+                          <a:gradFill flip="none" rotWithShape="1">
+                            <a:gsLst>
+                              <a:gs pos="35000">
+                                <a:srgbClr val="E0A883"/>
+                              </a:gs>
+                              <a:gs pos="0">
+                                <a:schemeClr val="accent2">
+                                  <a:lumMod val="40000"/>
+                                  <a:lumOff val="60000"/>
+                                </a:schemeClr>
+                              </a:gs>
+                              <a:gs pos="100000">
+                                <a:schemeClr val="accent2">
+                                  <a:lumMod val="60000"/>
+                                </a:schemeClr>
+                              </a:gs>
+                            </a:gsLst>
+                            <a:lin ang="16200000" scaled="0"/>
+                            <a:tileRect/>
+                          </a:gradFill>
+                        </a:rPr>
+                        <a:t>3</a:t>
+                      </a:r>
+                    </a:p>
+                  </a:txBody>
+                  <a:tcPr>
+                    <a:gradFill>
+                      <a:gsLst>
+                        <a:gs pos="0">
+                          <a:schemeClr val="accent1">
+                            <a:lumMod val="5000"/>
+                            <a:lumOff val="95000"/>
+                          </a:schemeClr>
+                        </a:gs>
+                        <a:gs pos="74000">
+                          <a:schemeClr val="accent1">
+                            <a:lumMod val="45000"/>
+                            <a:lumOff val="55000"/>
+                          </a:schemeClr>
+                        </a:gs>
+                        <a:gs pos="83000">
+                          <a:schemeClr val="accent1">
+                            <a:lumMod val="45000"/>
+                            <a:lumOff val="55000"/>
+                          </a:schemeClr>
+                        </a:gs>
+                        <a:gs pos="100000">
+                          <a:schemeClr val="accent1">
+                            <a:lumMod val="30000"/>
+                            <a:lumOff val="70000"/>
+                          </a:schemeClr>
+                        </a:gs>
+                      </a:gsLst>
+                      <a:lin ang="5400000" scaled="1"/>
+                    </a:gradFill>
+                  </a:tcPr>
+                </a:tc>
+                <a:tc>
+                  <a:txBody>
+                    <a:bodyPr/>
+                    <a:lstStyle/>
+                    <a:p>
+                      <a:r>
+                        <a:rPr lang="es-ES" sz="1800" b="1" i="1" dirty="0">
+                          <a:gradFill flip="none" rotWithShape="1">
+                            <a:gsLst>
+                              <a:gs pos="35000">
+                                <a:srgbClr val="E0A883"/>
+                              </a:gs>
+                              <a:gs pos="0">
+                                <a:schemeClr val="accent2">
+                                  <a:lumMod val="40000"/>
+                                  <a:lumOff val="60000"/>
+                                </a:schemeClr>
+                              </a:gs>
+                              <a:gs pos="100000">
+                                <a:schemeClr val="accent2">
+                                  <a:lumMod val="60000"/>
+                                </a:schemeClr>
+                              </a:gs>
+                            </a:gsLst>
+                            <a:lin ang="16200000" scaled="0"/>
+                            <a:tileRect/>
+                          </a:gradFill>
+                        </a:rPr>
+                        <a:t>A</a:t>
+                      </a:r>
+                    </a:p>
+                  </a:txBody>
+                  <a:tcPr>
+                    <a:gradFill>
+                      <a:gsLst>
+                        <a:gs pos="0">
+                          <a:schemeClr val="accent1">
+                            <a:lumMod val="5000"/>
+                            <a:lumOff val="95000"/>
+                          </a:schemeClr>
+                        </a:gs>
+                        <a:gs pos="74000">
+                          <a:schemeClr val="accent1">
+                            <a:lumMod val="45000"/>
+                            <a:lumOff val="55000"/>
+                          </a:schemeClr>
+                        </a:gs>
+                        <a:gs pos="83000">
+                          <a:schemeClr val="accent1">
+                            <a:lumMod val="45000"/>
+                            <a:lumOff val="55000"/>
+                          </a:schemeClr>
+                        </a:gs>
+                        <a:gs pos="100000">
+                          <a:schemeClr val="accent1">
+                            <a:lumMod val="30000"/>
+                            <a:lumOff val="70000"/>
+                          </a:schemeClr>
+                        </a:gs>
+                      </a:gsLst>
+                      <a:lin ang="5400000" scaled="1"/>
+                    </a:gradFill>
+                  </a:tcPr>
+                </a:tc>
+                <a:extLst>
+                  <a:ext uri="{0D108BD9-81ED-4DB2-BD59-A6C34878D82A}">
+                    <a16:rowId xmlns:a16="http://schemas.microsoft.com/office/drawing/2014/main" val="1942957527"/>
+                  </a:ext>
+                </a:extLst>
+              </a:tr>
+              <a:tr h="1181731">
+                <a:tc>
+                  <a:txBody>
+                    <a:bodyPr/>
+                    <a:lstStyle/>
+                    <a:p>
+                      <a:r>
+                        <a:rPr lang="es-ES" sz="1800" b="1" i="1" dirty="0">
+                          <a:gradFill flip="none" rotWithShape="1">
+                            <a:gsLst>
+                              <a:gs pos="35000">
+                                <a:srgbClr val="E0A883"/>
+                              </a:gs>
+                              <a:gs pos="0">
+                                <a:schemeClr val="accent2">
+                                  <a:lumMod val="40000"/>
+                                  <a:lumOff val="60000"/>
+                                </a:schemeClr>
+                              </a:gs>
+                              <a:gs pos="100000">
+                                <a:schemeClr val="accent2">
+                                  <a:lumMod val="60000"/>
+                                </a:schemeClr>
+                              </a:gs>
+                            </a:gsLst>
+                            <a:lin ang="16200000" scaled="0"/>
+                            <a:tileRect/>
+                          </a:gradFill>
+                        </a:rPr>
+                        <a:t>4</a:t>
+                      </a:r>
+                    </a:p>
+                  </a:txBody>
+                  <a:tcPr>
+                    <a:gradFill>
+                      <a:gsLst>
+                        <a:gs pos="0">
+                          <a:schemeClr val="accent1">
+                            <a:lumMod val="5000"/>
+                            <a:lumOff val="95000"/>
+                          </a:schemeClr>
+                        </a:gs>
+                        <a:gs pos="74000">
+                          <a:schemeClr val="accent1">
+                            <a:lumMod val="45000"/>
+                            <a:lumOff val="55000"/>
+                          </a:schemeClr>
+                        </a:gs>
+                        <a:gs pos="83000">
+                          <a:schemeClr val="accent1">
+                            <a:lumMod val="45000"/>
+                            <a:lumOff val="55000"/>
+                          </a:schemeClr>
+                        </a:gs>
+                        <a:gs pos="100000">
+                          <a:schemeClr val="accent1">
+                            <a:lumMod val="30000"/>
+                            <a:lumOff val="70000"/>
+                          </a:schemeClr>
+                        </a:gs>
+                      </a:gsLst>
+                      <a:lin ang="5400000" scaled="1"/>
+                    </a:gradFill>
+                  </a:tcPr>
+                </a:tc>
+                <a:tc>
+                  <a:txBody>
+                    <a:bodyPr/>
+                    <a:lstStyle/>
+                    <a:p>
+                      <a:r>
+                        <a:rPr lang="es-ES" sz="1800" b="1" i="1" dirty="0">
+                          <a:gradFill flip="none" rotWithShape="1">
+                            <a:gsLst>
+                              <a:gs pos="35000">
+                                <a:srgbClr val="E0A883"/>
+                              </a:gs>
+                              <a:gs pos="0">
+                                <a:schemeClr val="accent2">
+                                  <a:lumMod val="40000"/>
+                                  <a:lumOff val="60000"/>
+                                </a:schemeClr>
+                              </a:gs>
+                              <a:gs pos="100000">
+                                <a:schemeClr val="accent2">
+                                  <a:lumMod val="60000"/>
+                                </a:schemeClr>
+                              </a:gs>
+                            </a:gsLst>
+                            <a:lin ang="16200000" scaled="0"/>
+                            <a:tileRect/>
+                          </a:gradFill>
+                        </a:rPr>
+                        <a:t>5</a:t>
+                      </a:r>
+                    </a:p>
+                  </a:txBody>
+                  <a:tcPr>
+                    <a:gradFill>
+                      <a:gsLst>
+                        <a:gs pos="0">
+                          <a:schemeClr val="accent1">
+                            <a:lumMod val="5000"/>
+                            <a:lumOff val="95000"/>
+                          </a:schemeClr>
+                        </a:gs>
+                        <a:gs pos="74000">
+                          <a:schemeClr val="accent1">
+                            <a:lumMod val="45000"/>
+                            <a:lumOff val="55000"/>
+                          </a:schemeClr>
+                        </a:gs>
+                        <a:gs pos="83000">
+                          <a:schemeClr val="accent1">
+                            <a:lumMod val="45000"/>
+                            <a:lumOff val="55000"/>
+                          </a:schemeClr>
+                        </a:gs>
+                        <a:gs pos="100000">
+                          <a:schemeClr val="accent1">
+                            <a:lumMod val="30000"/>
+                            <a:lumOff val="70000"/>
+                          </a:schemeClr>
+                        </a:gs>
+                      </a:gsLst>
+                      <a:lin ang="5400000" scaled="1"/>
+                    </a:gradFill>
+                  </a:tcPr>
+                </a:tc>
+                <a:tc>
+                  <a:txBody>
+                    <a:bodyPr/>
+                    <a:lstStyle/>
+                    <a:p>
+                      <a:r>
+                        <a:rPr lang="es-ES" sz="1800" b="1" i="1" dirty="0">
+                          <a:gradFill flip="none" rotWithShape="1">
+                            <a:gsLst>
+                              <a:gs pos="35000">
+                                <a:srgbClr val="E0A883"/>
+                              </a:gs>
+                              <a:gs pos="0">
+                                <a:schemeClr val="accent2">
+                                  <a:lumMod val="40000"/>
+                                  <a:lumOff val="60000"/>
+                                </a:schemeClr>
+                              </a:gs>
+                              <a:gs pos="100000">
+                                <a:schemeClr val="accent2">
+                                  <a:lumMod val="60000"/>
+                                </a:schemeClr>
+                              </a:gs>
+                            </a:gsLst>
+                            <a:lin ang="16200000" scaled="0"/>
+                            <a:tileRect/>
+                          </a:gradFill>
+                        </a:rPr>
+                        <a:t>6</a:t>
+                      </a:r>
+                    </a:p>
+                  </a:txBody>
+                  <a:tcPr>
+                    <a:gradFill>
+                      <a:gsLst>
+                        <a:gs pos="0">
+                          <a:schemeClr val="accent1">
+                            <a:lumMod val="5000"/>
+                            <a:lumOff val="95000"/>
+                          </a:schemeClr>
+                        </a:gs>
+                        <a:gs pos="74000">
+                          <a:schemeClr val="accent1">
+                            <a:lumMod val="45000"/>
+                            <a:lumOff val="55000"/>
+                          </a:schemeClr>
+                        </a:gs>
+                        <a:gs pos="83000">
+                          <a:schemeClr val="accent1">
+                            <a:lumMod val="45000"/>
+                            <a:lumOff val="55000"/>
+                          </a:schemeClr>
+                        </a:gs>
+                        <a:gs pos="100000">
+                          <a:schemeClr val="accent1">
+                            <a:lumMod val="30000"/>
+                            <a:lumOff val="70000"/>
+                          </a:schemeClr>
+                        </a:gs>
+                      </a:gsLst>
+                      <a:lin ang="5400000" scaled="1"/>
+                    </a:gradFill>
+                  </a:tcPr>
+                </a:tc>
+                <a:tc>
+                  <a:txBody>
+                    <a:bodyPr/>
+                    <a:lstStyle/>
+                    <a:p>
+                      <a:r>
+                        <a:rPr lang="es-ES" sz="1800" b="1" i="1" dirty="0">
+                          <a:gradFill flip="none" rotWithShape="1">
+                            <a:gsLst>
+                              <a:gs pos="35000">
+                                <a:srgbClr val="E0A883"/>
+                              </a:gs>
+                              <a:gs pos="0">
+                                <a:schemeClr val="accent2">
+                                  <a:lumMod val="40000"/>
+                                  <a:lumOff val="60000"/>
+                                </a:schemeClr>
+                              </a:gs>
+                              <a:gs pos="100000">
+                                <a:schemeClr val="accent2">
+                                  <a:lumMod val="60000"/>
+                                </a:schemeClr>
+                              </a:gs>
+                            </a:gsLst>
+                            <a:lin ang="16200000" scaled="0"/>
+                            <a:tileRect/>
+                          </a:gradFill>
+                        </a:rPr>
+                        <a:t>B</a:t>
+                      </a:r>
+                    </a:p>
+                  </a:txBody>
+                  <a:tcPr>
+                    <a:gradFill>
+                      <a:gsLst>
+                        <a:gs pos="0">
+                          <a:schemeClr val="accent1">
+                            <a:lumMod val="5000"/>
+                            <a:lumOff val="95000"/>
+                          </a:schemeClr>
+                        </a:gs>
+                        <a:gs pos="74000">
+                          <a:schemeClr val="accent1">
+                            <a:lumMod val="45000"/>
+                            <a:lumOff val="55000"/>
+                          </a:schemeClr>
+                        </a:gs>
+                        <a:gs pos="83000">
+                          <a:schemeClr val="accent1">
+                            <a:lumMod val="45000"/>
+                            <a:lumOff val="55000"/>
+                          </a:schemeClr>
+                        </a:gs>
+                        <a:gs pos="100000">
+                          <a:schemeClr val="accent1">
+                            <a:lumMod val="30000"/>
+                            <a:lumOff val="70000"/>
+                          </a:schemeClr>
+                        </a:gs>
+                      </a:gsLst>
+                      <a:lin ang="5400000" scaled="1"/>
+                    </a:gradFill>
+                  </a:tcPr>
+                </a:tc>
+                <a:extLst>
+                  <a:ext uri="{0D108BD9-81ED-4DB2-BD59-A6C34878D82A}">
+                    <a16:rowId xmlns:a16="http://schemas.microsoft.com/office/drawing/2014/main" val="3370062836"/>
+                  </a:ext>
+                </a:extLst>
+              </a:tr>
+              <a:tr h="1181731">
+                <a:tc>
+                  <a:txBody>
+                    <a:bodyPr/>
+                    <a:lstStyle/>
+                    <a:p>
+                      <a:r>
+                        <a:rPr lang="es-ES" sz="1800" b="1" i="1" dirty="0">
+                          <a:gradFill flip="none" rotWithShape="1">
+                            <a:gsLst>
+                              <a:gs pos="35000">
+                                <a:srgbClr val="E0A883"/>
+                              </a:gs>
+                              <a:gs pos="0">
+                                <a:schemeClr val="accent2">
+                                  <a:lumMod val="40000"/>
+                                  <a:lumOff val="60000"/>
+                                </a:schemeClr>
+                              </a:gs>
+                              <a:gs pos="100000">
+                                <a:schemeClr val="accent2">
+                                  <a:lumMod val="60000"/>
+                                </a:schemeClr>
+                              </a:gs>
+                            </a:gsLst>
+                            <a:lin ang="16200000" scaled="0"/>
+                            <a:tileRect/>
+                          </a:gradFill>
+                        </a:rPr>
+                        <a:t>7</a:t>
+                      </a:r>
+                    </a:p>
+                  </a:txBody>
+                  <a:tcPr>
+                    <a:gradFill>
+                      <a:gsLst>
+                        <a:gs pos="0">
+                          <a:schemeClr val="accent1">
+                            <a:lumMod val="5000"/>
+                            <a:lumOff val="95000"/>
+                          </a:schemeClr>
+                        </a:gs>
+                        <a:gs pos="74000">
+                          <a:schemeClr val="accent1">
+                            <a:lumMod val="45000"/>
+                            <a:lumOff val="55000"/>
+                          </a:schemeClr>
+                        </a:gs>
+                        <a:gs pos="83000">
+                          <a:schemeClr val="accent1">
+                            <a:lumMod val="45000"/>
+                            <a:lumOff val="55000"/>
+                          </a:schemeClr>
+                        </a:gs>
+                        <a:gs pos="100000">
+                          <a:schemeClr val="accent1">
+                            <a:lumMod val="30000"/>
+                            <a:lumOff val="70000"/>
+                          </a:schemeClr>
+                        </a:gs>
+                      </a:gsLst>
+                      <a:lin ang="5400000" scaled="1"/>
+                    </a:gradFill>
+                  </a:tcPr>
+                </a:tc>
+                <a:tc>
+                  <a:txBody>
+                    <a:bodyPr/>
+                    <a:lstStyle/>
+                    <a:p>
+                      <a:r>
+                        <a:rPr lang="es-ES" sz="1800" b="1" i="1" dirty="0">
+                          <a:gradFill flip="none" rotWithShape="1">
+                            <a:gsLst>
+                              <a:gs pos="35000">
+                                <a:srgbClr val="E0A883"/>
+                              </a:gs>
+                              <a:gs pos="0">
+                                <a:schemeClr val="accent2">
+                                  <a:lumMod val="40000"/>
+                                  <a:lumOff val="60000"/>
+                                </a:schemeClr>
+                              </a:gs>
+                              <a:gs pos="100000">
+                                <a:schemeClr val="accent2">
+                                  <a:lumMod val="60000"/>
+                                </a:schemeClr>
+                              </a:gs>
+                            </a:gsLst>
+                            <a:lin ang="16200000" scaled="0"/>
+                            <a:tileRect/>
+                          </a:gradFill>
+                        </a:rPr>
+                        <a:t>8</a:t>
+                      </a:r>
+                    </a:p>
+                  </a:txBody>
+                  <a:tcPr>
+                    <a:gradFill>
+                      <a:gsLst>
+                        <a:gs pos="0">
+                          <a:schemeClr val="accent1">
+                            <a:lumMod val="5000"/>
+                            <a:lumOff val="95000"/>
+                          </a:schemeClr>
+                        </a:gs>
+                        <a:gs pos="74000">
+                          <a:schemeClr val="accent1">
+                            <a:lumMod val="45000"/>
+                            <a:lumOff val="55000"/>
+                          </a:schemeClr>
+                        </a:gs>
+                        <a:gs pos="83000">
+                          <a:schemeClr val="accent1">
+                            <a:lumMod val="45000"/>
+                            <a:lumOff val="55000"/>
+                          </a:schemeClr>
+                        </a:gs>
+                        <a:gs pos="100000">
+                          <a:schemeClr val="accent1">
+                            <a:lumMod val="30000"/>
+                            <a:lumOff val="70000"/>
+                          </a:schemeClr>
+                        </a:gs>
+                      </a:gsLst>
+                      <a:lin ang="5400000" scaled="1"/>
+                    </a:gradFill>
+                  </a:tcPr>
+                </a:tc>
+                <a:tc>
+                  <a:txBody>
+                    <a:bodyPr/>
+                    <a:lstStyle/>
+                    <a:p>
+                      <a:r>
+                        <a:rPr lang="es-ES" sz="1800" b="1" i="1" dirty="0">
+                          <a:gradFill flip="none" rotWithShape="1">
+                            <a:gsLst>
+                              <a:gs pos="35000">
+                                <a:srgbClr val="E0A883"/>
+                              </a:gs>
+                              <a:gs pos="0">
+                                <a:schemeClr val="accent2">
+                                  <a:lumMod val="40000"/>
+                                  <a:lumOff val="60000"/>
+                                </a:schemeClr>
+                              </a:gs>
+                              <a:gs pos="100000">
+                                <a:schemeClr val="accent2">
+                                  <a:lumMod val="60000"/>
+                                </a:schemeClr>
+                              </a:gs>
+                            </a:gsLst>
+                            <a:lin ang="16200000" scaled="0"/>
+                            <a:tileRect/>
+                          </a:gradFill>
+                        </a:rPr>
+                        <a:t>9</a:t>
+                      </a:r>
+                    </a:p>
+                  </a:txBody>
+                  <a:tcPr>
+                    <a:gradFill>
+                      <a:gsLst>
+                        <a:gs pos="0">
+                          <a:schemeClr val="accent1">
+                            <a:lumMod val="5000"/>
+                            <a:lumOff val="95000"/>
+                          </a:schemeClr>
+                        </a:gs>
+                        <a:gs pos="74000">
+                          <a:schemeClr val="accent1">
+                            <a:lumMod val="45000"/>
+                            <a:lumOff val="55000"/>
+                          </a:schemeClr>
+                        </a:gs>
+                        <a:gs pos="83000">
+                          <a:schemeClr val="accent1">
+                            <a:lumMod val="45000"/>
+                            <a:lumOff val="55000"/>
+                          </a:schemeClr>
+                        </a:gs>
+                        <a:gs pos="100000">
+                          <a:schemeClr val="accent1">
+                            <a:lumMod val="30000"/>
+                            <a:lumOff val="70000"/>
+                          </a:schemeClr>
+                        </a:gs>
+                      </a:gsLst>
+                      <a:lin ang="5400000" scaled="1"/>
+                    </a:gradFill>
+                  </a:tcPr>
+                </a:tc>
+                <a:tc>
+                  <a:txBody>
+                    <a:bodyPr/>
+                    <a:lstStyle/>
+                    <a:p>
+                      <a:r>
+                        <a:rPr lang="es-ES" sz="1800" b="1" i="1" dirty="0">
+                          <a:gradFill flip="none" rotWithShape="1">
+                            <a:gsLst>
+                              <a:gs pos="35000">
+                                <a:srgbClr val="E0A883"/>
+                              </a:gs>
+                              <a:gs pos="0">
+                                <a:schemeClr val="accent2">
+                                  <a:lumMod val="40000"/>
+                                  <a:lumOff val="60000"/>
+                                </a:schemeClr>
+                              </a:gs>
+                              <a:gs pos="100000">
+                                <a:schemeClr val="accent2">
+                                  <a:lumMod val="60000"/>
+                                </a:schemeClr>
+                              </a:gs>
+                            </a:gsLst>
+                            <a:lin ang="16200000" scaled="0"/>
+                            <a:tileRect/>
+                          </a:gradFill>
+                        </a:rPr>
+                        <a:t>C</a:t>
+                      </a:r>
+                    </a:p>
+                  </a:txBody>
+                  <a:tcPr>
+                    <a:gradFill>
+                      <a:gsLst>
+                        <a:gs pos="0">
+                          <a:schemeClr val="accent1">
+                            <a:lumMod val="5000"/>
+                            <a:lumOff val="95000"/>
+                          </a:schemeClr>
+                        </a:gs>
+                        <a:gs pos="74000">
+                          <a:schemeClr val="accent1">
+                            <a:lumMod val="45000"/>
+                            <a:lumOff val="55000"/>
+                          </a:schemeClr>
+                        </a:gs>
+                        <a:gs pos="83000">
+                          <a:schemeClr val="accent1">
+                            <a:lumMod val="45000"/>
+                            <a:lumOff val="55000"/>
+                          </a:schemeClr>
+                        </a:gs>
+                        <a:gs pos="100000">
+                          <a:schemeClr val="accent1">
+                            <a:lumMod val="30000"/>
+                            <a:lumOff val="70000"/>
+                          </a:schemeClr>
+                        </a:gs>
+                      </a:gsLst>
+                      <a:lin ang="5400000" scaled="1"/>
+                    </a:gradFill>
+                  </a:tcPr>
+                </a:tc>
+                <a:extLst>
+                  <a:ext uri="{0D108BD9-81ED-4DB2-BD59-A6C34878D82A}">
+                    <a16:rowId xmlns:a16="http://schemas.microsoft.com/office/drawing/2014/main" val="3650298452"/>
+                  </a:ext>
+                </a:extLst>
+              </a:tr>
+              <a:tr h="1181731">
+                <a:tc>
+                  <a:txBody>
+                    <a:bodyPr/>
+                    <a:lstStyle/>
+                    <a:p>
+                      <a:r>
+                        <a:rPr lang="es-ES" sz="1800" b="1" i="1" dirty="0">
+                          <a:gradFill flip="none" rotWithShape="1">
+                            <a:gsLst>
+                              <a:gs pos="35000">
+                                <a:srgbClr val="E0A883"/>
+                              </a:gs>
+                              <a:gs pos="0">
+                                <a:schemeClr val="accent2">
+                                  <a:lumMod val="40000"/>
+                                  <a:lumOff val="60000"/>
+                                </a:schemeClr>
+                              </a:gs>
+                              <a:gs pos="100000">
+                                <a:schemeClr val="accent2">
+                                  <a:lumMod val="60000"/>
+                                </a:schemeClr>
+                              </a:gs>
+                            </a:gsLst>
+                            <a:lin ang="16200000" scaled="0"/>
+                            <a:tileRect/>
+                          </a:gradFill>
+                        </a:rPr>
+                        <a:t>*</a:t>
+                      </a:r>
+                    </a:p>
+                  </a:txBody>
+                  <a:tcPr>
+                    <a:gradFill>
+                      <a:gsLst>
+                        <a:gs pos="0">
+                          <a:schemeClr val="accent1">
+                            <a:lumMod val="5000"/>
+                            <a:lumOff val="95000"/>
+                          </a:schemeClr>
+                        </a:gs>
+                        <a:gs pos="74000">
+                          <a:schemeClr val="accent1">
+                            <a:lumMod val="45000"/>
+                            <a:lumOff val="55000"/>
+                          </a:schemeClr>
+                        </a:gs>
+                        <a:gs pos="83000">
+                          <a:schemeClr val="accent1">
+                            <a:lumMod val="45000"/>
+                            <a:lumOff val="55000"/>
+                          </a:schemeClr>
+                        </a:gs>
+                        <a:gs pos="100000">
+                          <a:schemeClr val="accent1">
+                            <a:lumMod val="30000"/>
+                            <a:lumOff val="70000"/>
+                          </a:schemeClr>
+                        </a:gs>
+                      </a:gsLst>
+                      <a:lin ang="5400000" scaled="1"/>
+                    </a:gradFill>
+                  </a:tcPr>
+                </a:tc>
+                <a:tc>
+                  <a:txBody>
+                    <a:bodyPr/>
+                    <a:lstStyle/>
+                    <a:p>
+                      <a:r>
+                        <a:rPr lang="es-ES" sz="1800" b="1" i="1" dirty="0">
+                          <a:gradFill flip="none" rotWithShape="1">
+                            <a:gsLst>
+                              <a:gs pos="35000">
+                                <a:srgbClr val="E0A883"/>
+                              </a:gs>
+                              <a:gs pos="0">
+                                <a:schemeClr val="accent2">
+                                  <a:lumMod val="40000"/>
+                                  <a:lumOff val="60000"/>
+                                </a:schemeClr>
+                              </a:gs>
+                              <a:gs pos="100000">
+                                <a:schemeClr val="accent2">
+                                  <a:lumMod val="60000"/>
+                                </a:schemeClr>
+                              </a:gs>
+                            </a:gsLst>
+                            <a:lin ang="16200000" scaled="0"/>
+                            <a:tileRect/>
+                          </a:gradFill>
+                        </a:rPr>
+                        <a:t>0</a:t>
+                      </a:r>
+                    </a:p>
+                  </a:txBody>
+                  <a:tcPr>
+                    <a:gradFill>
+                      <a:gsLst>
+                        <a:gs pos="0">
+                          <a:schemeClr val="accent1">
+                            <a:lumMod val="5000"/>
+                            <a:lumOff val="95000"/>
+                          </a:schemeClr>
+                        </a:gs>
+                        <a:gs pos="74000">
+                          <a:schemeClr val="accent1">
+                            <a:lumMod val="45000"/>
+                            <a:lumOff val="55000"/>
+                          </a:schemeClr>
+                        </a:gs>
+                        <a:gs pos="83000">
+                          <a:schemeClr val="accent1">
+                            <a:lumMod val="45000"/>
+                            <a:lumOff val="55000"/>
+                          </a:schemeClr>
+                        </a:gs>
+                        <a:gs pos="100000">
+                          <a:schemeClr val="accent1">
+                            <a:lumMod val="30000"/>
+                            <a:lumOff val="70000"/>
+                          </a:schemeClr>
+                        </a:gs>
+                      </a:gsLst>
+                      <a:lin ang="5400000" scaled="1"/>
+                    </a:gradFill>
+                  </a:tcPr>
+                </a:tc>
+                <a:tc>
+                  <a:txBody>
+                    <a:bodyPr/>
+                    <a:lstStyle/>
+                    <a:p>
+                      <a:r>
+                        <a:rPr lang="es-ES" sz="1800" b="1" i="1" dirty="0">
+                          <a:gradFill flip="none" rotWithShape="1">
+                            <a:gsLst>
+                              <a:gs pos="35000">
+                                <a:srgbClr val="E0A883"/>
+                              </a:gs>
+                              <a:gs pos="0">
+                                <a:schemeClr val="accent2">
+                                  <a:lumMod val="40000"/>
+                                  <a:lumOff val="60000"/>
+                                </a:schemeClr>
+                              </a:gs>
+                              <a:gs pos="100000">
+                                <a:schemeClr val="accent2">
+                                  <a:lumMod val="60000"/>
+                                </a:schemeClr>
+                              </a:gs>
+                            </a:gsLst>
+                            <a:lin ang="16200000" scaled="0"/>
+                            <a:tileRect/>
+                          </a:gradFill>
+                        </a:rPr>
+                        <a:t>#</a:t>
+                      </a:r>
+                    </a:p>
+                  </a:txBody>
+                  <a:tcPr>
+                    <a:gradFill>
+                      <a:gsLst>
+                        <a:gs pos="0">
+                          <a:schemeClr val="accent1">
+                            <a:lumMod val="5000"/>
+                            <a:lumOff val="95000"/>
+                          </a:schemeClr>
+                        </a:gs>
+                        <a:gs pos="74000">
+                          <a:schemeClr val="accent1">
+                            <a:lumMod val="45000"/>
+                            <a:lumOff val="55000"/>
+                          </a:schemeClr>
+                        </a:gs>
+                        <a:gs pos="83000">
+                          <a:schemeClr val="accent1">
+                            <a:lumMod val="45000"/>
+                            <a:lumOff val="55000"/>
+                          </a:schemeClr>
+                        </a:gs>
+                        <a:gs pos="100000">
+                          <a:schemeClr val="accent1">
+                            <a:lumMod val="30000"/>
+                            <a:lumOff val="70000"/>
+                          </a:schemeClr>
+                        </a:gs>
+                      </a:gsLst>
+                      <a:lin ang="5400000" scaled="1"/>
+                    </a:gradFill>
+                  </a:tcPr>
+                </a:tc>
+                <a:tc>
+                  <a:txBody>
+                    <a:bodyPr/>
+                    <a:lstStyle/>
+                    <a:p>
+                      <a:r>
+                        <a:rPr lang="es-ES" sz="1800" b="1" i="1" dirty="0">
+                          <a:gradFill flip="none" rotWithShape="1">
+                            <a:gsLst>
+                              <a:gs pos="35000">
+                                <a:srgbClr val="E0A883"/>
+                              </a:gs>
+                              <a:gs pos="0">
+                                <a:schemeClr val="accent2">
+                                  <a:lumMod val="40000"/>
+                                  <a:lumOff val="60000"/>
+                                </a:schemeClr>
+                              </a:gs>
+                              <a:gs pos="100000">
+                                <a:schemeClr val="accent2">
+                                  <a:lumMod val="60000"/>
+                                </a:schemeClr>
+                              </a:gs>
+                            </a:gsLst>
+                            <a:lin ang="16200000" scaled="0"/>
+                            <a:tileRect/>
+                          </a:gradFill>
+                        </a:rPr>
+                        <a:t>D</a:t>
+                      </a:r>
+                    </a:p>
+                  </a:txBody>
+                  <a:tcPr>
+                    <a:gradFill>
+                      <a:gsLst>
+                        <a:gs pos="0">
+                          <a:schemeClr val="accent1">
+                            <a:lumMod val="5000"/>
+                            <a:lumOff val="95000"/>
+                          </a:schemeClr>
+                        </a:gs>
+                        <a:gs pos="74000">
+                          <a:schemeClr val="accent1">
+                            <a:lumMod val="45000"/>
+                            <a:lumOff val="55000"/>
+                          </a:schemeClr>
+                        </a:gs>
+                        <a:gs pos="83000">
+                          <a:schemeClr val="accent1">
+                            <a:lumMod val="45000"/>
+                            <a:lumOff val="55000"/>
+                          </a:schemeClr>
+                        </a:gs>
+                        <a:gs pos="100000">
+                          <a:schemeClr val="accent1">
+                            <a:lumMod val="30000"/>
+                            <a:lumOff val="70000"/>
+                          </a:schemeClr>
+                        </a:gs>
+                      </a:gsLst>
+                      <a:lin ang="5400000" scaled="1"/>
+                    </a:gradFill>
+                  </a:tcPr>
+                </a:tc>
+                <a:extLst>
+                  <a:ext uri="{0D108BD9-81ED-4DB2-BD59-A6C34878D82A}">
+                    <a16:rowId xmlns:a16="http://schemas.microsoft.com/office/drawing/2014/main" val="1648013763"/>
+                  </a:ext>
+                </a:extLst>
+              </a:tr>
+            </a:tbl>
+          </a:graphicData>
+        </a:graphic>
+      </p:graphicFrame>
+      <p:sp>
+        <p:nvSpPr>
+          <p:cNvPr id="2" name="Título 1">
+            <a:extLst>
+              <a:ext uri="{FF2B5EF4-FFF2-40B4-BE49-F238E27FC236}">
+                <a16:creationId xmlns:a16="http://schemas.microsoft.com/office/drawing/2014/main" id="{3533A590-B2E6-8839-4EB3-2B5761FEAB89}"/>
+              </a:ext>
+            </a:extLst>
+          </p:cNvPr>
+          <p:cNvSpPr>
+            <a:spLocks noGrp="1"/>
+          </p:cNvSpPr>
+          <p:nvPr>
+            <p:ph type="title"/>
+          </p:nvPr>
+        </p:nvSpPr>
+        <p:spPr>
+          <a:xfrm>
+            <a:off x="838200" y="365126"/>
+            <a:ext cx="10515600" cy="773392"/>
+          </a:xfrm>
+        </p:spPr>
+        <p:txBody>
+          <a:bodyPr/>
+          <a:lstStyle/>
+          <a:p>
+            <a:pPr algn="ctr"/>
+            <a:r>
+              <a:rPr lang="es-ES" dirty="0"/>
+              <a:t>Asignación de funciones</a:t>
+            </a:r>
+          </a:p>
+        </p:txBody>
+      </p:sp>
+      <p:graphicFrame>
+        <p:nvGraphicFramePr>
+          <p:cNvPr id="4" name="Tabla 4">
+            <a:extLst>
+              <a:ext uri="{FF2B5EF4-FFF2-40B4-BE49-F238E27FC236}">
+                <a16:creationId xmlns:a16="http://schemas.microsoft.com/office/drawing/2014/main" id="{61E8BD4F-4464-B49F-26DB-1587CD31FD6E}"/>
+              </a:ext>
+            </a:extLst>
+          </p:cNvPr>
+          <p:cNvGraphicFramePr>
+            <a:graphicFrameLocks noGrp="1"/>
+          </p:cNvGraphicFramePr>
+          <p:nvPr>
+            <p:extLst>
+              <p:ext uri="{D42A27DB-BD31-4B8C-83A1-F6EECF244321}">
+                <p14:modId xmlns:p14="http://schemas.microsoft.com/office/powerpoint/2010/main" val="1759656924"/>
+              </p:ext>
+            </p:extLst>
+          </p:nvPr>
+        </p:nvGraphicFramePr>
+        <p:xfrm>
+          <a:off x="1307179" y="1783530"/>
+          <a:ext cx="6318739" cy="4747891"/>
+        </p:xfrm>
+        <a:graphic>
+          <a:graphicData uri="http://schemas.openxmlformats.org/drawingml/2006/table">
+            <a:tbl>
+              <a:tblPr firstRow="1" bandRow="1">
+                <a:tableStyleId>{5C22544A-7EE6-4342-B048-85BDC9FD1C3A}</a:tableStyleId>
+              </a:tblPr>
+              <a:tblGrid>
+                <a:gridCol w="1579685">
+                  <a:extLst>
+                    <a:ext uri="{9D8B030D-6E8A-4147-A177-3AD203B41FA5}">
+                      <a16:colId xmlns:a16="http://schemas.microsoft.com/office/drawing/2014/main" val="1839756769"/>
+                    </a:ext>
+                  </a:extLst>
+                </a:gridCol>
+                <a:gridCol w="1577259">
+                  <a:extLst>
+                    <a:ext uri="{9D8B030D-6E8A-4147-A177-3AD203B41FA5}">
+                      <a16:colId xmlns:a16="http://schemas.microsoft.com/office/drawing/2014/main" val="3629000199"/>
+                    </a:ext>
+                  </a:extLst>
+                </a:gridCol>
+                <a:gridCol w="1582110">
+                  <a:extLst>
+                    <a:ext uri="{9D8B030D-6E8A-4147-A177-3AD203B41FA5}">
+                      <a16:colId xmlns:a16="http://schemas.microsoft.com/office/drawing/2014/main" val="230538060"/>
+                    </a:ext>
+                  </a:extLst>
+                </a:gridCol>
+                <a:gridCol w="1579685">
+                  <a:extLst>
+                    <a:ext uri="{9D8B030D-6E8A-4147-A177-3AD203B41FA5}">
+                      <a16:colId xmlns:a16="http://schemas.microsoft.com/office/drawing/2014/main" val="2555434188"/>
+                    </a:ext>
+                  </a:extLst>
+                </a:gridCol>
+              </a:tblGrid>
+              <a:tr h="1181731">
+                <a:tc>
+                  <a:txBody>
+                    <a:bodyPr/>
+                    <a:lstStyle/>
+                    <a:p>
+                      <a:pPr algn="ctr"/>
+                      <a:r>
+                        <a:rPr lang="es-ES" b="1" dirty="0">
+                          <a:solidFill>
+                            <a:schemeClr val="tx1"/>
+                          </a:solidFill>
+                        </a:rPr>
+                        <a:t>Q</a:t>
+                      </a:r>
+                    </a:p>
+                    <a:p>
+                      <a:pPr algn="ctr"/>
+                      <a:r>
+                        <a:rPr lang="es-ES" b="1" dirty="0">
+                          <a:solidFill>
+                            <a:schemeClr val="tx1"/>
+                          </a:solidFill>
+                        </a:rPr>
+                        <a:t>(</a:t>
+                      </a:r>
+                      <a:r>
+                        <a:rPr lang="es-ES" b="1" dirty="0" err="1">
+                          <a:solidFill>
+                            <a:schemeClr val="tx1"/>
+                          </a:solidFill>
+                        </a:rPr>
+                        <a:t>Freehand</a:t>
+                      </a:r>
+                      <a:r>
+                        <a:rPr lang="es-ES" b="1" dirty="0">
+                          <a:solidFill>
+                            <a:schemeClr val="tx1"/>
+                          </a:solidFill>
+                        </a:rPr>
+                        <a:t> </a:t>
+                      </a:r>
+                      <a:r>
+                        <a:rPr lang="es-ES" b="1" dirty="0" err="1">
+                          <a:solidFill>
+                            <a:schemeClr val="tx1"/>
+                          </a:solidFill>
+                        </a:rPr>
+                        <a:t>selection</a:t>
+                      </a:r>
+                      <a:r>
+                        <a:rPr lang="es-ES" b="1" dirty="0">
+                          <a:solidFill>
+                            <a:schemeClr val="tx1"/>
+                          </a:solidFill>
+                        </a:rPr>
+                        <a:t> </a:t>
+                      </a:r>
+                      <a:r>
+                        <a:rPr lang="es-ES" b="1" dirty="0" err="1">
+                          <a:solidFill>
+                            <a:schemeClr val="tx1"/>
+                          </a:solidFill>
+                        </a:rPr>
+                        <a:t>tool</a:t>
+                      </a:r>
+                      <a:r>
+                        <a:rPr lang="es-ES" b="1" dirty="0">
+                          <a:solidFill>
+                            <a:schemeClr val="tx1"/>
+                          </a:solidFill>
+                        </a:rPr>
+                        <a:t> </a:t>
+                      </a:r>
+                      <a:r>
+                        <a:rPr lang="es-ES" b="1" dirty="0" err="1">
+                          <a:solidFill>
+                            <a:schemeClr val="tx1"/>
+                          </a:solidFill>
+                        </a:rPr>
+                        <a:t>temp</a:t>
+                      </a:r>
+                      <a:r>
+                        <a:rPr lang="es-ES" b="1" dirty="0">
+                          <a:solidFill>
+                            <a:schemeClr val="tx1"/>
+                          </a:solidFill>
+                        </a:rPr>
+                        <a:t>.)</a:t>
+                      </a:r>
+                    </a:p>
+                  </a:txBody>
+                  <a:tcPr anchor="ctr">
+                    <a:noFill/>
+                  </a:tcPr>
+                </a:tc>
+                <a:tc>
+                  <a:txBody>
+                    <a:bodyPr/>
+                    <a:lstStyle/>
+                    <a:p>
+                      <a:pPr algn="ctr"/>
+                      <a:r>
+                        <a:rPr lang="es-ES" b="1" dirty="0">
+                          <a:solidFill>
+                            <a:schemeClr val="tx1"/>
+                          </a:solidFill>
+                        </a:rPr>
+                        <a:t>T</a:t>
+                      </a:r>
+                    </a:p>
+                    <a:p>
+                      <a:pPr algn="ctr"/>
+                      <a:r>
+                        <a:rPr lang="es-ES" b="1" dirty="0">
+                          <a:solidFill>
+                            <a:schemeClr val="tx1"/>
+                          </a:solidFill>
+                        </a:rPr>
+                        <a:t>(</a:t>
+                      </a:r>
+                      <a:r>
+                        <a:rPr lang="es-ES" b="1" dirty="0" err="1">
+                          <a:solidFill>
+                            <a:schemeClr val="tx1"/>
+                          </a:solidFill>
+                        </a:rPr>
+                        <a:t>Move</a:t>
+                      </a:r>
+                      <a:r>
+                        <a:rPr lang="es-ES" b="1" dirty="0">
+                          <a:solidFill>
+                            <a:schemeClr val="tx1"/>
+                          </a:solidFill>
+                        </a:rPr>
+                        <a:t> </a:t>
+                      </a:r>
+                      <a:r>
+                        <a:rPr lang="es-ES" b="1" dirty="0" err="1">
+                          <a:solidFill>
+                            <a:schemeClr val="tx1"/>
+                          </a:solidFill>
+                        </a:rPr>
+                        <a:t>tool</a:t>
+                      </a:r>
+                      <a:r>
+                        <a:rPr lang="es-ES" b="1" dirty="0">
+                          <a:solidFill>
+                            <a:schemeClr val="tx1"/>
+                          </a:solidFill>
+                        </a:rPr>
+                        <a:t> </a:t>
+                      </a:r>
+                      <a:r>
+                        <a:rPr lang="es-ES" b="1" dirty="0" err="1">
+                          <a:solidFill>
+                            <a:schemeClr val="tx1"/>
+                          </a:solidFill>
+                        </a:rPr>
+                        <a:t>temp</a:t>
+                      </a:r>
+                      <a:r>
+                        <a:rPr lang="es-ES" b="1" dirty="0">
+                          <a:solidFill>
+                            <a:schemeClr val="tx1"/>
+                          </a:solidFill>
+                        </a:rPr>
+                        <a:t>.)</a:t>
+                      </a:r>
+                    </a:p>
+                  </a:txBody>
+                  <a:tcPr anchor="ctr">
+                    <a:noFill/>
+                  </a:tcPr>
+                </a:tc>
+                <a:tc>
+                  <a:txBody>
+                    <a:bodyPr/>
+                    <a:lstStyle/>
+                    <a:p>
+                      <a:pPr algn="ctr"/>
+                      <a:r>
+                        <a:rPr lang="es-ES" b="1" dirty="0" err="1">
+                          <a:solidFill>
+                            <a:schemeClr val="tx1"/>
+                          </a:solidFill>
+                        </a:rPr>
+                        <a:t>Ctrl</a:t>
+                      </a:r>
+                      <a:r>
+                        <a:rPr lang="es-ES" b="1" dirty="0">
+                          <a:solidFill>
+                            <a:schemeClr val="tx1"/>
+                          </a:solidFill>
+                        </a:rPr>
+                        <a:t>-D</a:t>
+                      </a:r>
+                    </a:p>
+                    <a:p>
+                      <a:pPr algn="ctr"/>
+                      <a:r>
+                        <a:rPr lang="es-ES" b="1" dirty="0">
+                          <a:solidFill>
+                            <a:schemeClr val="tx1"/>
+                          </a:solidFill>
+                        </a:rPr>
+                        <a:t>(</a:t>
+                      </a:r>
+                      <a:r>
+                        <a:rPr lang="es-ES" b="1" dirty="0" err="1">
+                          <a:solidFill>
+                            <a:schemeClr val="tx1"/>
+                          </a:solidFill>
+                        </a:rPr>
+                        <a:t>Deselect</a:t>
+                      </a:r>
+                      <a:r>
+                        <a:rPr lang="es-ES" b="1" dirty="0">
+                          <a:solidFill>
+                            <a:schemeClr val="tx1"/>
+                          </a:solidFill>
+                        </a:rPr>
+                        <a:t>)</a:t>
+                      </a:r>
+                    </a:p>
+                  </a:txBody>
+                  <a:tcPr anchor="ctr">
+                    <a:noFill/>
+                  </a:tcPr>
+                </a:tc>
+                <a:tc>
+                  <a:txBody>
+                    <a:bodyPr/>
+                    <a:lstStyle/>
+                    <a:p>
+                      <a:pPr algn="ctr"/>
+                      <a:endParaRPr lang="es-ES" b="1" dirty="0">
+                        <a:solidFill>
+                          <a:schemeClr val="tx1"/>
+                        </a:solidFill>
+                      </a:endParaRPr>
+                    </a:p>
+                    <a:p>
+                      <a:pPr algn="ctr"/>
+                      <a:r>
+                        <a:rPr lang="es-ES" b="1" dirty="0">
+                          <a:solidFill>
+                            <a:schemeClr val="tx1"/>
+                          </a:solidFill>
+                        </a:rPr>
+                        <a:t>SPC</a:t>
+                      </a:r>
+                    </a:p>
+                    <a:p>
+                      <a:pPr algn="ctr"/>
+                      <a:r>
+                        <a:rPr lang="es-ES" b="1" dirty="0">
+                          <a:solidFill>
+                            <a:schemeClr val="tx1"/>
+                          </a:solidFill>
+                        </a:rPr>
+                        <a:t>(Pan </a:t>
+                      </a:r>
+                      <a:r>
+                        <a:rPr lang="es-ES" b="1" dirty="0" err="1">
+                          <a:solidFill>
+                            <a:schemeClr val="tx1"/>
+                          </a:solidFill>
+                        </a:rPr>
+                        <a:t>canvas</a:t>
+                      </a:r>
+                      <a:r>
+                        <a:rPr lang="es-ES" b="1" dirty="0">
+                          <a:solidFill>
+                            <a:schemeClr val="tx1"/>
+                          </a:solidFill>
+                        </a:rPr>
+                        <a:t>)</a:t>
+                      </a:r>
+                    </a:p>
+                    <a:p>
+                      <a:pPr algn="ctr"/>
+                      <a:endParaRPr lang="es-ES" b="1" dirty="0">
+                        <a:solidFill>
+                          <a:schemeClr val="tx1"/>
+                        </a:solidFill>
+                      </a:endParaRPr>
+                    </a:p>
+                  </a:txBody>
+                  <a:tcPr anchor="ctr">
+                    <a:noFill/>
+                  </a:tcPr>
+                </a:tc>
+                <a:extLst>
+                  <a:ext uri="{0D108BD9-81ED-4DB2-BD59-A6C34878D82A}">
+                    <a16:rowId xmlns:a16="http://schemas.microsoft.com/office/drawing/2014/main" val="1942957527"/>
+                  </a:ext>
+                </a:extLst>
+              </a:tr>
+              <a:tr h="1181731">
+                <a:tc>
+                  <a:txBody>
+                    <a:bodyPr/>
+                    <a:lstStyle/>
+                    <a:p>
+                      <a:pPr algn="ctr"/>
+                      <a:r>
+                        <a:rPr lang="es-ES" b="1" dirty="0">
+                          <a:solidFill>
+                            <a:schemeClr val="tx1"/>
+                          </a:solidFill>
+                        </a:rPr>
+                        <a:t>S</a:t>
+                      </a:r>
+                    </a:p>
+                    <a:p>
+                      <a:pPr algn="ctr"/>
+                      <a:r>
+                        <a:rPr lang="es-ES" b="1" dirty="0">
+                          <a:solidFill>
+                            <a:schemeClr val="tx1"/>
+                          </a:solidFill>
+                        </a:rPr>
+                        <a:t>(</a:t>
+                      </a:r>
+                      <a:r>
+                        <a:rPr lang="es-ES" b="1">
+                          <a:solidFill>
+                            <a:schemeClr val="tx1"/>
+                          </a:solidFill>
+                        </a:rPr>
+                        <a:t>Isolate </a:t>
+                      </a:r>
+                      <a:r>
+                        <a:rPr lang="es-ES" b="1" dirty="0" err="1">
+                          <a:solidFill>
+                            <a:schemeClr val="tx1"/>
+                          </a:solidFill>
+                        </a:rPr>
+                        <a:t>layer</a:t>
+                      </a:r>
+                      <a:r>
+                        <a:rPr lang="es-ES" b="1" dirty="0">
+                          <a:solidFill>
+                            <a:schemeClr val="tx1"/>
+                          </a:solidFill>
+                        </a:rPr>
+                        <a:t>)</a:t>
+                      </a:r>
+                    </a:p>
+                  </a:txBody>
+                  <a:tcPr anchor="ctr">
+                    <a:noFill/>
+                  </a:tcPr>
+                </a:tc>
+                <a:tc>
+                  <a:txBody>
+                    <a:bodyPr/>
+                    <a:lstStyle/>
+                    <a:p>
+                      <a:pPr algn="ctr"/>
+                      <a:endParaRPr lang="es-ES" b="1" dirty="0">
+                        <a:solidFill>
+                          <a:schemeClr val="tx1"/>
+                        </a:solidFill>
+                      </a:endParaRPr>
+                    </a:p>
+                    <a:p>
+                      <a:pPr algn="ctr"/>
+                      <a:r>
+                        <a:rPr lang="es-ES" b="1" dirty="0">
+                          <a:solidFill>
+                            <a:schemeClr val="tx1"/>
+                          </a:solidFill>
+                        </a:rPr>
+                        <a:t>R</a:t>
+                      </a:r>
+                    </a:p>
+                    <a:p>
+                      <a:pPr algn="ctr"/>
+                      <a:r>
+                        <a:rPr lang="es-ES" b="1" dirty="0">
+                          <a:solidFill>
+                            <a:schemeClr val="tx1"/>
+                          </a:solidFill>
+                        </a:rPr>
+                        <a:t>(</a:t>
+                      </a:r>
+                      <a:r>
+                        <a:rPr lang="es-ES" b="1" dirty="0" err="1">
+                          <a:solidFill>
+                            <a:schemeClr val="tx1"/>
+                          </a:solidFill>
+                        </a:rPr>
+                        <a:t>Select</a:t>
+                      </a:r>
+                      <a:r>
+                        <a:rPr lang="es-ES" b="1" dirty="0">
+                          <a:solidFill>
+                            <a:schemeClr val="tx1"/>
+                          </a:solidFill>
+                        </a:rPr>
+                        <a:t> </a:t>
+                      </a:r>
+                      <a:r>
+                        <a:rPr lang="es-ES" b="1" dirty="0" err="1">
+                          <a:solidFill>
+                            <a:schemeClr val="tx1"/>
+                          </a:solidFill>
+                        </a:rPr>
+                        <a:t>layer</a:t>
+                      </a:r>
+                      <a:r>
+                        <a:rPr lang="es-ES" b="1" dirty="0">
+                          <a:solidFill>
+                            <a:schemeClr val="tx1"/>
+                          </a:solidFill>
+                        </a:rPr>
+                        <a:t>)</a:t>
+                      </a:r>
+                    </a:p>
+                    <a:p>
+                      <a:pPr algn="ctr"/>
+                      <a:endParaRPr lang="es-ES" b="1" dirty="0">
+                        <a:solidFill>
+                          <a:schemeClr val="tx1"/>
+                        </a:solidFill>
+                      </a:endParaRPr>
+                    </a:p>
+                  </a:txBody>
+                  <a:tcPr anchor="ctr">
+                    <a:noFill/>
+                  </a:tcPr>
+                </a:tc>
+                <a:tc>
+                  <a:txBody>
+                    <a:bodyPr/>
+                    <a:lstStyle/>
+                    <a:p>
+                      <a:pPr algn="ctr"/>
+                      <a:endParaRPr lang="es-ES" b="1" dirty="0">
+                        <a:solidFill>
+                          <a:schemeClr val="tx1"/>
+                        </a:solidFill>
+                      </a:endParaRPr>
+                    </a:p>
+                  </a:txBody>
+                  <a:tcPr anchor="ctr">
+                    <a:noFill/>
+                  </a:tcPr>
+                </a:tc>
+                <a:tc>
+                  <a:txBody>
+                    <a:bodyPr/>
+                    <a:lstStyle/>
+                    <a:p>
+                      <a:pPr algn="ctr"/>
+                      <a:endParaRPr lang="es-ES" b="1" dirty="0">
+                        <a:solidFill>
+                          <a:schemeClr val="tx1"/>
+                        </a:solidFill>
+                      </a:endParaRPr>
+                    </a:p>
+                    <a:p>
+                      <a:pPr algn="ctr"/>
+                      <a:endParaRPr lang="es-ES" b="1" dirty="0">
+                        <a:solidFill>
+                          <a:schemeClr val="tx1"/>
+                        </a:solidFill>
+                      </a:endParaRPr>
+                    </a:p>
+                  </a:txBody>
+                  <a:tcPr anchor="ctr">
+                    <a:noFill/>
+                  </a:tcPr>
+                </a:tc>
+                <a:extLst>
+                  <a:ext uri="{0D108BD9-81ED-4DB2-BD59-A6C34878D82A}">
+                    <a16:rowId xmlns:a16="http://schemas.microsoft.com/office/drawing/2014/main" val="3370062836"/>
+                  </a:ext>
+                </a:extLst>
+              </a:tr>
+              <a:tr h="1181731">
+                <a:tc>
+                  <a:txBody>
+                    <a:bodyPr/>
+                    <a:lstStyle/>
+                    <a:p>
+                      <a:pPr algn="ctr"/>
+                      <a:r>
+                        <a:rPr lang="es-ES" b="1" dirty="0">
+                          <a:solidFill>
+                            <a:schemeClr val="tx1"/>
+                          </a:solidFill>
+                        </a:rPr>
+                        <a:t>/</a:t>
+                      </a:r>
+                    </a:p>
+                    <a:p>
+                      <a:pPr algn="ctr"/>
+                      <a:r>
+                        <a:rPr lang="es-ES" b="1" dirty="0">
+                          <a:solidFill>
+                            <a:schemeClr val="tx1"/>
+                          </a:solidFill>
+                        </a:rPr>
+                        <a:t>(</a:t>
+                      </a:r>
+                      <a:r>
+                        <a:rPr lang="es-ES" b="1" dirty="0" err="1">
+                          <a:solidFill>
+                            <a:schemeClr val="tx1"/>
+                          </a:solidFill>
+                        </a:rPr>
+                        <a:t>Previous</a:t>
+                      </a:r>
+                      <a:r>
+                        <a:rPr lang="es-ES" b="1" dirty="0">
+                          <a:solidFill>
+                            <a:schemeClr val="tx1"/>
+                          </a:solidFill>
+                        </a:rPr>
+                        <a:t> </a:t>
+                      </a:r>
+                      <a:r>
+                        <a:rPr lang="es-ES" b="1" dirty="0" err="1">
+                          <a:solidFill>
+                            <a:schemeClr val="tx1"/>
+                          </a:solidFill>
+                        </a:rPr>
+                        <a:t>preset</a:t>
+                      </a:r>
+                      <a:r>
+                        <a:rPr lang="es-ES" b="1" dirty="0">
+                          <a:solidFill>
+                            <a:schemeClr val="tx1"/>
+                          </a:solidFill>
+                        </a:rPr>
+                        <a:t>)</a:t>
+                      </a:r>
+                    </a:p>
+                  </a:txBody>
+                  <a:tcPr anchor="ctr">
+                    <a:noFill/>
+                  </a:tcPr>
+                </a:tc>
+                <a:tc>
+                  <a:txBody>
+                    <a:bodyPr/>
+                    <a:lstStyle/>
+                    <a:p>
+                      <a:pPr algn="ctr"/>
+                      <a:r>
+                        <a:rPr lang="es-ES" b="1" dirty="0" err="1">
+                          <a:solidFill>
+                            <a:schemeClr val="tx1"/>
+                          </a:solidFill>
+                        </a:rPr>
+                        <a:t>Ctrl</a:t>
+                      </a:r>
+                      <a:r>
+                        <a:rPr lang="es-ES" b="1" dirty="0">
+                          <a:solidFill>
+                            <a:schemeClr val="tx1"/>
+                          </a:solidFill>
+                        </a:rPr>
+                        <a:t> &lt;</a:t>
+                      </a:r>
+                    </a:p>
+                    <a:p>
+                      <a:pPr algn="ctr"/>
+                      <a:r>
+                        <a:rPr lang="es-ES" b="1" dirty="0">
+                          <a:solidFill>
+                            <a:schemeClr val="tx1"/>
+                          </a:solidFill>
+                        </a:rPr>
+                        <a:t>(</a:t>
+                      </a:r>
+                      <a:r>
+                        <a:rPr lang="es-ES" b="1" dirty="0" err="1">
+                          <a:solidFill>
+                            <a:schemeClr val="tx1"/>
+                          </a:solidFill>
+                        </a:rPr>
+                        <a:t>Shade</a:t>
+                      </a:r>
+                      <a:r>
+                        <a:rPr lang="es-ES" b="1" dirty="0">
+                          <a:solidFill>
+                            <a:schemeClr val="tx1"/>
+                          </a:solidFill>
+                        </a:rPr>
+                        <a:t> color selector)</a:t>
+                      </a:r>
+                    </a:p>
+                  </a:txBody>
+                  <a:tcPr anchor="ctr">
+                    <a:noFill/>
+                  </a:tcPr>
+                </a:tc>
+                <a:tc>
+                  <a:txBody>
+                    <a:bodyPr/>
+                    <a:lstStyle/>
+                    <a:p>
+                      <a:pPr algn="ctr"/>
+                      <a:endParaRPr lang="es-ES" b="1">
+                        <a:solidFill>
+                          <a:schemeClr val="tx1"/>
+                        </a:solidFill>
+                      </a:endParaRPr>
+                    </a:p>
+                  </a:txBody>
+                  <a:tcPr anchor="ctr">
+                    <a:noFill/>
+                  </a:tcPr>
+                </a:tc>
+                <a:tc>
+                  <a:txBody>
+                    <a:bodyPr/>
+                    <a:lstStyle/>
+                    <a:p>
+                      <a:pPr algn="ctr"/>
+                      <a:r>
+                        <a:rPr lang="es-ES" b="1" dirty="0" err="1">
+                          <a:solidFill>
+                            <a:schemeClr val="tx1"/>
+                          </a:solidFill>
+                        </a:rPr>
+                        <a:t>Tab</a:t>
+                      </a:r>
+                      <a:endParaRPr lang="es-ES" b="1" dirty="0">
+                        <a:solidFill>
+                          <a:schemeClr val="tx1"/>
+                        </a:solidFill>
+                      </a:endParaRPr>
+                    </a:p>
+                    <a:p>
+                      <a:pPr algn="ctr"/>
+                      <a:r>
+                        <a:rPr lang="es-ES" b="1" dirty="0">
+                          <a:solidFill>
+                            <a:schemeClr val="tx1"/>
+                          </a:solidFill>
+                        </a:rPr>
+                        <a:t>(</a:t>
+                      </a:r>
+                      <a:r>
+                        <a:rPr lang="es-ES" b="1" dirty="0" err="1">
+                          <a:solidFill>
+                            <a:schemeClr val="tx1"/>
+                          </a:solidFill>
+                        </a:rPr>
+                        <a:t>Only</a:t>
+                      </a:r>
+                      <a:r>
+                        <a:rPr lang="es-ES" b="1" dirty="0">
+                          <a:solidFill>
+                            <a:schemeClr val="tx1"/>
+                          </a:solidFill>
+                        </a:rPr>
+                        <a:t> </a:t>
+                      </a:r>
+                      <a:r>
+                        <a:rPr lang="es-ES" b="1" dirty="0" err="1">
+                          <a:solidFill>
+                            <a:schemeClr val="tx1"/>
+                          </a:solidFill>
+                        </a:rPr>
+                        <a:t>canvas</a:t>
+                      </a:r>
+                      <a:r>
+                        <a:rPr lang="es-ES" b="1" dirty="0">
+                          <a:solidFill>
+                            <a:schemeClr val="tx1"/>
+                          </a:solidFill>
+                        </a:rPr>
+                        <a:t>)</a:t>
+                      </a:r>
+                    </a:p>
+                  </a:txBody>
+                  <a:tcPr anchor="ctr">
+                    <a:noFill/>
+                  </a:tcPr>
+                </a:tc>
+                <a:extLst>
+                  <a:ext uri="{0D108BD9-81ED-4DB2-BD59-A6C34878D82A}">
+                    <a16:rowId xmlns:a16="http://schemas.microsoft.com/office/drawing/2014/main" val="3650298452"/>
+                  </a:ext>
+                </a:extLst>
+              </a:tr>
+              <a:tr h="1181731">
+                <a:tc>
+                  <a:txBody>
+                    <a:bodyPr/>
+                    <a:lstStyle/>
+                    <a:p>
+                      <a:pPr algn="ctr"/>
+                      <a:endParaRPr lang="es-ES" b="1" dirty="0">
+                        <a:solidFill>
+                          <a:schemeClr val="tx1"/>
+                        </a:solidFill>
+                      </a:endParaRPr>
+                    </a:p>
+                  </a:txBody>
+                  <a:tcPr anchor="ctr">
+                    <a:noFill/>
+                  </a:tcPr>
+                </a:tc>
+                <a:tc>
+                  <a:txBody>
+                    <a:bodyPr/>
+                    <a:lstStyle/>
+                    <a:p>
+                      <a:pPr algn="ctr"/>
+                      <a:r>
+                        <a:rPr lang="es-ES" b="1" dirty="0" err="1">
+                          <a:solidFill>
+                            <a:schemeClr val="tx1"/>
+                          </a:solidFill>
+                        </a:rPr>
+                        <a:t>Ctrl</a:t>
+                      </a:r>
+                      <a:r>
+                        <a:rPr lang="es-ES" b="1" dirty="0">
+                          <a:solidFill>
+                            <a:schemeClr val="tx1"/>
+                          </a:solidFill>
+                        </a:rPr>
+                        <a:t> Z</a:t>
+                      </a:r>
+                    </a:p>
+                    <a:p>
+                      <a:pPr algn="ctr"/>
+                      <a:r>
+                        <a:rPr lang="es-ES" b="1" dirty="0">
+                          <a:solidFill>
+                            <a:schemeClr val="tx1"/>
+                          </a:solidFill>
+                        </a:rPr>
+                        <a:t>(</a:t>
+                      </a:r>
+                      <a:r>
+                        <a:rPr lang="es-ES" b="1" dirty="0" err="1">
+                          <a:solidFill>
+                            <a:schemeClr val="tx1"/>
+                          </a:solidFill>
+                        </a:rPr>
+                        <a:t>Undo</a:t>
+                      </a:r>
+                      <a:r>
+                        <a:rPr lang="es-ES" b="1" dirty="0">
+                          <a:solidFill>
+                            <a:schemeClr val="tx1"/>
+                          </a:solidFill>
+                        </a:rPr>
+                        <a:t>)</a:t>
+                      </a:r>
+                    </a:p>
+                  </a:txBody>
+                  <a:tcPr anchor="ctr">
+                    <a:noFill/>
+                  </a:tcPr>
+                </a:tc>
+                <a:tc>
+                  <a:txBody>
+                    <a:bodyPr/>
+                    <a:lstStyle/>
+                    <a:p>
+                      <a:pPr algn="ctr"/>
+                      <a:r>
+                        <a:rPr lang="es-ES" b="1" dirty="0">
+                          <a:solidFill>
+                            <a:schemeClr val="tx1"/>
+                          </a:solidFill>
+                        </a:rPr>
+                        <a:t>Alt Z</a:t>
+                      </a:r>
+                    </a:p>
+                    <a:p>
+                      <a:pPr algn="ctr"/>
+                      <a:r>
+                        <a:rPr lang="es-ES" b="1" dirty="0">
+                          <a:solidFill>
+                            <a:schemeClr val="tx1"/>
+                          </a:solidFill>
+                        </a:rPr>
+                        <a:t>(Redo)</a:t>
+                      </a:r>
+                    </a:p>
+                  </a:txBody>
+                  <a:tcPr anchor="ctr">
+                    <a:noFill/>
+                  </a:tcPr>
+                </a:tc>
+                <a:tc>
+                  <a:txBody>
+                    <a:bodyPr/>
+                    <a:lstStyle/>
+                    <a:p>
+                      <a:pPr algn="ctr"/>
+                      <a:endParaRPr lang="es-ES" b="1" dirty="0">
+                        <a:solidFill>
+                          <a:schemeClr val="tx1"/>
+                        </a:solidFill>
+                      </a:endParaRPr>
+                    </a:p>
+                    <a:p>
+                      <a:pPr algn="ctr"/>
+                      <a:r>
+                        <a:rPr lang="es-ES" b="1" dirty="0" err="1">
+                          <a:solidFill>
+                            <a:schemeClr val="tx1"/>
+                          </a:solidFill>
+                        </a:rPr>
+                        <a:t>Ctrl</a:t>
+                      </a:r>
+                      <a:endParaRPr lang="es-ES" b="1" dirty="0">
+                        <a:solidFill>
+                          <a:schemeClr val="tx1"/>
+                        </a:solidFill>
+                      </a:endParaRPr>
+                    </a:p>
+                    <a:p>
+                      <a:pPr algn="ctr"/>
+                      <a:r>
+                        <a:rPr lang="es-ES" b="1" dirty="0">
+                          <a:solidFill>
+                            <a:schemeClr val="tx1"/>
+                          </a:solidFill>
+                        </a:rPr>
+                        <a:t>(Color </a:t>
+                      </a:r>
+                      <a:r>
+                        <a:rPr lang="es-ES" b="1" dirty="0" err="1">
+                          <a:solidFill>
+                            <a:schemeClr val="tx1"/>
+                          </a:solidFill>
+                        </a:rPr>
+                        <a:t>picker</a:t>
+                      </a:r>
+                      <a:r>
+                        <a:rPr lang="es-ES" b="1" dirty="0">
+                          <a:solidFill>
+                            <a:schemeClr val="tx1"/>
+                          </a:solidFill>
+                        </a:rPr>
+                        <a:t>)</a:t>
+                      </a:r>
+                    </a:p>
+                    <a:p>
+                      <a:pPr algn="ctr"/>
+                      <a:endParaRPr lang="es-ES" b="1" dirty="0">
+                        <a:solidFill>
+                          <a:schemeClr val="tx1"/>
+                        </a:solidFill>
+                      </a:endParaRPr>
+                    </a:p>
+                  </a:txBody>
+                  <a:tcPr anchor="ctr">
+                    <a:noFill/>
+                  </a:tcPr>
+                </a:tc>
+                <a:extLst>
+                  <a:ext uri="{0D108BD9-81ED-4DB2-BD59-A6C34878D82A}">
+                    <a16:rowId xmlns:a16="http://schemas.microsoft.com/office/drawing/2014/main" val="1648013763"/>
+                  </a:ext>
+                </a:extLst>
+              </a:tr>
+            </a:tbl>
+          </a:graphicData>
+        </a:graphic>
+      </p:graphicFrame>
+      <p:sp>
+        <p:nvSpPr>
+          <p:cNvPr id="6" name="Elipse 5">
+            <a:extLst>
+              <a:ext uri="{FF2B5EF4-FFF2-40B4-BE49-F238E27FC236}">
+                <a16:creationId xmlns:a16="http://schemas.microsoft.com/office/drawing/2014/main" id="{FFEBBBF0-B498-A520-A5AC-63EFE62A4DBB}"/>
+              </a:ext>
+            </a:extLst>
+          </p:cNvPr>
+          <p:cNvSpPr/>
+          <p:nvPr/>
+        </p:nvSpPr>
+        <p:spPr>
+          <a:xfrm>
+            <a:off x="8088297" y="1755091"/>
+            <a:ext cx="1526220" cy="1508763"/>
+          </a:xfrm>
+          <a:prstGeom prst="ellipse">
+            <a:avLst/>
+          </a:prstGeom>
+        </p:spPr>
+        <p:style>
+          <a:lnRef idx="2">
+            <a:schemeClr val="accent1">
+              <a:shade val="50000"/>
+            </a:schemeClr>
+          </a:lnRef>
+          <a:fillRef idx="1">
+            <a:schemeClr val="accent1"/>
+          </a:fillRef>
+          <a:effectRef idx="0">
+            <a:schemeClr val="accent1"/>
+          </a:effectRef>
+          <a:fontRef idx="minor">
+            <a:schemeClr val="lt1"/>
+          </a:fontRef>
+        </p:style>
+        <p:txBody>
+          <a:bodyPr rtlCol="0" anchor="ctr"/>
+          <a:lstStyle/>
+          <a:p>
+            <a:pPr marL="342900" indent="-342900" algn="ctr">
+              <a:buAutoNum type="arabicPlain" startAt="4"/>
+            </a:pPr>
+            <a:r>
+              <a:rPr lang="es-ES" b="1" dirty="0">
+                <a:solidFill>
+                  <a:schemeClr val="tx1"/>
+                </a:solidFill>
+              </a:rPr>
+              <a:t>  6</a:t>
+            </a:r>
+          </a:p>
+          <a:p>
+            <a:pPr marL="342900" indent="-342900" algn="ctr">
+              <a:buAutoNum type="arabicPlain" startAt="4"/>
+            </a:pPr>
+            <a:endParaRPr lang="es-ES" b="1" dirty="0">
+              <a:solidFill>
+                <a:schemeClr val="tx1"/>
+              </a:solidFill>
+            </a:endParaRPr>
+          </a:p>
+          <a:p>
+            <a:pPr algn="ctr"/>
+            <a:r>
+              <a:rPr lang="es-ES" dirty="0" err="1"/>
+              <a:t>Rotate</a:t>
+            </a:r>
+            <a:endParaRPr lang="es-ES" dirty="0"/>
+          </a:p>
+          <a:p>
+            <a:pPr algn="ctr"/>
+            <a:r>
+              <a:rPr lang="es-ES" dirty="0" err="1"/>
+              <a:t>canvas</a:t>
+            </a:r>
+            <a:endParaRPr lang="es-ES" dirty="0"/>
+          </a:p>
+        </p:txBody>
+      </p:sp>
+      <p:sp>
+        <p:nvSpPr>
+          <p:cNvPr id="7" name="Elipse 6">
+            <a:extLst>
+              <a:ext uri="{FF2B5EF4-FFF2-40B4-BE49-F238E27FC236}">
+                <a16:creationId xmlns:a16="http://schemas.microsoft.com/office/drawing/2014/main" id="{8C18D28F-F00C-1DF9-20DC-B654E00BD93C}"/>
+              </a:ext>
+            </a:extLst>
+          </p:cNvPr>
+          <p:cNvSpPr/>
+          <p:nvPr/>
+        </p:nvSpPr>
+        <p:spPr>
+          <a:xfrm>
+            <a:off x="8088297" y="4984111"/>
+            <a:ext cx="1526220" cy="1508763"/>
+          </a:xfrm>
+          <a:prstGeom prst="ellipse">
+            <a:avLst/>
+          </a:prstGeom>
+        </p:spPr>
+        <p:style>
+          <a:lnRef idx="2">
+            <a:schemeClr val="accent1">
+              <a:shade val="50000"/>
+            </a:schemeClr>
+          </a:lnRef>
+          <a:fillRef idx="1">
+            <a:schemeClr val="accent1"/>
+          </a:fillRef>
+          <a:effectRef idx="0">
+            <a:schemeClr val="accent1"/>
+          </a:effectRef>
+          <a:fontRef idx="minor">
+            <a:schemeClr val="lt1"/>
+          </a:fontRef>
+        </p:style>
+        <p:txBody>
+          <a:bodyPr rtlCol="0" anchor="ctr"/>
+          <a:lstStyle/>
+          <a:p>
+            <a:pPr algn="ctr"/>
+            <a:r>
+              <a:rPr lang="es-ES" b="1" dirty="0">
+                <a:solidFill>
+                  <a:schemeClr val="tx1"/>
+                </a:solidFill>
+              </a:rPr>
+              <a:t>7      9</a:t>
+            </a:r>
+          </a:p>
+          <a:p>
+            <a:pPr algn="ctr"/>
+            <a:endParaRPr lang="es-ES" dirty="0"/>
+          </a:p>
+          <a:p>
+            <a:pPr algn="ctr"/>
+            <a:r>
+              <a:rPr lang="es-ES" dirty="0"/>
+              <a:t>Brush </a:t>
+            </a:r>
+            <a:r>
+              <a:rPr lang="es-ES" dirty="0" err="1"/>
+              <a:t>size</a:t>
+            </a:r>
+            <a:endParaRPr lang="es-ES" dirty="0"/>
+          </a:p>
+        </p:txBody>
+      </p:sp>
+      <p:sp>
+        <p:nvSpPr>
+          <p:cNvPr id="8" name="Elipse 7">
+            <a:extLst>
+              <a:ext uri="{FF2B5EF4-FFF2-40B4-BE49-F238E27FC236}">
+                <a16:creationId xmlns:a16="http://schemas.microsoft.com/office/drawing/2014/main" id="{D293218C-13D0-60EB-47E2-D05389D8EF6B}"/>
+              </a:ext>
+            </a:extLst>
+          </p:cNvPr>
+          <p:cNvSpPr/>
+          <p:nvPr/>
+        </p:nvSpPr>
+        <p:spPr>
+          <a:xfrm>
+            <a:off x="8088297" y="3369601"/>
+            <a:ext cx="1526220" cy="1508763"/>
+          </a:xfrm>
+          <a:prstGeom prst="ellipse">
+            <a:avLst/>
+          </a:prstGeom>
+        </p:spPr>
+        <p:style>
+          <a:lnRef idx="2">
+            <a:schemeClr val="accent1">
+              <a:shade val="50000"/>
+            </a:schemeClr>
+          </a:lnRef>
+          <a:fillRef idx="1">
+            <a:schemeClr val="accent1"/>
+          </a:fillRef>
+          <a:effectRef idx="0">
+            <a:schemeClr val="accent1"/>
+          </a:effectRef>
+          <a:fontRef idx="minor">
+            <a:schemeClr val="lt1"/>
+          </a:fontRef>
+        </p:style>
+        <p:txBody>
+          <a:bodyPr rtlCol="0" anchor="ctr"/>
+          <a:lstStyle/>
+          <a:p>
+            <a:pPr algn="ctr"/>
+            <a:r>
+              <a:rPr lang="es-ES" b="1" dirty="0">
+                <a:solidFill>
+                  <a:schemeClr val="tx1"/>
+                </a:solidFill>
+              </a:rPr>
+              <a:t>-        +</a:t>
+            </a:r>
+          </a:p>
+          <a:p>
+            <a:pPr algn="ctr"/>
+            <a:endParaRPr lang="es-ES" b="1" dirty="0">
+              <a:solidFill>
+                <a:schemeClr val="tx1"/>
+              </a:solidFill>
+            </a:endParaRPr>
+          </a:p>
+          <a:p>
+            <a:pPr algn="ctr"/>
+            <a:r>
+              <a:rPr lang="es-ES" dirty="0"/>
+              <a:t>Zoom</a:t>
+            </a:r>
+          </a:p>
+          <a:p>
+            <a:pPr algn="ctr"/>
+            <a:r>
+              <a:rPr lang="es-ES" dirty="0" err="1"/>
+              <a:t>canvas</a:t>
+            </a:r>
+            <a:endParaRPr lang="es-ES" dirty="0"/>
+          </a:p>
+        </p:txBody>
+      </p:sp>
+      <p:sp>
+        <p:nvSpPr>
+          <p:cNvPr id="9" name="CuadroTexto 8">
+            <a:extLst>
+              <a:ext uri="{FF2B5EF4-FFF2-40B4-BE49-F238E27FC236}">
+                <a16:creationId xmlns:a16="http://schemas.microsoft.com/office/drawing/2014/main" id="{0B5DE58B-5085-0A9E-F2C8-BE967A620B0F}"/>
+              </a:ext>
+            </a:extLst>
+          </p:cNvPr>
+          <p:cNvSpPr txBox="1"/>
+          <p:nvPr/>
+        </p:nvSpPr>
+        <p:spPr>
+          <a:xfrm>
+            <a:off x="9721787" y="2133770"/>
+            <a:ext cx="2067758" cy="646331"/>
+          </a:xfrm>
+          <a:prstGeom prst="rect">
+            <a:avLst/>
+          </a:prstGeom>
+          <a:noFill/>
+        </p:spPr>
+        <p:txBody>
+          <a:bodyPr wrap="square" rtlCol="0">
+            <a:spAutoFit/>
+          </a:bodyPr>
+          <a:lstStyle/>
+          <a:p>
+            <a:r>
+              <a:rPr lang="es-ES" b="1" i="1" dirty="0" err="1">
+                <a:gradFill flip="none" rotWithShape="1">
+                  <a:gsLst>
+                    <a:gs pos="35000">
+                      <a:srgbClr val="E0A883"/>
+                    </a:gs>
+                    <a:gs pos="0">
+                      <a:schemeClr val="accent2">
+                        <a:lumMod val="40000"/>
+                        <a:lumOff val="60000"/>
+                      </a:schemeClr>
+                    </a:gs>
+                    <a:gs pos="100000">
+                      <a:schemeClr val="accent2">
+                        <a:lumMod val="60000"/>
+                      </a:schemeClr>
+                    </a:gs>
+                  </a:gsLst>
+                  <a:lin ang="16200000" scaled="0"/>
+                  <a:tileRect/>
+                </a:gradFill>
+              </a:rPr>
+              <a:t>Push</a:t>
+            </a:r>
+            <a:endParaRPr lang="es-ES" b="1" i="1" dirty="0">
+              <a:gradFill flip="none" rotWithShape="1">
+                <a:gsLst>
+                  <a:gs pos="35000">
+                    <a:srgbClr val="E0A883"/>
+                  </a:gs>
+                  <a:gs pos="0">
+                    <a:schemeClr val="accent2">
+                      <a:lumMod val="40000"/>
+                      <a:lumOff val="60000"/>
+                    </a:schemeClr>
+                  </a:gs>
+                  <a:gs pos="100000">
+                    <a:schemeClr val="accent2">
+                      <a:lumMod val="60000"/>
+                    </a:schemeClr>
+                  </a:gs>
+                </a:gsLst>
+                <a:lin ang="16200000" scaled="0"/>
+                <a:tileRect/>
+              </a:gradFill>
+            </a:endParaRPr>
+          </a:p>
+          <a:p>
+            <a:r>
+              <a:rPr lang="es-ES" dirty="0"/>
+              <a:t>5 (</a:t>
+            </a:r>
+            <a:r>
+              <a:rPr lang="es-ES" dirty="0" err="1"/>
+              <a:t>Reset</a:t>
+            </a:r>
+            <a:r>
+              <a:rPr lang="es-ES" dirty="0"/>
+              <a:t> </a:t>
+            </a:r>
+            <a:r>
+              <a:rPr lang="es-ES" dirty="0" err="1"/>
+              <a:t>rotation</a:t>
+            </a:r>
+            <a:r>
+              <a:rPr lang="es-ES" dirty="0"/>
+              <a:t>)</a:t>
+            </a:r>
+          </a:p>
+        </p:txBody>
+      </p:sp>
+      <p:sp>
+        <p:nvSpPr>
+          <p:cNvPr id="12" name="CuadroTexto 11">
+            <a:extLst>
+              <a:ext uri="{FF2B5EF4-FFF2-40B4-BE49-F238E27FC236}">
+                <a16:creationId xmlns:a16="http://schemas.microsoft.com/office/drawing/2014/main" id="{1C222B8E-8DC4-E329-8CEC-01244D5262E6}"/>
+              </a:ext>
+            </a:extLst>
+          </p:cNvPr>
+          <p:cNvSpPr txBox="1"/>
+          <p:nvPr/>
+        </p:nvSpPr>
+        <p:spPr>
+          <a:xfrm>
+            <a:off x="9721787" y="3691448"/>
+            <a:ext cx="2067758" cy="646331"/>
+          </a:xfrm>
+          <a:prstGeom prst="rect">
+            <a:avLst/>
+          </a:prstGeom>
+          <a:noFill/>
+        </p:spPr>
+        <p:txBody>
+          <a:bodyPr wrap="square" rtlCol="0">
+            <a:spAutoFit/>
+          </a:bodyPr>
+          <a:lstStyle/>
+          <a:p>
+            <a:r>
+              <a:rPr lang="es-ES" b="1" i="1" dirty="0" err="1">
+                <a:gradFill flip="none" rotWithShape="1">
+                  <a:gsLst>
+                    <a:gs pos="35000">
+                      <a:srgbClr val="E0A883"/>
+                    </a:gs>
+                    <a:gs pos="0">
+                      <a:schemeClr val="accent2">
+                        <a:lumMod val="40000"/>
+                        <a:lumOff val="60000"/>
+                      </a:schemeClr>
+                    </a:gs>
+                    <a:gs pos="100000">
+                      <a:schemeClr val="accent2">
+                        <a:lumMod val="60000"/>
+                      </a:schemeClr>
+                    </a:gs>
+                  </a:gsLst>
+                  <a:lin ang="16200000" scaled="0"/>
+                  <a:tileRect/>
+                </a:gradFill>
+              </a:rPr>
+              <a:t>Push</a:t>
+            </a:r>
+            <a:endParaRPr lang="es-ES" b="1" i="1" dirty="0">
+              <a:gradFill flip="none" rotWithShape="1">
+                <a:gsLst>
+                  <a:gs pos="35000">
+                    <a:srgbClr val="E0A883"/>
+                  </a:gs>
+                  <a:gs pos="0">
+                    <a:schemeClr val="accent2">
+                      <a:lumMod val="40000"/>
+                      <a:lumOff val="60000"/>
+                    </a:schemeClr>
+                  </a:gs>
+                  <a:gs pos="100000">
+                    <a:schemeClr val="accent2">
+                      <a:lumMod val="60000"/>
+                    </a:schemeClr>
+                  </a:gs>
+                </a:gsLst>
+                <a:lin ang="16200000" scaled="0"/>
+                <a:tileRect/>
+              </a:gradFill>
+            </a:endParaRPr>
+          </a:p>
+          <a:p>
+            <a:r>
+              <a:rPr lang="es-ES" dirty="0"/>
+              <a:t>2 (</a:t>
+            </a:r>
+            <a:r>
+              <a:rPr lang="es-ES" dirty="0" err="1"/>
+              <a:t>Fit</a:t>
+            </a:r>
+            <a:r>
+              <a:rPr lang="es-ES" dirty="0"/>
+              <a:t> page)</a:t>
+            </a:r>
+          </a:p>
+        </p:txBody>
+      </p:sp>
+      <p:sp>
+        <p:nvSpPr>
+          <p:cNvPr id="13" name="CuadroTexto 12">
+            <a:extLst>
+              <a:ext uri="{FF2B5EF4-FFF2-40B4-BE49-F238E27FC236}">
+                <a16:creationId xmlns:a16="http://schemas.microsoft.com/office/drawing/2014/main" id="{F5D9CC27-A10A-90F2-C458-E8E9F2B58BC4}"/>
+              </a:ext>
+            </a:extLst>
+          </p:cNvPr>
+          <p:cNvSpPr txBox="1"/>
+          <p:nvPr/>
+        </p:nvSpPr>
+        <p:spPr>
+          <a:xfrm>
+            <a:off x="9721787" y="5346781"/>
+            <a:ext cx="2067758" cy="646331"/>
+          </a:xfrm>
+          <a:prstGeom prst="rect">
+            <a:avLst/>
+          </a:prstGeom>
+          <a:noFill/>
+        </p:spPr>
+        <p:txBody>
+          <a:bodyPr wrap="square" rtlCol="0">
+            <a:spAutoFit/>
+          </a:bodyPr>
+          <a:lstStyle/>
+          <a:p>
+            <a:r>
+              <a:rPr lang="es-ES" b="1" i="1" dirty="0" err="1">
+                <a:gradFill flip="none" rotWithShape="1">
+                  <a:gsLst>
+                    <a:gs pos="35000">
+                      <a:srgbClr val="E0A883"/>
+                    </a:gs>
+                    <a:gs pos="0">
+                      <a:schemeClr val="accent2">
+                        <a:lumMod val="40000"/>
+                        <a:lumOff val="60000"/>
+                      </a:schemeClr>
+                    </a:gs>
+                    <a:gs pos="100000">
+                      <a:schemeClr val="accent2">
+                        <a:lumMod val="60000"/>
+                      </a:schemeClr>
+                    </a:gs>
+                  </a:gsLst>
+                  <a:lin ang="16200000" scaled="0"/>
+                  <a:tileRect/>
+                </a:gradFill>
+              </a:rPr>
+              <a:t>Push</a:t>
+            </a:r>
+            <a:endParaRPr lang="es-ES" b="1" i="1" dirty="0">
+              <a:gradFill flip="none" rotWithShape="1">
+                <a:gsLst>
+                  <a:gs pos="35000">
+                    <a:srgbClr val="E0A883"/>
+                  </a:gs>
+                  <a:gs pos="0">
+                    <a:schemeClr val="accent2">
+                      <a:lumMod val="40000"/>
+                      <a:lumOff val="60000"/>
+                    </a:schemeClr>
+                  </a:gs>
+                  <a:gs pos="100000">
+                    <a:schemeClr val="accent2">
+                      <a:lumMod val="60000"/>
+                    </a:schemeClr>
+                  </a:gs>
+                </a:gsLst>
+                <a:lin ang="16200000" scaled="0"/>
+                <a:tileRect/>
+              </a:gradFill>
+            </a:endParaRPr>
+          </a:p>
+          <a:p>
+            <a:r>
+              <a:rPr lang="es-ES" dirty="0"/>
+              <a:t>E (</a:t>
+            </a:r>
+            <a:r>
+              <a:rPr lang="es-ES" dirty="0" err="1"/>
+              <a:t>Toggle</a:t>
+            </a:r>
+            <a:r>
+              <a:rPr lang="es-ES" dirty="0"/>
+              <a:t> </a:t>
+            </a:r>
+            <a:r>
+              <a:rPr lang="es-ES" dirty="0" err="1"/>
+              <a:t>eraser</a:t>
+            </a:r>
+            <a:r>
+              <a:rPr lang="es-ES" dirty="0"/>
+              <a:t>)</a:t>
+            </a:r>
+          </a:p>
+        </p:txBody>
+      </p:sp>
+    </p:spTree>
+    <p:extLst>
+      <p:ext uri="{BB962C8B-B14F-4D97-AF65-F5344CB8AC3E}">
+        <p14:creationId xmlns:p14="http://schemas.microsoft.com/office/powerpoint/2010/main" val="4207699659"/>
       </p:ext>
     </p:extLst>
   </p:cSld>
@@ -7184,4 +10258,299 @@
     </a:ext>
   </a:extLst>
 </a:theme>
+</file>
+
+<file path=ppt/theme/theme2.xml><?xml version="1.0" encoding="utf-8"?>
+<a:theme xmlns:a="http://schemas.openxmlformats.org/drawingml/2006/main" name="Tema de Office">
+  <a:themeElements>
+    <a:clrScheme name="Office">
+      <a:dk1>
+        <a:sysClr val="windowText" lastClr="000000"/>
+      </a:dk1>
+      <a:lt1>
+        <a:sysClr val="window" lastClr="FFFFFF"/>
+      </a:lt1>
+      <a:dk2>
+        <a:srgbClr val="44546A"/>
+      </a:dk2>
+      <a:lt2>
+        <a:srgbClr val="E7E6E6"/>
+      </a:lt2>
+      <a:accent1>
+        <a:srgbClr val="4472C4"/>
+      </a:accent1>
+      <a:accent2>
+        <a:srgbClr val="ED7D31"/>
+      </a:accent2>
+      <a:accent3>
+        <a:srgbClr val="A5A5A5"/>
+      </a:accent3>
+      <a:accent4>
+        <a:srgbClr val="FFC000"/>
+      </a:accent4>
+      <a:accent5>
+        <a:srgbClr val="5B9BD5"/>
+      </a:accent5>
+      <a:accent6>
+        <a:srgbClr val="70AD47"/>
+      </a:accent6>
+      <a:hlink>
+        <a:srgbClr val="0563C1"/>
+      </a:hlink>
+      <a:folHlink>
+        <a:srgbClr val="954F72"/>
+      </a:folHlink>
+    </a:clrScheme>
+    <a:fontScheme name="Office">
+      <a:majorFont>
+        <a:latin typeface="Calibri Light" panose="020F0302020204030204"/>
+        <a:ea typeface=""/>
+        <a:cs typeface=""/>
+        <a:font script="Jpan" typeface="游ゴシック Light"/>
+        <a:font script="Hang" typeface="맑은 고딕"/>
+        <a:font script="Hans" typeface="等线 Light"/>
+        <a:font script="Hant" typeface="新細明體"/>
+        <a:font script="Arab" typeface="Times New Roman"/>
+        <a:font script="Hebr" typeface="Times New Roman"/>
+        <a:font script="Thai" typeface="Angsana New"/>
+        <a:font script="Ethi" typeface="Nyala"/>
+        <a:font script="Beng" typeface="Vrinda"/>
+        <a:font script="Gujr" typeface="Shruti"/>
+        <a:font script="Khmr" typeface="MoolBoran"/>
+        <a:font script="Knda" typeface="Tunga"/>
+        <a:font script="Guru" typeface="Raavi"/>
+        <a:font script="Cans" typeface="Euphemia"/>
+        <a:font script="Cher" typeface="Plantagenet Cherokee"/>
+        <a:font script="Yiii" typeface="Microsoft Yi Baiti"/>
+        <a:font script="Tibt" typeface="Microsoft Himalaya"/>
+        <a:font script="Thaa" typeface="MV Boli"/>
+        <a:font script="Deva" typeface="Mangal"/>
+        <a:font script="Telu" typeface="Gautami"/>
+        <a:font script="Taml" typeface="Latha"/>
+        <a:font script="Syrc" typeface="Estrangelo Edessa"/>
+        <a:font script="Orya" typeface="Kalinga"/>
+        <a:font script="Mlym" typeface="Kartika"/>
+        <a:font script="Laoo" typeface="DokChampa"/>
+        <a:font script="Sinh" typeface="Iskoola Pota"/>
+        <a:font script="Mong" typeface="Mongolian Baiti"/>
+        <a:font script="Viet" typeface="Times New Roman"/>
+        <a:font script="Uigh" typeface="Microsoft Uighur"/>
+        <a:font script="Geor" typeface="Sylfaen"/>
+        <a:font script="Armn" typeface="Arial"/>
+        <a:font script="Bugi" typeface="Leelawadee UI"/>
+        <a:font script="Bopo" typeface="Microsoft JhengHei"/>
+        <a:font script="Java" typeface="Javanese Text"/>
+        <a:font script="Lisu" typeface="Segoe UI"/>
+        <a:font script="Mymr" typeface="Myanmar Text"/>
+        <a:font script="Nkoo" typeface="Ebrima"/>
+        <a:font script="Olck" typeface="Nirmala UI"/>
+        <a:font script="Osma" typeface="Ebrima"/>
+        <a:font script="Phag" typeface="Phagspa"/>
+        <a:font script="Syrn" typeface="Estrangelo Edessa"/>
+        <a:font script="Syrj" typeface="Estrangelo Edessa"/>
+        <a:font script="Syre" typeface="Estrangelo Edessa"/>
+        <a:font script="Sora" typeface="Nirmala UI"/>
+        <a:font script="Tale" typeface="Microsoft Tai Le"/>
+        <a:font script="Talu" typeface="Microsoft New Tai Lue"/>
+        <a:font script="Tfng" typeface="Ebrima"/>
+      </a:majorFont>
+      <a:minorFont>
+        <a:latin typeface="Calibri" panose="020F0502020204030204"/>
+        <a:ea typeface=""/>
+        <a:cs typeface=""/>
+        <a:font script="Jpan" typeface="游ゴシック"/>
+        <a:font script="Hang" typeface="맑은 고딕"/>
+        <a:font script="Hans" typeface="等线"/>
+        <a:font script="Hant" typeface="新細明體"/>
+        <a:font script="Arab" typeface="Arial"/>
+        <a:font script="Hebr" typeface="Arial"/>
+        <a:font script="Thai" typeface="Cordia New"/>
+        <a:font script="Ethi" typeface="Nyala"/>
+        <a:font script="Beng" typeface="Vrinda"/>
+        <a:font script="Gujr" typeface="Shruti"/>
+        <a:font script="Khmr" typeface="DaunPenh"/>
+        <a:font script="Knda" typeface="Tunga"/>
+        <a:font script="Guru" typeface="Raavi"/>
+        <a:font script="Cans" typeface="Euphemia"/>
+        <a:font script="Cher" typeface="Plantagenet Cherokee"/>
+        <a:font script="Yiii" typeface="Microsoft Yi Baiti"/>
+        <a:font script="Tibt" typeface="Microsoft Himalaya"/>
+        <a:font script="Thaa" typeface="MV Boli"/>
+        <a:font script="Deva" typeface="Mangal"/>
+        <a:font script="Telu" typeface="Gautami"/>
+        <a:font script="Taml" typeface="Latha"/>
+        <a:font script="Syrc" typeface="Estrangelo Edessa"/>
+        <a:font script="Orya" typeface="Kalinga"/>
+        <a:font script="Mlym" typeface="Kartika"/>
+        <a:font script="Laoo" typeface="DokChampa"/>
+        <a:font script="Sinh" typeface="Iskoola Pota"/>
+        <a:font script="Mong" typeface="Mongolian Baiti"/>
+        <a:font script="Viet" typeface="Arial"/>
+        <a:font script="Uigh" typeface="Microsoft Uighur"/>
+        <a:font script="Geor" typeface="Sylfaen"/>
+        <a:font script="Armn" typeface="Arial"/>
+        <a:font script="Bugi" typeface="Leelawadee UI"/>
+        <a:font script="Bopo" typeface="Microsoft JhengHei"/>
+        <a:font script="Java" typeface="Javanese Text"/>
+        <a:font script="Lisu" typeface="Segoe UI"/>
+        <a:font script="Mymr" typeface="Myanmar Text"/>
+        <a:font script="Nkoo" typeface="Ebrima"/>
+        <a:font script="Olck" typeface="Nirmala UI"/>
+        <a:font script="Osma" typeface="Ebrima"/>
+        <a:font script="Phag" typeface="Phagspa"/>
+        <a:font script="Syrn" typeface="Estrangelo Edessa"/>
+        <a:font script="Syrj" typeface="Estrangelo Edessa"/>
+        <a:font script="Syre" typeface="Estrangelo Edessa"/>
+        <a:font script="Sora" typeface="Nirmala UI"/>
+        <a:font script="Tale" typeface="Microsoft Tai Le"/>
+        <a:font script="Talu" typeface="Microsoft New Tai Lue"/>
+        <a:font script="Tfng" typeface="Ebrima"/>
+      </a:minorFont>
+    </a:fontScheme>
+    <a:fmtScheme name="Office">
+      <a:fillStyleLst>
+        <a:solidFill>
+          <a:schemeClr val="phClr"/>
+        </a:solidFill>
+        <a:gradFill rotWithShape="1">
+          <a:gsLst>
+            <a:gs pos="0">
+              <a:schemeClr val="phClr">
+                <a:lumMod val="110000"/>
+                <a:satMod val="105000"/>
+                <a:tint val="67000"/>
+              </a:schemeClr>
+            </a:gs>
+            <a:gs pos="50000">
+              <a:schemeClr val="phClr">
+                <a:lumMod val="105000"/>
+                <a:satMod val="103000"/>
+                <a:tint val="73000"/>
+              </a:schemeClr>
+            </a:gs>
+            <a:gs pos="100000">
+              <a:schemeClr val="phClr">
+                <a:lumMod val="105000"/>
+                <a:satMod val="109000"/>
+                <a:tint val="81000"/>
+              </a:schemeClr>
+            </a:gs>
+          </a:gsLst>
+          <a:lin ang="5400000" scaled="0"/>
+        </a:gradFill>
+        <a:gradFill rotWithShape="1">
+          <a:gsLst>
+            <a:gs pos="0">
+              <a:schemeClr val="phClr">
+                <a:satMod val="103000"/>
+                <a:lumMod val="102000"/>
+                <a:tint val="94000"/>
+              </a:schemeClr>
+            </a:gs>
+            <a:gs pos="50000">
+              <a:schemeClr val="phClr">
+                <a:satMod val="110000"/>
+                <a:lumMod val="100000"/>
+                <a:shade val="100000"/>
+              </a:schemeClr>
+            </a:gs>
+            <a:gs pos="100000">
+              <a:schemeClr val="phClr">
+                <a:lumMod val="99000"/>
+                <a:satMod val="120000"/>
+                <a:shade val="78000"/>
+              </a:schemeClr>
+            </a:gs>
+          </a:gsLst>
+          <a:lin ang="5400000" scaled="0"/>
+        </a:gradFill>
+      </a:fillStyleLst>
+      <a:lnStyleLst>
+        <a:ln w="6350" cap="flat" cmpd="sng" algn="ctr">
+          <a:solidFill>
+            <a:schemeClr val="phClr"/>
+          </a:solidFill>
+          <a:prstDash val="solid"/>
+          <a:miter lim="800000"/>
+        </a:ln>
+        <a:ln w="12700" cap="flat" cmpd="sng" algn="ctr">
+          <a:solidFill>
+            <a:schemeClr val="phClr"/>
+          </a:solidFill>
+          <a:prstDash val="solid"/>
+          <a:miter lim="800000"/>
+        </a:ln>
+        <a:ln w="19050" cap="flat" cmpd="sng" algn="ctr">
+          <a:solidFill>
+            <a:schemeClr val="phClr"/>
+          </a:solidFill>
+          <a:prstDash val="solid"/>
+          <a:miter lim="800000"/>
+        </a:ln>
+      </a:lnStyleLst>
+      <a:effectStyleLst>
+        <a:effectStyle>
+          <a:effectLst/>
+        </a:effectStyle>
+        <a:effectStyle>
+          <a:effectLst/>
+        </a:effectStyle>
+        <a:effectStyle>
+          <a:effectLst>
+            <a:outerShdw blurRad="57150" dist="19050" dir="5400000" algn="ctr" rotWithShape="0">
+              <a:srgbClr val="000000">
+                <a:alpha val="63000"/>
+              </a:srgbClr>
+            </a:outerShdw>
+          </a:effectLst>
+        </a:effectStyle>
+      </a:effectStyleLst>
+      <a:bgFillStyleLst>
+        <a:solidFill>
+          <a:schemeClr val="phClr"/>
+        </a:solidFill>
+        <a:solidFill>
+          <a:schemeClr val="phClr">
+            <a:tint val="95000"/>
+            <a:satMod val="170000"/>
+          </a:schemeClr>
+        </a:solidFill>
+        <a:gradFill rotWithShape="1">
+          <a:gsLst>
+            <a:gs pos="0">
+              <a:schemeClr val="phClr">
+                <a:tint val="93000"/>
+                <a:satMod val="150000"/>
+                <a:shade val="98000"/>
+                <a:lumMod val="102000"/>
+              </a:schemeClr>
+            </a:gs>
+            <a:gs pos="50000">
+              <a:schemeClr val="phClr">
+                <a:tint val="98000"/>
+                <a:satMod val="130000"/>
+                <a:shade val="90000"/>
+                <a:lumMod val="103000"/>
+              </a:schemeClr>
+            </a:gs>
+            <a:gs pos="100000">
+              <a:schemeClr val="phClr">
+                <a:shade val="63000"/>
+                <a:satMod val="120000"/>
+              </a:schemeClr>
+            </a:gs>
+          </a:gsLst>
+          <a:lin ang="5400000" scaled="0"/>
+        </a:gradFill>
+      </a:bgFillStyleLst>
+    </a:fmtScheme>
+  </a:themeElements>
+  <a:objectDefaults/>
+  <a:extraClrSchemeLst/>
+  <a:extLst>
+    <a:ext uri="{05A4C25C-085E-4340-85A3-A5531E510DB2}">
+      <thm15:themeFamily xmlns:thm15="http://schemas.microsoft.com/office/thememl/2012/main" name="Office Theme" id="{62F939B6-93AF-4DB8-9C6B-D6C7DFDC589F}" vid="{4A3C46E8-61CC-4603-A589-7422A47A8E4A}"/>
+    </a:ext>
+  </a:extLst>
+</a:theme>
 </file>
</xml_diff>

<commit_message>
añadida detección de liberación de los pulsadores de los encoders
</commit_message>
<xml_diff>
--- a/DOC/Esquema.pptx
+++ b/DOC/Esquema.pptx
@@ -198,7 +198,7 @@
           <a:p>
             <a:fld id="{A7B985E7-405D-41BF-9F4C-FB894C0ED85B}" type="datetimeFigureOut">
               <a:rPr lang="es-ES" smtClean="0"/>
-              <a:t>24/12/2022</a:t>
+              <a:t>27/12/2022</a:t>
             </a:fld>
             <a:endParaRPr lang="es-ES"/>
           </a:p>
@@ -696,7 +696,7 @@
           <a:p>
             <a:fld id="{39AD9A35-D595-4934-8AAA-9408787DB05C}" type="datetimeFigureOut">
               <a:rPr lang="es-ES" smtClean="0"/>
-              <a:t>24/12/2022</a:t>
+              <a:t>27/12/2022</a:t>
             </a:fld>
             <a:endParaRPr lang="es-ES"/>
           </a:p>
@@ -894,7 +894,7 @@
           <a:p>
             <a:fld id="{39AD9A35-D595-4934-8AAA-9408787DB05C}" type="datetimeFigureOut">
               <a:rPr lang="es-ES" smtClean="0"/>
-              <a:t>24/12/2022</a:t>
+              <a:t>27/12/2022</a:t>
             </a:fld>
             <a:endParaRPr lang="es-ES"/>
           </a:p>
@@ -1102,7 +1102,7 @@
           <a:p>
             <a:fld id="{39AD9A35-D595-4934-8AAA-9408787DB05C}" type="datetimeFigureOut">
               <a:rPr lang="es-ES" smtClean="0"/>
-              <a:t>24/12/2022</a:t>
+              <a:t>27/12/2022</a:t>
             </a:fld>
             <a:endParaRPr lang="es-ES"/>
           </a:p>
@@ -1300,7 +1300,7 @@
           <a:p>
             <a:fld id="{39AD9A35-D595-4934-8AAA-9408787DB05C}" type="datetimeFigureOut">
               <a:rPr lang="es-ES" smtClean="0"/>
-              <a:t>24/12/2022</a:t>
+              <a:t>27/12/2022</a:t>
             </a:fld>
             <a:endParaRPr lang="es-ES"/>
           </a:p>
@@ -1575,7 +1575,7 @@
           <a:p>
             <a:fld id="{39AD9A35-D595-4934-8AAA-9408787DB05C}" type="datetimeFigureOut">
               <a:rPr lang="es-ES" smtClean="0"/>
-              <a:t>24/12/2022</a:t>
+              <a:t>27/12/2022</a:t>
             </a:fld>
             <a:endParaRPr lang="es-ES"/>
           </a:p>
@@ -1840,7 +1840,7 @@
           <a:p>
             <a:fld id="{39AD9A35-D595-4934-8AAA-9408787DB05C}" type="datetimeFigureOut">
               <a:rPr lang="es-ES" smtClean="0"/>
-              <a:t>24/12/2022</a:t>
+              <a:t>27/12/2022</a:t>
             </a:fld>
             <a:endParaRPr lang="es-ES"/>
           </a:p>
@@ -2252,7 +2252,7 @@
           <a:p>
             <a:fld id="{39AD9A35-D595-4934-8AAA-9408787DB05C}" type="datetimeFigureOut">
               <a:rPr lang="es-ES" smtClean="0"/>
-              <a:t>24/12/2022</a:t>
+              <a:t>27/12/2022</a:t>
             </a:fld>
             <a:endParaRPr lang="es-ES"/>
           </a:p>
@@ -2393,7 +2393,7 @@
           <a:p>
             <a:fld id="{39AD9A35-D595-4934-8AAA-9408787DB05C}" type="datetimeFigureOut">
               <a:rPr lang="es-ES" smtClean="0"/>
-              <a:t>24/12/2022</a:t>
+              <a:t>27/12/2022</a:t>
             </a:fld>
             <a:endParaRPr lang="es-ES"/>
           </a:p>
@@ -2506,7 +2506,7 @@
           <a:p>
             <a:fld id="{39AD9A35-D595-4934-8AAA-9408787DB05C}" type="datetimeFigureOut">
               <a:rPr lang="es-ES" smtClean="0"/>
-              <a:t>24/12/2022</a:t>
+              <a:t>27/12/2022</a:t>
             </a:fld>
             <a:endParaRPr lang="es-ES"/>
           </a:p>
@@ -2817,7 +2817,7 @@
           <a:p>
             <a:fld id="{39AD9A35-D595-4934-8AAA-9408787DB05C}" type="datetimeFigureOut">
               <a:rPr lang="es-ES" smtClean="0"/>
-              <a:t>24/12/2022</a:t>
+              <a:t>27/12/2022</a:t>
             </a:fld>
             <a:endParaRPr lang="es-ES"/>
           </a:p>
@@ -3105,7 +3105,7 @@
           <a:p>
             <a:fld id="{39AD9A35-D595-4934-8AAA-9408787DB05C}" type="datetimeFigureOut">
               <a:rPr lang="es-ES" smtClean="0"/>
-              <a:t>24/12/2022</a:t>
+              <a:t>27/12/2022</a:t>
             </a:fld>
             <a:endParaRPr lang="es-ES"/>
           </a:p>
@@ -3346,7 +3346,7 @@
           <a:p>
             <a:fld id="{39AD9A35-D595-4934-8AAA-9408787DB05C}" type="datetimeFigureOut">
               <a:rPr lang="es-ES" smtClean="0"/>
-              <a:t>24/12/2022</a:t>
+              <a:t>27/12/2022</a:t>
             </a:fld>
             <a:endParaRPr lang="es-ES"/>
           </a:p>
@@ -8515,14 +8515,14 @@
           <p:nvPr>
             <p:extLst>
               <p:ext uri="{D42A27DB-BD31-4B8C-83A1-F6EECF244321}">
-                <p14:modId xmlns:p14="http://schemas.microsoft.com/office/powerpoint/2010/main" val="1759656924"/>
+                <p14:modId xmlns:p14="http://schemas.microsoft.com/office/powerpoint/2010/main" val="848186463"/>
               </p:ext>
             </p:extLst>
           </p:nvPr>
         </p:nvGraphicFramePr>
         <p:xfrm>
           <a:off x="1307179" y="1783530"/>
-          <a:ext cx="6318739" cy="4747891"/>
+          <a:ext cx="6318739" cy="4754880"/>
         </p:xfrm>
         <a:graphic>
           <a:graphicData uri="http://schemas.openxmlformats.org/drawingml/2006/table">
@@ -8579,7 +8579,7 @@
                     <a:p>
                       <a:pPr algn="ctr"/>
                       <a:r>
-                        <a:rPr lang="es-ES" b="1" dirty="0">
+                        <a:rPr lang="es-ES" b="1" i="1" dirty="0">
                           <a:solidFill>
                             <a:schemeClr val="tx1"/>
                           </a:solidFill>
@@ -8587,7 +8587,7 @@
                         <a:t>(</a:t>
                       </a:r>
                       <a:r>
-                        <a:rPr lang="es-ES" b="1" dirty="0" err="1">
+                        <a:rPr lang="es-ES" b="1" i="1" dirty="0" err="1">
                           <a:solidFill>
                             <a:schemeClr val="tx1"/>
                           </a:solidFill>
@@ -8595,7 +8595,7 @@
                         <a:t>Freehand</a:t>
                       </a:r>
                       <a:r>
-                        <a:rPr lang="es-ES" b="1" dirty="0">
+                        <a:rPr lang="es-ES" b="1" i="1" dirty="0">
                           <a:solidFill>
                             <a:schemeClr val="tx1"/>
                           </a:solidFill>
@@ -8603,7 +8603,7 @@
                         <a:t> </a:t>
                       </a:r>
                       <a:r>
-                        <a:rPr lang="es-ES" b="1" dirty="0" err="1">
+                        <a:rPr lang="es-ES" b="1" i="1" dirty="0" err="1">
                           <a:solidFill>
                             <a:schemeClr val="tx1"/>
                           </a:solidFill>
@@ -8611,7 +8611,7 @@
                         <a:t>selection</a:t>
                       </a:r>
                       <a:r>
-                        <a:rPr lang="es-ES" b="1" dirty="0">
+                        <a:rPr lang="es-ES" b="1" i="1" dirty="0">
                           <a:solidFill>
                             <a:schemeClr val="tx1"/>
                           </a:solidFill>
@@ -8619,7 +8619,7 @@
                         <a:t> </a:t>
                       </a:r>
                       <a:r>
-                        <a:rPr lang="es-ES" b="1" dirty="0" err="1">
+                        <a:rPr lang="es-ES" b="1" i="1" dirty="0" err="1">
                           <a:solidFill>
                             <a:schemeClr val="tx1"/>
                           </a:solidFill>
@@ -8627,7 +8627,7 @@
                         <a:t>tool</a:t>
                       </a:r>
                       <a:r>
-                        <a:rPr lang="es-ES" b="1" dirty="0">
+                        <a:rPr lang="es-ES" b="1" i="1" dirty="0">
                           <a:solidFill>
                             <a:schemeClr val="tx1"/>
                           </a:solidFill>
@@ -8635,7 +8635,7 @@
                         <a:t> </a:t>
                       </a:r>
                       <a:r>
-                        <a:rPr lang="es-ES" b="1" dirty="0" err="1">
+                        <a:rPr lang="es-ES" b="1" i="1" dirty="0" err="1">
                           <a:solidFill>
                             <a:schemeClr val="tx1"/>
                           </a:solidFill>
@@ -8643,7 +8643,7 @@
                         <a:t>temp</a:t>
                       </a:r>
                       <a:r>
-                        <a:rPr lang="es-ES" b="1" dirty="0">
+                        <a:rPr lang="es-ES" b="1" i="1" dirty="0">
                           <a:solidFill>
                             <a:schemeClr val="tx1"/>
                           </a:solidFill>
@@ -8674,7 +8674,7 @@
                     <a:p>
                       <a:pPr algn="ctr"/>
                       <a:r>
-                        <a:rPr lang="es-ES" b="1" dirty="0">
+                        <a:rPr lang="es-ES" b="1" i="1" dirty="0">
                           <a:solidFill>
                             <a:schemeClr val="tx1"/>
                           </a:solidFill>
@@ -8682,7 +8682,7 @@
                         <a:t>(</a:t>
                       </a:r>
                       <a:r>
-                        <a:rPr lang="es-ES" b="1" dirty="0" err="1">
+                        <a:rPr lang="es-ES" b="1" i="1" dirty="0" err="1">
                           <a:solidFill>
                             <a:schemeClr val="tx1"/>
                           </a:solidFill>
@@ -8690,7 +8690,7 @@
                         <a:t>Move</a:t>
                       </a:r>
                       <a:r>
-                        <a:rPr lang="es-ES" b="1" dirty="0">
+                        <a:rPr lang="es-ES" b="1" i="1" dirty="0">
                           <a:solidFill>
                             <a:schemeClr val="tx1"/>
                           </a:solidFill>
@@ -8698,7 +8698,7 @@
                         <a:t> </a:t>
                       </a:r>
                       <a:r>
-                        <a:rPr lang="es-ES" b="1" dirty="0" err="1">
+                        <a:rPr lang="es-ES" b="1" i="1" dirty="0" err="1">
                           <a:solidFill>
                             <a:schemeClr val="tx1"/>
                           </a:solidFill>
@@ -8706,7 +8706,7 @@
                         <a:t>tool</a:t>
                       </a:r>
                       <a:r>
-                        <a:rPr lang="es-ES" b="1" dirty="0">
+                        <a:rPr lang="es-ES" b="1" i="1" dirty="0">
                           <a:solidFill>
                             <a:schemeClr val="tx1"/>
                           </a:solidFill>
@@ -8714,7 +8714,7 @@
                         <a:t> </a:t>
                       </a:r>
                       <a:r>
-                        <a:rPr lang="es-ES" b="1" dirty="0" err="1">
+                        <a:rPr lang="es-ES" b="1" i="1" dirty="0" err="1">
                           <a:solidFill>
                             <a:schemeClr val="tx1"/>
                           </a:solidFill>
@@ -8722,7 +8722,7 @@
                         <a:t>temp</a:t>
                       </a:r>
                       <a:r>
-                        <a:rPr lang="es-ES" b="1" dirty="0">
+                        <a:rPr lang="es-ES" b="1" i="1" dirty="0">
                           <a:solidFill>
                             <a:schemeClr val="tx1"/>
                           </a:solidFill>
@@ -8742,7 +8742,7 @@
                     <a:p>
                       <a:pPr algn="ctr"/>
                       <a:r>
-                        <a:rPr lang="es-ES" b="1" dirty="0" err="1">
+                        <a:rPr lang="es-ES" b="1" i="1" dirty="0" err="1">
                           <a:solidFill>
                             <a:schemeClr val="tx1"/>
                           </a:solidFill>
@@ -8750,7 +8750,7 @@
                         <a:t>Ctrl</a:t>
                       </a:r>
                       <a:r>
-                        <a:rPr lang="es-ES" b="1" dirty="0">
+                        <a:rPr lang="es-ES" b="1" i="1" dirty="0">
                           <a:solidFill>
                             <a:schemeClr val="tx1"/>
                           </a:solidFill>
@@ -8761,7 +8761,7 @@
                     <a:p>
                       <a:pPr algn="ctr"/>
                       <a:r>
-                        <a:rPr lang="es-ES" b="1" dirty="0">
+                        <a:rPr lang="es-ES" b="1" i="1" dirty="0">
                           <a:solidFill>
                             <a:schemeClr val="tx1"/>
                           </a:solidFill>
@@ -8769,7 +8769,7 @@
                         <a:t>(</a:t>
                       </a:r>
                       <a:r>
-                        <a:rPr lang="es-ES" b="1" dirty="0" err="1">
+                        <a:rPr lang="es-ES" b="1" i="1" dirty="0" err="1">
                           <a:solidFill>
                             <a:schemeClr val="tx1"/>
                           </a:solidFill>
@@ -8777,7 +8777,7 @@
                         <a:t>Deselect</a:t>
                       </a:r>
                       <a:r>
-                        <a:rPr lang="es-ES" b="1" dirty="0">
+                        <a:rPr lang="es-ES" b="1" i="1" dirty="0">
                           <a:solidFill>
                             <a:schemeClr val="tx1"/>
                           </a:solidFill>
@@ -8805,7 +8805,7 @@
                     <a:p>
                       <a:pPr algn="ctr"/>
                       <a:r>
-                        <a:rPr lang="es-ES" b="1" dirty="0">
+                        <a:rPr lang="es-ES" b="1" i="1" dirty="0">
                           <a:solidFill>
                             <a:schemeClr val="tx1"/>
                           </a:solidFill>
@@ -8816,7 +8816,7 @@
                     <a:p>
                       <a:pPr algn="ctr"/>
                       <a:r>
-                        <a:rPr lang="es-ES" b="1" dirty="0">
+                        <a:rPr lang="es-ES" b="1" i="1" dirty="0">
                           <a:solidFill>
                             <a:schemeClr val="tx1"/>
                           </a:solidFill>
@@ -8824,7 +8824,7 @@
                         <a:t>(Pan </a:t>
                       </a:r>
                       <a:r>
-                        <a:rPr lang="es-ES" b="1" dirty="0" err="1">
+                        <a:rPr lang="es-ES" b="1" i="1" dirty="0" err="1">
                           <a:solidFill>
                             <a:schemeClr val="tx1"/>
                           </a:solidFill>
@@ -8832,7 +8832,7 @@
                         <a:t>canvas</a:t>
                       </a:r>
                       <a:r>
-                        <a:rPr lang="es-ES" b="1" dirty="0">
+                        <a:rPr lang="es-ES" b="1" i="1" dirty="0">
                           <a:solidFill>
                             <a:schemeClr val="tx1"/>
                           </a:solidFill>
@@ -8878,7 +8878,7 @@
                     <a:p>
                       <a:pPr algn="ctr"/>
                       <a:r>
-                        <a:rPr lang="es-ES" b="1" dirty="0">
+                        <a:rPr lang="es-ES" b="1" i="1" dirty="0">
                           <a:solidFill>
                             <a:schemeClr val="tx1"/>
                           </a:solidFill>
@@ -8886,15 +8886,23 @@
                         <a:t>(</a:t>
                       </a:r>
                       <a:r>
-                        <a:rPr lang="es-ES" b="1">
+                        <a:rPr lang="es-ES" b="1" i="1" dirty="0" err="1">
                           <a:solidFill>
                             <a:schemeClr val="tx1"/>
                           </a:solidFill>
                         </a:rPr>
-                        <a:t>Isolate </a:t>
+                        <a:t>Isolate</a:t>
                       </a:r>
                       <a:r>
-                        <a:rPr lang="es-ES" b="1" dirty="0" err="1">
+                        <a:rPr lang="es-ES" b="1" i="1" dirty="0">
+                          <a:solidFill>
+                            <a:schemeClr val="tx1"/>
+                          </a:solidFill>
+                        </a:rPr>
+                        <a:t> </a:t>
+                      </a:r>
+                      <a:r>
+                        <a:rPr lang="es-ES" b="1" i="1" dirty="0" err="1">
                           <a:solidFill>
                             <a:schemeClr val="tx1"/>
                           </a:solidFill>
@@ -8902,7 +8910,7 @@
                         <a:t>layer</a:t>
                       </a:r>
                       <a:r>
-                        <a:rPr lang="es-ES" b="1" dirty="0">
+                        <a:rPr lang="es-ES" b="1" i="1" dirty="0">
                           <a:solidFill>
                             <a:schemeClr val="tx1"/>
                           </a:solidFill>
@@ -8941,7 +8949,7 @@
                     <a:p>
                       <a:pPr algn="ctr"/>
                       <a:r>
-                        <a:rPr lang="es-ES" b="1" dirty="0">
+                        <a:rPr lang="es-ES" b="1" i="1" dirty="0">
                           <a:solidFill>
                             <a:schemeClr val="tx1"/>
                           </a:solidFill>
@@ -8949,7 +8957,7 @@
                         <a:t>(</a:t>
                       </a:r>
                       <a:r>
-                        <a:rPr lang="es-ES" b="1" dirty="0" err="1">
+                        <a:rPr lang="es-ES" b="1" i="1" dirty="0" err="1">
                           <a:solidFill>
                             <a:schemeClr val="tx1"/>
                           </a:solidFill>
@@ -8957,7 +8965,7 @@
                         <a:t>Select</a:t>
                       </a:r>
                       <a:r>
-                        <a:rPr lang="es-ES" b="1" dirty="0">
+                        <a:rPr lang="es-ES" b="1" i="1" dirty="0">
                           <a:solidFill>
                             <a:schemeClr val="tx1"/>
                           </a:solidFill>
@@ -8965,7 +8973,7 @@
                         <a:t> </a:t>
                       </a:r>
                       <a:r>
-                        <a:rPr lang="es-ES" b="1" dirty="0" err="1">
+                        <a:rPr lang="es-ES" b="1" i="1" dirty="0" err="1">
                           <a:solidFill>
                             <a:schemeClr val="tx1"/>
                           </a:solidFill>
@@ -8973,7 +8981,7 @@
                         <a:t>layer</a:t>
                       </a:r>
                       <a:r>
-                        <a:rPr lang="es-ES" b="1" dirty="0">
+                        <a:rPr lang="es-ES" b="1" i="1" dirty="0">
                           <a:solidFill>
                             <a:schemeClr val="tx1"/>
                           </a:solidFill>
@@ -9000,11 +9008,78 @@
                     <a:lstStyle/>
                     <a:p>
                       <a:pPr algn="ctr"/>
+                      <a:r>
+                        <a:rPr lang="es-ES" b="1" dirty="0" err="1">
+                          <a:solidFill>
+                            <a:schemeClr val="tx1"/>
+                          </a:solidFill>
+                        </a:rPr>
+                        <a:t>BackSpace</a:t>
+                      </a:r>
                       <a:endParaRPr lang="es-ES" b="1" dirty="0">
                         <a:solidFill>
                           <a:schemeClr val="tx1"/>
                         </a:solidFill>
                       </a:endParaRPr>
+                    </a:p>
+                    <a:p>
+                      <a:pPr algn="ctr"/>
+                      <a:r>
+                        <a:rPr lang="es-ES" b="1" i="1" dirty="0">
+                          <a:solidFill>
+                            <a:schemeClr val="tx1"/>
+                          </a:solidFill>
+                        </a:rPr>
+                        <a:t>(</a:t>
+                      </a:r>
+                      <a:r>
+                        <a:rPr lang="es-ES" b="1" i="1" dirty="0" err="1">
+                          <a:solidFill>
+                            <a:schemeClr val="tx1"/>
+                          </a:solidFill>
+                        </a:rPr>
+                        <a:t>Fill</a:t>
+                      </a:r>
+                      <a:r>
+                        <a:rPr lang="es-ES" b="1" i="1" dirty="0">
+                          <a:solidFill>
+                            <a:schemeClr val="tx1"/>
+                          </a:solidFill>
+                        </a:rPr>
+                        <a:t> </a:t>
+                      </a:r>
+                      <a:r>
+                        <a:rPr lang="es-ES" b="1" i="1" dirty="0" err="1">
+                          <a:solidFill>
+                            <a:schemeClr val="tx1"/>
+                          </a:solidFill>
+                        </a:rPr>
+                        <a:t>with</a:t>
+                      </a:r>
+                      <a:r>
+                        <a:rPr lang="es-ES" b="1" i="1" dirty="0">
+                          <a:solidFill>
+                            <a:schemeClr val="tx1"/>
+                          </a:solidFill>
+                        </a:rPr>
+                        <a:t> </a:t>
+                      </a:r>
+                      <a:r>
+                        <a:rPr lang="es-ES" b="1" i="1" dirty="0" err="1">
+                          <a:solidFill>
+                            <a:schemeClr val="tx1"/>
+                          </a:solidFill>
+                        </a:rPr>
+                        <a:t>backColor</a:t>
+                      </a:r>
+                      <a:r>
+                        <a:rPr lang="es-ES" b="1" i="1" dirty="0">
+                          <a:solidFill>
+                            <a:schemeClr val="tx1"/>
+                          </a:solidFill>
+                        </a:rPr>
+                        <a:t>)</a:t>
+                      </a:r>
                     </a:p>
                   </a:txBody>
                   <a:tcPr anchor="ctr">
@@ -9016,7 +9091,39 @@
                     <a:bodyPr/>
                     <a:lstStyle/>
                     <a:p>
-                      <a:pPr algn="ctr"/>
+                      <a:pPr marL="0" marR="0" lvl="0" indent="0" algn="ctr" defTabSz="914400" rtl="0" eaLnBrk="1" fontAlgn="auto" latinLnBrk="0" hangingPunct="1">
+                        <a:lnSpc>
+                          <a:spcPct val="100000"/>
+                        </a:lnSpc>
+                        <a:spcBef>
+                          <a:spcPts val="0"/>
+                        </a:spcBef>
+                        <a:spcAft>
+                          <a:spcPts val="0"/>
+                        </a:spcAft>
+                        <a:buClrTx/>
+                        <a:buSzTx/>
+                        <a:buFontTx/>
+                        <a:buNone/>
+                        <a:tabLst/>
+                        <a:defRPr/>
+                      </a:pPr>
+                      <a:r>
+                        <a:rPr lang="es-ES" b="1" dirty="0">
+                          <a:solidFill>
+                            <a:schemeClr val="tx1"/>
+                          </a:solidFill>
+                        </a:rPr>
+                        <a:t>Shift </a:t>
+                      </a:r>
+                      <a:r>
+                        <a:rPr lang="es-ES" b="1" dirty="0" err="1">
+                          <a:solidFill>
+                            <a:schemeClr val="tx1"/>
+                          </a:solidFill>
+                        </a:rPr>
+                        <a:t>BackSpace</a:t>
+                      </a:r>
                       <a:endParaRPr lang="es-ES" b="1" dirty="0">
                         <a:solidFill>
                           <a:schemeClr val="tx1"/>
@@ -9025,11 +9132,62 @@
                     </a:p>
                     <a:p>
                       <a:pPr algn="ctr"/>
-                      <a:endParaRPr lang="es-ES" b="1" dirty="0">
-                        <a:solidFill>
-                          <a:schemeClr val="tx1"/>
-                        </a:solidFill>
-                      </a:endParaRPr>
+                      <a:r>
+                        <a:rPr lang="es-ES" b="1" i="1" dirty="0">
+                          <a:solidFill>
+                            <a:schemeClr val="tx1"/>
+                          </a:solidFill>
+                        </a:rPr>
+                        <a:t>(</a:t>
+                      </a:r>
+                      <a:r>
+                        <a:rPr lang="es-ES" b="1" i="1" dirty="0" err="1">
+                          <a:solidFill>
+                            <a:schemeClr val="tx1"/>
+                          </a:solidFill>
+                        </a:rPr>
+                        <a:t>Fill</a:t>
+                      </a:r>
+                      <a:r>
+                        <a:rPr lang="es-ES" b="1" i="1" dirty="0">
+                          <a:solidFill>
+                            <a:schemeClr val="tx1"/>
+                          </a:solidFill>
+                        </a:rPr>
+                        <a:t> </a:t>
+                      </a:r>
+                      <a:r>
+                        <a:rPr lang="es-ES" b="1" i="1" dirty="0" err="1">
+                          <a:solidFill>
+                            <a:schemeClr val="tx1"/>
+                          </a:solidFill>
+                        </a:rPr>
+                        <a:t>with</a:t>
+                      </a:r>
+                      <a:r>
+                        <a:rPr lang="es-ES" b="1" i="1" dirty="0">
+                          <a:solidFill>
+                            <a:schemeClr val="tx1"/>
+                          </a:solidFill>
+                        </a:rPr>
+                        <a:t> </a:t>
+                      </a:r>
+                      <a:r>
+                        <a:rPr lang="es-ES" b="1" i="1" dirty="0" err="1">
+                          <a:solidFill>
+                            <a:schemeClr val="tx1"/>
+                          </a:solidFill>
+                        </a:rPr>
+                        <a:t>frontColor</a:t>
+                      </a:r>
+                      <a:r>
+                        <a:rPr lang="es-ES" b="1" i="1" dirty="0">
+                          <a:solidFill>
+                            <a:schemeClr val="tx1"/>
+                          </a:solidFill>
+                        </a:rPr>
+                        <a:t>)</a:t>
+                      </a:r>
                     </a:p>
                   </a:txBody>
                   <a:tcPr anchor="ctr">
@@ -9055,7 +9213,7 @@
                             <a:schemeClr val="tx1"/>
                           </a:solidFill>
                         </a:rPr>
-                        <a:t>/</a:t>
+                        <a:t>X</a:t>
                       </a:r>
                     </a:p>
                     <a:p>
@@ -9066,7 +9224,7 @@
                             <a:schemeClr val="tx1"/>
                           </a:solidFill>
                         </a:rPr>
-                        <a:t>(</a:t>
+                        <a:t>(Exchange </a:t>
                       </a:r>
                       <a:r>
                         <a:rPr lang="es-ES" b="1" dirty="0" err="1">
@@ -9074,7 +9232,7 @@
                             <a:schemeClr val="tx1"/>
                           </a:solidFill>
                         </a:rPr>
-                        <a:t>Previous</a:t>
+                        <a:t>front</a:t>
                       </a:r>
                       <a:r>
                         <a:rPr lang="es-ES" b="1" dirty="0">
@@ -9082,23 +9240,7 @@
                             <a:schemeClr val="tx1"/>
                           </a:solidFill>
                         </a:rPr>
-                        <a:t> </a:t>
-                      </a:r>
-                      <a:r>
-                        <a:rPr lang="es-ES" b="1" dirty="0" err="1">
-                          <a:solidFill>
-                            <a:schemeClr val="tx1"/>
-                          </a:solidFill>
-                        </a:rPr>
-                        <a:t>preset</a:t>
-                      </a:r>
-                      <a:r>
-                        <a:rPr lang="es-ES" b="1" dirty="0">
-                          <a:solidFill>
-                            <a:schemeClr val="tx1"/>
-                          </a:solidFill>
-                        </a:rPr>
-                        <a:t>)</a:t>
+                        <a:t> and back color)</a:t>
                       </a:r>
                     </a:p>
                   </a:txBody>
@@ -9132,7 +9274,7 @@
                     <a:p>
                       <a:pPr algn="ctr"/>
                       <a:r>
-                        <a:rPr lang="es-ES" b="1" dirty="0">
+                        <a:rPr lang="es-ES" b="1" i="1" dirty="0">
                           <a:solidFill>
                             <a:schemeClr val="tx1"/>
                           </a:solidFill>
@@ -9140,7 +9282,7 @@
                         <a:t>(</a:t>
                       </a:r>
                       <a:r>
-                        <a:rPr lang="es-ES" b="1" dirty="0" err="1">
+                        <a:rPr lang="es-ES" b="1" i="1" dirty="0" err="1">
                           <a:solidFill>
                             <a:schemeClr val="tx1"/>
                           </a:solidFill>
@@ -9148,7 +9290,7 @@
                         <a:t>Shade</a:t>
                       </a:r>
                       <a:r>
-                        <a:rPr lang="es-ES" b="1" dirty="0">
+                        <a:rPr lang="es-ES" b="1" i="1" dirty="0">
                           <a:solidFill>
                             <a:schemeClr val="tx1"/>
                           </a:solidFill>
@@ -9167,11 +9309,41 @@
                     <a:lstStyle/>
                     <a:p>
                       <a:pPr algn="ctr"/>
-                      <a:endParaRPr lang="es-ES" b="1">
-                        <a:solidFill>
-                          <a:schemeClr val="tx1"/>
-                        </a:solidFill>
-                      </a:endParaRPr>
+                      <a:r>
+                        <a:rPr lang="es-ES" b="1" dirty="0">
+                          <a:solidFill>
+                            <a:schemeClr val="tx1"/>
+                          </a:solidFill>
+                        </a:rPr>
+                        <a:t>V</a:t>
+                      </a:r>
+                    </a:p>
+                    <a:p>
+                      <a:pPr algn="ctr"/>
+                      <a:r>
+                        <a:rPr lang="es-ES" b="1" dirty="0">
+                          <a:solidFill>
+                            <a:schemeClr val="tx1"/>
+                          </a:solidFill>
+                        </a:rPr>
+                        <a:t>(</a:t>
+                      </a:r>
+                      <a:r>
+                        <a:rPr lang="es-ES" b="1" dirty="0" err="1">
+                          <a:solidFill>
+                            <a:schemeClr val="tx1"/>
+                          </a:solidFill>
+                        </a:rPr>
+                        <a:t>Lines</a:t>
+                      </a:r>
+                      <a:r>
+                        <a:rPr lang="es-ES" b="1" dirty="0">
+                          <a:solidFill>
+                            <a:schemeClr val="tx1"/>
+                          </a:solidFill>
+                        </a:rPr>
+                        <a:t>)</a:t>
+                      </a:r>
                     </a:p>
                   </a:txBody>
                   <a:tcPr anchor="ctr">
@@ -9201,7 +9373,7 @@
                     <a:p>
                       <a:pPr algn="ctr"/>
                       <a:r>
-                        <a:rPr lang="es-ES" b="1" dirty="0">
+                        <a:rPr lang="es-ES" b="1" i="1" dirty="0">
                           <a:solidFill>
                             <a:schemeClr val="tx1"/>
                           </a:solidFill>
@@ -9209,7 +9381,7 @@
                         <a:t>(</a:t>
                       </a:r>
                       <a:r>
-                        <a:rPr lang="es-ES" b="1" dirty="0" err="1">
+                        <a:rPr lang="es-ES" b="1" i="1" dirty="0" err="1">
                           <a:solidFill>
                             <a:schemeClr val="tx1"/>
                           </a:solidFill>
@@ -9217,7 +9389,7 @@
                         <a:t>Only</a:t>
                       </a:r>
                       <a:r>
-                        <a:rPr lang="es-ES" b="1" dirty="0">
+                        <a:rPr lang="es-ES" b="1" i="1" dirty="0">
                           <a:solidFill>
                             <a:schemeClr val="tx1"/>
                           </a:solidFill>
@@ -9225,7 +9397,7 @@
                         <a:t> </a:t>
                       </a:r>
                       <a:r>
-                        <a:rPr lang="es-ES" b="1" dirty="0" err="1">
+                        <a:rPr lang="es-ES" b="1" i="1" dirty="0" err="1">
                           <a:solidFill>
                             <a:schemeClr val="tx1"/>
                           </a:solidFill>
@@ -9233,7 +9405,7 @@
                         <a:t>canvas</a:t>
                       </a:r>
                       <a:r>
-                        <a:rPr lang="es-ES" b="1" dirty="0">
+                        <a:rPr lang="es-ES" b="1" i="1" dirty="0">
                           <a:solidFill>
                             <a:schemeClr val="tx1"/>
                           </a:solidFill>
@@ -9259,11 +9431,14 @@
                     <a:lstStyle/>
                     <a:p>
                       <a:pPr algn="ctr"/>
-                      <a:endParaRPr lang="es-ES" b="1" dirty="0">
-                        <a:solidFill>
-                          <a:schemeClr val="tx1"/>
-                        </a:solidFill>
-                      </a:endParaRPr>
+                      <a:r>
+                        <a:rPr lang="es-ES" b="1" dirty="0">
+                          <a:solidFill>
+                            <a:schemeClr val="tx1"/>
+                          </a:solidFill>
+                        </a:rPr>
+                        <a:t>Del</a:t>
+                      </a:r>
                     </a:p>
                   </a:txBody>
                   <a:tcPr anchor="ctr">
@@ -9296,7 +9471,7 @@
                     <a:p>
                       <a:pPr algn="ctr"/>
                       <a:r>
-                        <a:rPr lang="es-ES" b="1" dirty="0">
+                        <a:rPr lang="es-ES" b="1" i="1" dirty="0">
                           <a:solidFill>
                             <a:schemeClr val="tx1"/>
                           </a:solidFill>
@@ -9304,7 +9479,7 @@
                         <a:t>(</a:t>
                       </a:r>
                       <a:r>
-                        <a:rPr lang="es-ES" b="1" dirty="0" err="1">
+                        <a:rPr lang="es-ES" b="1" i="1" dirty="0" err="1">
                           <a:solidFill>
                             <a:schemeClr val="tx1"/>
                           </a:solidFill>
@@ -9312,7 +9487,7 @@
                         <a:t>Undo</a:t>
                       </a:r>
                       <a:r>
-                        <a:rPr lang="es-ES" b="1" dirty="0">
+                        <a:rPr lang="es-ES" b="1" i="1" dirty="0">
                           <a:solidFill>
                             <a:schemeClr val="tx1"/>
                           </a:solidFill>
@@ -9343,7 +9518,7 @@
                     <a:p>
                       <a:pPr algn="ctr"/>
                       <a:r>
-                        <a:rPr lang="es-ES" b="1" dirty="0">
+                        <a:rPr lang="es-ES" b="1" i="1" dirty="0">
                           <a:solidFill>
                             <a:schemeClr val="tx1"/>
                           </a:solidFill>
@@ -9387,7 +9562,7 @@
                     <a:p>
                       <a:pPr algn="ctr"/>
                       <a:r>
-                        <a:rPr lang="es-ES" b="1" dirty="0">
+                        <a:rPr lang="es-ES" b="1" i="1" dirty="0">
                           <a:solidFill>
                             <a:schemeClr val="tx1"/>
                           </a:solidFill>
@@ -9395,7 +9570,7 @@
                         <a:t>(Color </a:t>
                       </a:r>
                       <a:r>
-                        <a:rPr lang="es-ES" b="1" dirty="0" err="1">
+                        <a:rPr lang="es-ES" b="1" i="1" dirty="0" err="1">
                           <a:solidFill>
                             <a:schemeClr val="tx1"/>
                           </a:solidFill>
@@ -9403,7 +9578,7 @@
                         <a:t>picker</a:t>
                       </a:r>
                       <a:r>
-                        <a:rPr lang="es-ES" b="1" dirty="0">
+                        <a:rPr lang="es-ES" b="1" i="1" dirty="0">
                           <a:solidFill>
                             <a:schemeClr val="tx1"/>
                           </a:solidFill>
@@ -9739,22 +9914,26 @@
           <a:p>
             <a:r>
               <a:rPr lang="es-ES" dirty="0"/>
-              <a:t>5 (</a:t>
-            </a:r>
-            <a:r>
-              <a:rPr lang="es-ES" dirty="0" err="1"/>
+              <a:t>5 </a:t>
+            </a:r>
+            <a:r>
+              <a:rPr lang="es-ES" i="1" dirty="0"/>
+              <a:t>(</a:t>
+            </a:r>
+            <a:r>
+              <a:rPr lang="es-ES" i="1" dirty="0" err="1"/>
               <a:t>Reset</a:t>
             </a:r>
             <a:r>
-              <a:rPr lang="es-ES" dirty="0"/>
+              <a:rPr lang="es-ES" i="1" dirty="0"/>
               <a:t> </a:t>
             </a:r>
             <a:r>
-              <a:rPr lang="es-ES" dirty="0" err="1"/>
+              <a:rPr lang="es-ES" i="1" dirty="0" err="1"/>
               <a:t>rotation</a:t>
             </a:r>
             <a:r>
-              <a:rPr lang="es-ES" dirty="0"/>
+              <a:rPr lang="es-ES" i="1" dirty="0"/>
               <a:t>)</a:t>
             </a:r>
           </a:p>
@@ -9839,14 +10018,18 @@
           <a:p>
             <a:r>
               <a:rPr lang="es-ES" dirty="0"/>
-              <a:t>2 (</a:t>
-            </a:r>
-            <a:r>
-              <a:rPr lang="es-ES" dirty="0" err="1"/>
+              <a:t>2 </a:t>
+            </a:r>
+            <a:r>
+              <a:rPr lang="es-ES" i="1" dirty="0"/>
+              <a:t>(</a:t>
+            </a:r>
+            <a:r>
+              <a:rPr lang="es-ES" i="1" dirty="0" err="1"/>
               <a:t>Fit</a:t>
             </a:r>
             <a:r>
-              <a:rPr lang="es-ES" dirty="0"/>
+              <a:rPr lang="es-ES" i="1" dirty="0"/>
               <a:t> page)</a:t>
             </a:r>
           </a:p>
@@ -9931,22 +10114,26 @@
           <a:p>
             <a:r>
               <a:rPr lang="es-ES" dirty="0"/>
-              <a:t>E (</a:t>
-            </a:r>
-            <a:r>
-              <a:rPr lang="es-ES" dirty="0" err="1"/>
+              <a:t>E </a:t>
+            </a:r>
+            <a:r>
+              <a:rPr lang="es-ES" i="1" dirty="0"/>
+              <a:t>(</a:t>
+            </a:r>
+            <a:r>
+              <a:rPr lang="es-ES" i="1" dirty="0" err="1"/>
               <a:t>Toggle</a:t>
             </a:r>
             <a:r>
-              <a:rPr lang="es-ES" dirty="0"/>
+              <a:rPr lang="es-ES" i="1" dirty="0"/>
               <a:t> </a:t>
             </a:r>
             <a:r>
-              <a:rPr lang="es-ES" dirty="0" err="1"/>
+              <a:rPr lang="es-ES" i="1" dirty="0" err="1"/>
               <a:t>eraser</a:t>
             </a:r>
             <a:r>
-              <a:rPr lang="es-ES" dirty="0"/>
+              <a:rPr lang="es-ES" i="1" dirty="0"/>
               <a:t>)</a:t>
             </a:r>
           </a:p>

</xml_diff>

<commit_message>
act doc and settings
</commit_message>
<xml_diff>
--- a/DOC/Esquema.pptx
+++ b/DOC/Esquema.pptx
@@ -5,11 +5,12 @@
     <p:sldMasterId id="2147483648" r:id="rId1"/>
   </p:sldMasterIdLst>
   <p:notesMasterIdLst>
-    <p:notesMasterId r:id="rId4"/>
+    <p:notesMasterId r:id="rId5"/>
   </p:notesMasterIdLst>
   <p:sldIdLst>
     <p:sldId id="256" r:id="rId2"/>
     <p:sldId id="257" r:id="rId3"/>
+    <p:sldId id="258" r:id="rId4"/>
   </p:sldIdLst>
   <p:sldSz cx="12192000" cy="6858000"/>
   <p:notesSz cx="6858000" cy="9144000"/>
@@ -198,7 +199,7 @@
           <a:p>
             <a:fld id="{A7B985E7-405D-41BF-9F4C-FB894C0ED85B}" type="datetimeFigureOut">
               <a:rPr lang="es-ES" smtClean="0"/>
-              <a:t>07/01/2023</a:t>
+              <a:t>14/01/2023</a:t>
             </a:fld>
             <a:endParaRPr lang="es-ES"/>
           </a:p>
@@ -549,6 +550,90 @@
 </p:notes>
 </file>
 
+<file path=ppt/notesSlides/notesSlide2.xml><?xml version="1.0" encoding="utf-8"?>
+<p:notes xmlns:a="http://schemas.openxmlformats.org/drawingml/2006/main" xmlns:r="http://schemas.openxmlformats.org/officeDocument/2006/relationships" xmlns:p="http://schemas.openxmlformats.org/presentationml/2006/main">
+  <p:cSld>
+    <p:spTree>
+      <p:nvGrpSpPr>
+        <p:cNvPr id="1" name=""/>
+        <p:cNvGrpSpPr/>
+        <p:nvPr/>
+      </p:nvGrpSpPr>
+      <p:grpSpPr>
+        <a:xfrm>
+          <a:off x="0" y="0"/>
+          <a:ext cx="0" cy="0"/>
+          <a:chOff x="0" y="0"/>
+          <a:chExt cx="0" cy="0"/>
+        </a:xfrm>
+      </p:grpSpPr>
+      <p:sp>
+        <p:nvSpPr>
+          <p:cNvPr id="2" name="Marcador de imagen de diapositiva 1"/>
+          <p:cNvSpPr>
+            <a:spLocks noGrp="1" noRot="1" noChangeAspect="1"/>
+          </p:cNvSpPr>
+          <p:nvPr>
+            <p:ph type="sldImg"/>
+          </p:nvPr>
+        </p:nvSpPr>
+        <p:spPr/>
+      </p:sp>
+      <p:sp>
+        <p:nvSpPr>
+          <p:cNvPr id="3" name="Marcador de notas 2"/>
+          <p:cNvSpPr>
+            <a:spLocks noGrp="1"/>
+          </p:cNvSpPr>
+          <p:nvPr>
+            <p:ph type="body" idx="1"/>
+          </p:nvPr>
+        </p:nvSpPr>
+        <p:spPr/>
+        <p:txBody>
+          <a:bodyPr/>
+          <a:lstStyle/>
+          <a:p>
+            <a:endParaRPr lang="es-ES" dirty="0"/>
+          </a:p>
+        </p:txBody>
+      </p:sp>
+      <p:sp>
+        <p:nvSpPr>
+          <p:cNvPr id="4" name="Marcador de número de diapositiva 3"/>
+          <p:cNvSpPr>
+            <a:spLocks noGrp="1"/>
+          </p:cNvSpPr>
+          <p:nvPr>
+            <p:ph type="sldNum" sz="quarter" idx="5"/>
+          </p:nvPr>
+        </p:nvSpPr>
+        <p:spPr/>
+        <p:txBody>
+          <a:bodyPr/>
+          <a:lstStyle/>
+          <a:p>
+            <a:fld id="{183A5C34-54E5-41EE-A8DA-4D599ACEFC63}" type="slidenum">
+              <a:rPr lang="es-ES" smtClean="0"/>
+              <a:t>3</a:t>
+            </a:fld>
+            <a:endParaRPr lang="es-ES"/>
+          </a:p>
+        </p:txBody>
+      </p:sp>
+    </p:spTree>
+    <p:extLst>
+      <p:ext uri="{BB962C8B-B14F-4D97-AF65-F5344CB8AC3E}">
+        <p14:creationId xmlns:p14="http://schemas.microsoft.com/office/powerpoint/2010/main" val="3417391834"/>
+      </p:ext>
+    </p:extLst>
+  </p:cSld>
+  <p:clrMapOvr>
+    <a:masterClrMapping/>
+  </p:clrMapOvr>
+</p:notes>
+</file>
+
 <file path=ppt/slideLayouts/slideLayout1.xml><?xml version="1.0" encoding="utf-8"?>
 <p:sldLayout xmlns:a="http://schemas.openxmlformats.org/drawingml/2006/main" xmlns:r="http://schemas.openxmlformats.org/officeDocument/2006/relationships" xmlns:p="http://schemas.openxmlformats.org/presentationml/2006/main" type="title" preserve="1">
   <p:cSld name="Diapositiva de título">
@@ -696,7 +781,7 @@
           <a:p>
             <a:fld id="{39AD9A35-D595-4934-8AAA-9408787DB05C}" type="datetimeFigureOut">
               <a:rPr lang="es-ES" smtClean="0"/>
-              <a:t>07/01/2023</a:t>
+              <a:t>14/01/2023</a:t>
             </a:fld>
             <a:endParaRPr lang="es-ES"/>
           </a:p>
@@ -894,7 +979,7 @@
           <a:p>
             <a:fld id="{39AD9A35-D595-4934-8AAA-9408787DB05C}" type="datetimeFigureOut">
               <a:rPr lang="es-ES" smtClean="0"/>
-              <a:t>07/01/2023</a:t>
+              <a:t>14/01/2023</a:t>
             </a:fld>
             <a:endParaRPr lang="es-ES"/>
           </a:p>
@@ -1102,7 +1187,7 @@
           <a:p>
             <a:fld id="{39AD9A35-D595-4934-8AAA-9408787DB05C}" type="datetimeFigureOut">
               <a:rPr lang="es-ES" smtClean="0"/>
-              <a:t>07/01/2023</a:t>
+              <a:t>14/01/2023</a:t>
             </a:fld>
             <a:endParaRPr lang="es-ES"/>
           </a:p>
@@ -1300,7 +1385,7 @@
           <a:p>
             <a:fld id="{39AD9A35-D595-4934-8AAA-9408787DB05C}" type="datetimeFigureOut">
               <a:rPr lang="es-ES" smtClean="0"/>
-              <a:t>07/01/2023</a:t>
+              <a:t>14/01/2023</a:t>
             </a:fld>
             <a:endParaRPr lang="es-ES"/>
           </a:p>
@@ -1575,7 +1660,7 @@
           <a:p>
             <a:fld id="{39AD9A35-D595-4934-8AAA-9408787DB05C}" type="datetimeFigureOut">
               <a:rPr lang="es-ES" smtClean="0"/>
-              <a:t>07/01/2023</a:t>
+              <a:t>14/01/2023</a:t>
             </a:fld>
             <a:endParaRPr lang="es-ES"/>
           </a:p>
@@ -1840,7 +1925,7 @@
           <a:p>
             <a:fld id="{39AD9A35-D595-4934-8AAA-9408787DB05C}" type="datetimeFigureOut">
               <a:rPr lang="es-ES" smtClean="0"/>
-              <a:t>07/01/2023</a:t>
+              <a:t>14/01/2023</a:t>
             </a:fld>
             <a:endParaRPr lang="es-ES"/>
           </a:p>
@@ -2252,7 +2337,7 @@
           <a:p>
             <a:fld id="{39AD9A35-D595-4934-8AAA-9408787DB05C}" type="datetimeFigureOut">
               <a:rPr lang="es-ES" smtClean="0"/>
-              <a:t>07/01/2023</a:t>
+              <a:t>14/01/2023</a:t>
             </a:fld>
             <a:endParaRPr lang="es-ES"/>
           </a:p>
@@ -2393,7 +2478,7 @@
           <a:p>
             <a:fld id="{39AD9A35-D595-4934-8AAA-9408787DB05C}" type="datetimeFigureOut">
               <a:rPr lang="es-ES" smtClean="0"/>
-              <a:t>07/01/2023</a:t>
+              <a:t>14/01/2023</a:t>
             </a:fld>
             <a:endParaRPr lang="es-ES"/>
           </a:p>
@@ -2506,7 +2591,7 @@
           <a:p>
             <a:fld id="{39AD9A35-D595-4934-8AAA-9408787DB05C}" type="datetimeFigureOut">
               <a:rPr lang="es-ES" smtClean="0"/>
-              <a:t>07/01/2023</a:t>
+              <a:t>14/01/2023</a:t>
             </a:fld>
             <a:endParaRPr lang="es-ES"/>
           </a:p>
@@ -2817,7 +2902,7 @@
           <a:p>
             <a:fld id="{39AD9A35-D595-4934-8AAA-9408787DB05C}" type="datetimeFigureOut">
               <a:rPr lang="es-ES" smtClean="0"/>
-              <a:t>07/01/2023</a:t>
+              <a:t>14/01/2023</a:t>
             </a:fld>
             <a:endParaRPr lang="es-ES"/>
           </a:p>
@@ -3105,7 +3190,7 @@
           <a:p>
             <a:fld id="{39AD9A35-D595-4934-8AAA-9408787DB05C}" type="datetimeFigureOut">
               <a:rPr lang="es-ES" smtClean="0"/>
-              <a:t>07/01/2023</a:t>
+              <a:t>14/01/2023</a:t>
             </a:fld>
             <a:endParaRPr lang="es-ES"/>
           </a:p>
@@ -3346,7 +3431,7 @@
           <a:p>
             <a:fld id="{39AD9A35-D595-4934-8AAA-9408787DB05C}" type="datetimeFigureOut">
               <a:rPr lang="es-ES" smtClean="0"/>
-              <a:t>07/01/2023</a:t>
+              <a:t>14/01/2023</a:t>
             </a:fld>
             <a:endParaRPr lang="es-ES"/>
           </a:p>
@@ -7365,13 +7450,13 @@
           <p:nvPr>
             <p:extLst>
               <p:ext uri="{D42A27DB-BD31-4B8C-83A1-F6EECF244321}">
-                <p14:modId xmlns:p14="http://schemas.microsoft.com/office/powerpoint/2010/main" val="3492759816"/>
+                <p14:modId xmlns:p14="http://schemas.microsoft.com/office/powerpoint/2010/main" val="3181952433"/>
               </p:ext>
             </p:extLst>
           </p:nvPr>
         </p:nvGraphicFramePr>
         <p:xfrm>
-          <a:off x="1307180" y="1775093"/>
+          <a:off x="1254426" y="1353062"/>
           <a:ext cx="6318739" cy="4726924"/>
         </p:xfrm>
         <a:graphic>
@@ -8484,7 +8569,7 @@
         </p:nvSpPr>
         <p:spPr>
           <a:xfrm>
-            <a:off x="838200" y="365126"/>
+            <a:off x="838200" y="252943"/>
             <a:ext cx="10515600" cy="773392"/>
           </a:xfrm>
         </p:spPr>
@@ -8494,48 +8579,12 @@
           <a:p>
             <a:pPr algn="ctr"/>
             <a:r>
-              <a:rPr lang="es-ES" dirty="0" err="1"/>
-              <a:t>My</a:t>
-            </a:r>
-            <a:r>
               <a:rPr lang="es-ES" dirty="0"/>
-              <a:t> personal </a:t>
-            </a:r>
-            <a:r>
-              <a:rPr lang="es-ES" dirty="0" err="1"/>
-              <a:t>key</a:t>
-            </a:r>
-            <a:r>
-              <a:rPr lang="es-ES" dirty="0"/>
-              <a:t> </a:t>
+              <a:t>Key </a:t>
             </a:r>
             <a:r>
               <a:rPr lang="es-ES" dirty="0" err="1"/>
               <a:t>settings</a:t>
-            </a:r>
-            <a:r>
-              <a:rPr lang="es-ES" dirty="0"/>
-              <a:t> </a:t>
-            </a:r>
-            <a:r>
-              <a:rPr lang="es-ES" dirty="0" err="1"/>
-              <a:t>for</a:t>
-            </a:r>
-            <a:r>
-              <a:rPr lang="es-ES" dirty="0"/>
-              <a:t> </a:t>
-            </a:r>
-            <a:r>
-              <a:rPr lang="es-ES" dirty="0" err="1"/>
-              <a:t>each</a:t>
-            </a:r>
-            <a:r>
-              <a:rPr lang="es-ES" dirty="0"/>
-              <a:t> </a:t>
-            </a:r>
-            <a:r>
-              <a:rPr lang="es-ES"/>
-              <a:t>key</a:t>
             </a:r>
             <a:endParaRPr lang="es-ES" dirty="0"/>
           </a:p>
@@ -8556,14 +8605,14 @@
           <p:nvPr>
             <p:extLst>
               <p:ext uri="{D42A27DB-BD31-4B8C-83A1-F6EECF244321}">
-                <p14:modId xmlns:p14="http://schemas.microsoft.com/office/powerpoint/2010/main" val="2458355116"/>
+                <p14:modId xmlns:p14="http://schemas.microsoft.com/office/powerpoint/2010/main" val="495721808"/>
               </p:ext>
             </p:extLst>
           </p:nvPr>
         </p:nvGraphicFramePr>
         <p:xfrm>
-          <a:off x="1307179" y="1783530"/>
-          <a:ext cx="6318739" cy="4747891"/>
+          <a:off x="1254425" y="1361499"/>
+          <a:ext cx="6318739" cy="4726924"/>
         </p:xfrm>
         <a:graphic>
           <a:graphicData uri="http://schemas.openxmlformats.org/drawingml/2006/table">
@@ -8607,30 +8656,73 @@
                     <a:bodyPr/>
                     <a:lstStyle/>
                     <a:p>
-                      <a:pPr marL="0" marR="0" lvl="0" indent="0" algn="ctr" defTabSz="914400" rtl="0" eaLnBrk="1" fontAlgn="auto" latinLnBrk="0" hangingPunct="1">
-                        <a:lnSpc>
-                          <a:spcPct val="100000"/>
-                        </a:lnSpc>
-                        <a:spcBef>
-                          <a:spcPts val="0"/>
-                        </a:spcBef>
-                        <a:spcAft>
-                          <a:spcPts val="0"/>
-                        </a:spcAft>
-                        <a:buClrTx/>
-                        <a:buSzTx/>
-                        <a:buFontTx/>
-                        <a:buNone/>
-                        <a:tabLst/>
-                        <a:defRPr/>
-                      </a:pPr>
+                      <a:pPr algn="ctr"/>
                       <a:r>
                         <a:rPr lang="es-ES" b="1" dirty="0">
                           <a:solidFill>
                             <a:schemeClr val="tx1"/>
                           </a:solidFill>
                         </a:rPr>
-                        <a:t>Del</a:t>
+                        <a:t>Q</a:t>
+                      </a:r>
+                    </a:p>
+                    <a:p>
+                      <a:pPr algn="ctr"/>
+                      <a:r>
+                        <a:rPr lang="es-ES" b="1" i="1" dirty="0">
+                          <a:solidFill>
+                            <a:schemeClr val="tx1"/>
+                          </a:solidFill>
+                        </a:rPr>
+                        <a:t>(</a:t>
+                      </a:r>
+                      <a:r>
+                        <a:rPr lang="es-ES" b="1" i="1" dirty="0" err="1">
+                          <a:solidFill>
+                            <a:schemeClr val="tx1"/>
+                          </a:solidFill>
+                        </a:rPr>
+                        <a:t>Freehand</a:t>
+                      </a:r>
+                      <a:r>
+                        <a:rPr lang="es-ES" b="1" i="1" dirty="0">
+                          <a:solidFill>
+                            <a:schemeClr val="tx1"/>
+                          </a:solidFill>
+                        </a:rPr>
+                        <a:t> </a:t>
+                      </a:r>
+                      <a:r>
+                        <a:rPr lang="es-ES" b="1" i="1" dirty="0" err="1">
+                          <a:solidFill>
+                            <a:schemeClr val="tx1"/>
+                          </a:solidFill>
+                        </a:rPr>
+                        <a:t>select</a:t>
+                      </a:r>
+                      <a:r>
+                        <a:rPr lang="es-ES" b="1" i="1" dirty="0">
+                          <a:solidFill>
+                            <a:schemeClr val="tx1"/>
+                          </a:solidFill>
+                        </a:rPr>
+                        <a:t>. </a:t>
+                      </a:r>
+                      <a:r>
+                        <a:rPr lang="es-ES" b="1" i="1" dirty="0" err="1">
+                          <a:solidFill>
+                            <a:schemeClr val="tx1"/>
+                          </a:solidFill>
+                        </a:rPr>
+                        <a:t>temp</a:t>
+                      </a:r>
+                      <a:r>
+                        <a:rPr lang="es-ES" b="1" i="1" dirty="0">
+                          <a:solidFill>
+                            <a:schemeClr val="tx1"/>
+                          </a:solidFill>
+                        </a:rPr>
+                        <a:t>.)</a:t>
                       </a:r>
                     </a:p>
                   </a:txBody>
@@ -8650,7 +8742,7 @@
                             <a:schemeClr val="tx1"/>
                           </a:solidFill>
                         </a:rPr>
-                        <a:t>Q</a:t>
+                        <a:t>T</a:t>
                       </a:r>
                     </a:p>
                     <a:p>
@@ -8669,23 +8761,7 @@
                             <a:schemeClr val="tx1"/>
                           </a:solidFill>
                         </a:rPr>
-                        <a:t>Freehand</a:t>
-                      </a:r>
-                      <a:r>
-                        <a:rPr lang="es-ES" b="1" i="1" dirty="0">
-                          <a:solidFill>
-                            <a:schemeClr val="tx1"/>
-                          </a:solidFill>
-                        </a:rPr>
-                        <a:t> </a:t>
-                      </a:r>
-                      <a:r>
-                        <a:rPr lang="es-ES" b="1" i="1" dirty="0" err="1">
-                          <a:solidFill>
-                            <a:schemeClr val="tx1"/>
-                          </a:solidFill>
-                        </a:rPr>
-                        <a:t>selection</a:t>
+                        <a:t>Move</a:t>
                       </a:r>
                       <a:r>
                         <a:rPr lang="es-ES" b="1" i="1" dirty="0">
@@ -8740,22 +8816,30 @@
                     <a:p>
                       <a:pPr algn="ctr"/>
                       <a:r>
-                        <a:rPr lang="es-ES" b="1" dirty="0">
+                        <a:rPr lang="es-ES" b="1" i="1" dirty="0" err="1">
                           <a:solidFill>
                             <a:schemeClr val="tx1"/>
                           </a:solidFill>
                         </a:rPr>
-                        <a:t>T</a:t>
-                      </a:r>
-                    </a:p>
-                    <a:p>
-                      <a:pPr algn="ctr"/>
+                        <a:t>Ctrl</a:t>
+                      </a:r>
                       <a:r>
                         <a:rPr lang="es-ES" b="1" i="1" dirty="0">
                           <a:solidFill>
                             <a:schemeClr val="tx1"/>
                           </a:solidFill>
                         </a:rPr>
+                        <a:t>-D</a:t>
+                      </a:r>
+                    </a:p>
+                    <a:p>
+                      <a:pPr algn="ctr"/>
+                      <a:r>
+                        <a:rPr lang="es-ES" b="1" i="1" dirty="0">
+                          <a:solidFill>
+                            <a:schemeClr val="tx1"/>
+                          </a:solidFill>
+                        </a:rPr>
                         <a:t>(</a:t>
                       </a:r>
                       <a:r>
@@ -8764,7 +8848,7 @@
                             <a:schemeClr val="tx1"/>
                           </a:solidFill>
                         </a:rPr>
-                        <a:t>Move</a:t>
+                        <a:t>Deselect</a:t>
                       </a:r>
                       <a:r>
                         <a:rPr lang="es-ES" b="1" i="1" dirty="0">
@@ -8772,40 +8856,16 @@
                             <a:schemeClr val="tx1"/>
                           </a:solidFill>
                         </a:rPr>
-                        <a:t> </a:t>
-                      </a:r>
-                      <a:r>
-                        <a:rPr lang="es-ES" b="1" i="1" dirty="0" err="1">
-                          <a:solidFill>
-                            <a:schemeClr val="tx1"/>
-                          </a:solidFill>
-                        </a:rPr>
-                        <a:t>tool</a:t>
-                      </a:r>
-                      <a:r>
-                        <a:rPr lang="es-ES" b="1" i="1" dirty="0">
-                          <a:solidFill>
-                            <a:schemeClr val="tx1"/>
-                          </a:solidFill>
-                        </a:rPr>
-                        <a:t> </a:t>
-                      </a:r>
-                      <a:r>
-                        <a:rPr lang="es-ES" b="1" i="1" dirty="0" err="1">
-                          <a:solidFill>
-                            <a:schemeClr val="tx1"/>
-                          </a:solidFill>
-                        </a:rPr>
-                        <a:t>temp</a:t>
-                      </a:r>
-                      <a:r>
-                        <a:rPr lang="es-ES" b="1" i="1" dirty="0">
-                          <a:solidFill>
-                            <a:schemeClr val="tx1"/>
-                          </a:solidFill>
-                        </a:rPr>
-                        <a:t>.)</a:t>
-                      </a:r>
+                        <a:t>)</a:t>
+                      </a:r>
+                    </a:p>
+                    <a:p>
+                      <a:pPr algn="ctr"/>
+                      <a:endParaRPr lang="es-ES" b="1" i="1" dirty="0">
+                        <a:solidFill>
+                          <a:schemeClr val="tx1"/>
+                        </a:solidFill>
+                      </a:endParaRPr>
                     </a:p>
                   </a:txBody>
                   <a:tcPr anchor="ctr">
@@ -8819,48 +8879,30 @@
                     <a:p>
                       <a:pPr algn="ctr"/>
                       <a:r>
-                        <a:rPr lang="es-ES" b="1" i="1" dirty="0" err="1">
+                        <a:rPr lang="es-ES" sz="2000" b="1" i="1" u="sng" dirty="0">
                           <a:solidFill>
-                            <a:schemeClr val="tx1"/>
+                            <a:schemeClr val="accent2">
+                              <a:lumMod val="50000"/>
+                            </a:schemeClr>
                           </a:solidFill>
                         </a:rPr>
-                        <a:t>Ctrl</a:t>
-                      </a:r>
-                      <a:r>
-                        <a:rPr lang="es-ES" b="1" i="1" dirty="0">
-                          <a:solidFill>
-                            <a:schemeClr val="tx1"/>
-                          </a:solidFill>
-                        </a:rPr>
-                        <a:t>-D</a:t>
-                      </a:r>
+                        <a:t>Local Shift</a:t>
+                      </a:r>
+                      <a:endParaRPr lang="es-ES" sz="1800" b="1" i="1" u="sng" dirty="0">
+                        <a:solidFill>
+                          <a:schemeClr val="accent2">
+                            <a:lumMod val="50000"/>
+                          </a:schemeClr>
+                        </a:solidFill>
+                      </a:endParaRPr>
                     </a:p>
                     <a:p>
                       <a:pPr algn="ctr"/>
-                      <a:r>
-                        <a:rPr lang="es-ES" b="1" i="1" dirty="0">
-                          <a:solidFill>
-                            <a:schemeClr val="tx1"/>
-                          </a:solidFill>
-                        </a:rPr>
-                        <a:t>(</a:t>
-                      </a:r>
-                      <a:r>
-                        <a:rPr lang="es-ES" b="1" i="1" dirty="0" err="1">
-                          <a:solidFill>
-                            <a:schemeClr val="tx1"/>
-                          </a:solidFill>
-                        </a:rPr>
-                        <a:t>Deselect</a:t>
-                      </a:r>
-                      <a:r>
-                        <a:rPr lang="es-ES" b="1" i="1" dirty="0">
-                          <a:solidFill>
-                            <a:schemeClr val="tx1"/>
-                          </a:solidFill>
-                        </a:rPr>
-                        <a:t>)</a:t>
-                      </a:r>
+                      <a:endParaRPr lang="es-ES" b="1" i="1" dirty="0">
+                        <a:solidFill>
+                          <a:schemeClr val="tx1"/>
+                        </a:solidFill>
+                      </a:endParaRPr>
                     </a:p>
                   </a:txBody>
                   <a:tcPr anchor="ctr">
@@ -8937,68 +8979,13 @@
                         <a:t>)</a:t>
                       </a:r>
                     </a:p>
-                  </a:txBody>
-                  <a:tcPr anchor="ctr">
-                    <a:noFill/>
-                  </a:tcPr>
-                </a:tc>
-                <a:tc>
-                  <a:txBody>
-                    <a:bodyPr/>
-                    <a:lstStyle/>
                     <a:p>
                       <a:pPr algn="ctr"/>
-                      <a:r>
-                        <a:rPr lang="es-ES" b="1" dirty="0">
-                          <a:solidFill>
-                            <a:schemeClr val="tx1"/>
-                          </a:solidFill>
-                        </a:rPr>
-                        <a:t>S</a:t>
-                      </a:r>
-                    </a:p>
-                    <a:p>
-                      <a:pPr algn="ctr"/>
-                      <a:r>
-                        <a:rPr lang="es-ES" b="1" i="1" dirty="0">
-                          <a:solidFill>
-                            <a:schemeClr val="tx1"/>
-                          </a:solidFill>
-                        </a:rPr>
-                        <a:t>(</a:t>
-                      </a:r>
-                      <a:r>
-                        <a:rPr lang="es-ES" b="1" i="1" dirty="0" err="1">
-                          <a:solidFill>
-                            <a:schemeClr val="tx1"/>
-                          </a:solidFill>
-                        </a:rPr>
-                        <a:t>Isolate</a:t>
-                      </a:r>
-                      <a:r>
-                        <a:rPr lang="es-ES" b="1" i="1" dirty="0">
-                          <a:solidFill>
-                            <a:schemeClr val="tx1"/>
-                          </a:solidFill>
-                        </a:rPr>
-                        <a:t> </a:t>
-                      </a:r>
-                      <a:r>
-                        <a:rPr lang="es-ES" b="1" i="1" dirty="0" err="1">
-                          <a:solidFill>
-                            <a:schemeClr val="tx1"/>
-                          </a:solidFill>
-                        </a:rPr>
-                        <a:t>layer</a:t>
-                      </a:r>
-                      <a:r>
-                        <a:rPr lang="es-ES" b="1" i="1" dirty="0">
-                          <a:solidFill>
-                            <a:schemeClr val="tx1"/>
-                          </a:solidFill>
-                        </a:rPr>
-                        <a:t>)</a:t>
-                      </a:r>
+                      <a:endParaRPr lang="es-ES" b="1" i="1" dirty="0">
+                        <a:solidFill>
+                          <a:schemeClr val="tx1"/>
+                        </a:solidFill>
+                      </a:endParaRPr>
                     </a:p>
                   </a:txBody>
                   <a:tcPr anchor="ctr">
@@ -9017,7 +9004,7 @@
                             <a:schemeClr val="tx1"/>
                           </a:solidFill>
                         </a:rPr>
-                        <a:t>R</a:t>
+                        <a:t>S</a:t>
                       </a:r>
                     </a:p>
                     <a:p>
@@ -9036,7 +9023,7 @@
                             <a:schemeClr val="tx1"/>
                           </a:solidFill>
                         </a:rPr>
-                        <a:t>Select</a:t>
+                        <a:t>Isolate</a:t>
                       </a:r>
                       <a:r>
                         <a:rPr lang="es-ES" b="1" i="1" dirty="0">
@@ -9062,6 +9049,85 @@
                         </a:rPr>
                         <a:t>)</a:t>
                       </a:r>
+                    </a:p>
+                    <a:p>
+                      <a:pPr algn="ctr"/>
+                      <a:endParaRPr lang="es-ES" b="1" i="1" dirty="0">
+                        <a:solidFill>
+                          <a:schemeClr val="tx1"/>
+                        </a:solidFill>
+                      </a:endParaRPr>
+                    </a:p>
+                  </a:txBody>
+                  <a:tcPr anchor="ctr">
+                    <a:noFill/>
+                  </a:tcPr>
+                </a:tc>
+                <a:tc>
+                  <a:txBody>
+                    <a:bodyPr/>
+                    <a:lstStyle/>
+                    <a:p>
+                      <a:pPr algn="ctr"/>
+                      <a:r>
+                        <a:rPr lang="es-ES" b="1" dirty="0">
+                          <a:solidFill>
+                            <a:schemeClr val="tx1"/>
+                          </a:solidFill>
+                        </a:rPr>
+                        <a:t>R</a:t>
+                      </a:r>
+                    </a:p>
+                    <a:p>
+                      <a:pPr algn="ctr"/>
+                      <a:r>
+                        <a:rPr lang="es-ES" b="1" i="1" dirty="0">
+                          <a:solidFill>
+                            <a:schemeClr val="tx1"/>
+                          </a:solidFill>
+                        </a:rPr>
+                        <a:t>(</a:t>
+                      </a:r>
+                      <a:r>
+                        <a:rPr lang="es-ES" b="1" i="1" dirty="0" err="1">
+                          <a:solidFill>
+                            <a:schemeClr val="tx1"/>
+                          </a:solidFill>
+                        </a:rPr>
+                        <a:t>Select</a:t>
+                      </a:r>
+                      <a:r>
+                        <a:rPr lang="es-ES" b="1" i="1" dirty="0">
+                          <a:solidFill>
+                            <a:schemeClr val="tx1"/>
+                          </a:solidFill>
+                        </a:rPr>
+                        <a:t> </a:t>
+                      </a:r>
+                      <a:r>
+                        <a:rPr lang="es-ES" b="1" i="1" dirty="0" err="1">
+                          <a:solidFill>
+                            <a:schemeClr val="tx1"/>
+                          </a:solidFill>
+                        </a:rPr>
+                        <a:t>layer</a:t>
+                      </a:r>
+                      <a:r>
+                        <a:rPr lang="es-ES" b="1" i="1" dirty="0">
+                          <a:solidFill>
+                            <a:schemeClr val="tx1"/>
+                          </a:solidFill>
+                        </a:rPr>
+                        <a:t>)</a:t>
+                      </a:r>
+                    </a:p>
+                    <a:p>
+                      <a:pPr algn="ctr"/>
+                      <a:endParaRPr lang="es-ES" b="1" i="1" dirty="0">
+                        <a:solidFill>
+                          <a:schemeClr val="tx1"/>
+                        </a:solidFill>
+                      </a:endParaRPr>
                     </a:p>
                   </a:txBody>
                   <a:tcPr anchor="ctr">
@@ -9179,60 +9245,21 @@
                         <a:t>Shift</a:t>
                       </a:r>
                     </a:p>
-                  </a:txBody>
-                  <a:tcPr anchor="ctr">
-                    <a:noFill/>
-                  </a:tcPr>
-                </a:tc>
-                <a:tc>
-                  <a:txBody>
-                    <a:bodyPr/>
-                    <a:lstStyle/>
                     <a:p>
                       <a:pPr algn="ctr"/>
-                      <a:r>
-                        <a:rPr lang="es-ES" b="1" dirty="0" err="1">
-                          <a:solidFill>
-                            <a:schemeClr val="tx1"/>
-                          </a:solidFill>
-                        </a:rPr>
-                        <a:t>Ctrl</a:t>
-                      </a:r>
-                      <a:r>
-                        <a:rPr lang="es-ES" b="1" dirty="0">
-                          <a:solidFill>
-                            <a:schemeClr val="tx1"/>
-                          </a:solidFill>
-                        </a:rPr>
-                        <a:t> &lt;</a:t>
-                      </a:r>
+                      <a:endParaRPr lang="es-ES" b="1" dirty="0">
+                        <a:solidFill>
+                          <a:schemeClr val="tx1"/>
+                        </a:solidFill>
+                      </a:endParaRPr>
                     </a:p>
                     <a:p>
                       <a:pPr algn="ctr"/>
-                      <a:r>
-                        <a:rPr lang="es-ES" b="1" i="1" dirty="0">
-                          <a:solidFill>
-                            <a:schemeClr val="tx1"/>
-                          </a:solidFill>
-                        </a:rPr>
-                        <a:t>(</a:t>
-                      </a:r>
-                      <a:r>
-                        <a:rPr lang="es-ES" b="1" i="1" dirty="0" err="1">
-                          <a:solidFill>
-                            <a:schemeClr val="tx1"/>
-                          </a:solidFill>
-                        </a:rPr>
-                        <a:t>Shade</a:t>
-                      </a:r>
-                      <a:r>
-                        <a:rPr lang="es-ES" b="1" i="1" dirty="0">
-                          <a:solidFill>
-                            <a:schemeClr val="tx1"/>
-                          </a:solidFill>
-                        </a:rPr>
-                        <a:t> color selector)</a:t>
-                      </a:r>
+                      <a:endParaRPr lang="es-ES" b="1" dirty="0">
+                        <a:solidFill>
+                          <a:schemeClr val="tx1"/>
+                        </a:solidFill>
+                      </a:endParaRPr>
                     </a:p>
                   </a:txBody>
                   <a:tcPr anchor="ctr">
@@ -9246,39 +9273,47 @@
                     <a:p>
                       <a:pPr algn="ctr"/>
                       <a:r>
+                        <a:rPr lang="es-ES" b="1" dirty="0" err="1">
+                          <a:solidFill>
+                            <a:schemeClr val="tx1"/>
+                          </a:solidFill>
+                        </a:rPr>
+                        <a:t>Ctrl</a:t>
+                      </a:r>
+                      <a:r>
                         <a:rPr lang="es-ES" b="1" dirty="0">
                           <a:solidFill>
                             <a:schemeClr val="tx1"/>
                           </a:solidFill>
                         </a:rPr>
-                        <a:t>X</a:t>
+                        <a:t> &lt;</a:t>
                       </a:r>
                     </a:p>
                     <a:p>
                       <a:pPr algn="ctr"/>
                       <a:r>
-                        <a:rPr lang="es-ES" b="1" dirty="0">
+                        <a:rPr lang="es-ES" b="1" i="1" dirty="0">
                           <a:solidFill>
                             <a:schemeClr val="tx1"/>
                           </a:solidFill>
                         </a:rPr>
-                        <a:t>(Exchange </a:t>
-                      </a:r>
-                      <a:r>
-                        <a:rPr lang="es-ES" b="1" dirty="0" err="1">
+                        <a:t>(</a:t>
+                      </a:r>
+                      <a:r>
+                        <a:rPr lang="es-ES" b="1" i="1" dirty="0" err="1">
                           <a:solidFill>
                             <a:schemeClr val="tx1"/>
                           </a:solidFill>
                         </a:rPr>
-                        <a:t>front</a:t>
-                      </a:r>
-                      <a:r>
-                        <a:rPr lang="es-ES" b="1" dirty="0">
+                        <a:t>Shade</a:t>
+                      </a:r>
+                      <a:r>
+                        <a:rPr lang="es-ES" b="1" i="1" dirty="0">
                           <a:solidFill>
                             <a:schemeClr val="tx1"/>
                           </a:solidFill>
                         </a:rPr>
-                        <a:t> and back color)</a:t>
+                        <a:t> color selector)</a:t>
                       </a:r>
                     </a:p>
                   </a:txBody>
@@ -9298,35 +9333,121 @@
                             <a:schemeClr val="tx1"/>
                           </a:solidFill>
                         </a:rPr>
-                        <a:t>V</a:t>
+                        <a:t>Z</a:t>
                       </a:r>
                     </a:p>
                     <a:p>
                       <a:pPr algn="ctr"/>
                       <a:r>
-                        <a:rPr lang="es-ES" b="1" dirty="0">
+                        <a:rPr lang="es-ES" b="1" i="1" dirty="0">
                           <a:solidFill>
                             <a:schemeClr val="tx1"/>
                           </a:solidFill>
                         </a:rPr>
-                        <a:t>(</a:t>
-                      </a:r>
-                      <a:r>
-                        <a:rPr lang="es-ES" b="1" dirty="0" err="1">
+                        <a:t>(Pie </a:t>
+                      </a:r>
+                      <a:r>
+                        <a:rPr lang="es-ES" b="1" i="1" dirty="0" err="1">
                           <a:solidFill>
                             <a:schemeClr val="tx1"/>
                           </a:solidFill>
                         </a:rPr>
-                        <a:t>Lines</a:t>
-                      </a:r>
-                      <a:r>
-                        <a:rPr lang="es-ES" b="1" dirty="0">
+                        <a:t>menu</a:t>
+                      </a:r>
+                      <a:r>
+                        <a:rPr lang="es-ES" b="1" i="1" dirty="0">
                           <a:solidFill>
                             <a:schemeClr val="tx1"/>
                           </a:solidFill>
                         </a:rPr>
                         <a:t>)</a:t>
                       </a:r>
+                    </a:p>
+                    <a:p>
+                      <a:pPr algn="ctr"/>
+                      <a:endParaRPr lang="es-ES" b="1" dirty="0">
+                        <a:solidFill>
+                          <a:schemeClr val="tx1"/>
+                        </a:solidFill>
+                      </a:endParaRPr>
+                    </a:p>
+                  </a:txBody>
+                  <a:tcPr anchor="ctr">
+                    <a:noFill/>
+                  </a:tcPr>
+                </a:tc>
+                <a:tc>
+                  <a:txBody>
+                    <a:bodyPr/>
+                    <a:lstStyle/>
+                    <a:p>
+                      <a:pPr algn="ctr"/>
+                      <a:r>
+                        <a:rPr lang="es-ES" sz="1800" b="1" dirty="0">
+                          <a:solidFill>
+                            <a:schemeClr val="tx1"/>
+                          </a:solidFill>
+                        </a:rPr>
+                        <a:t>V</a:t>
+                      </a:r>
+                    </a:p>
+                    <a:p>
+                      <a:pPr algn="ctr"/>
+                      <a:r>
+                        <a:rPr lang="es-ES" sz="1800" b="1" i="1" dirty="0">
+                          <a:solidFill>
+                            <a:schemeClr val="tx1"/>
+                          </a:solidFill>
+                        </a:rPr>
+                        <a:t>(</a:t>
+                      </a:r>
+                      <a:r>
+                        <a:rPr lang="es-ES" sz="1800" b="1" i="1" dirty="0" err="1">
+                          <a:solidFill>
+                            <a:schemeClr val="tx1"/>
+                          </a:solidFill>
+                        </a:rPr>
+                        <a:t>Lines</a:t>
+                      </a:r>
+                      <a:r>
+                        <a:rPr lang="es-ES" sz="1800" b="1" i="1" dirty="0">
+                          <a:solidFill>
+                            <a:schemeClr val="tx1"/>
+                          </a:solidFill>
+                        </a:rPr>
+                        <a:t> </a:t>
+                      </a:r>
+                      <a:r>
+                        <a:rPr lang="es-ES" sz="1800" b="1" i="1" dirty="0" err="1">
+                          <a:solidFill>
+                            <a:schemeClr val="tx1"/>
+                          </a:solidFill>
+                        </a:rPr>
+                        <a:t>temp</a:t>
+                      </a:r>
+                      <a:r>
+                        <a:rPr lang="es-ES" sz="1800" b="1" i="1" dirty="0">
+                          <a:solidFill>
+                            <a:schemeClr val="tx1"/>
+                          </a:solidFill>
+                        </a:rPr>
+                        <a:t>.)</a:t>
+                      </a:r>
+                      <a:endParaRPr lang="es-ES" sz="2400" b="1" i="1" u="sng" dirty="0">
+                        <a:solidFill>
+                          <a:schemeClr val="accent2">
+                            <a:lumMod val="50000"/>
+                          </a:schemeClr>
+                        </a:solidFill>
+                      </a:endParaRPr>
+                    </a:p>
+                    <a:p>
+                      <a:pPr algn="ctr"/>
+                      <a:endParaRPr lang="es-ES" sz="1800" b="1" dirty="0">
+                        <a:solidFill>
+                          <a:schemeClr val="tx1"/>
+                        </a:solidFill>
+                      </a:endParaRPr>
                     </a:p>
                   </a:txBody>
                   <a:tcPr anchor="ctr">
@@ -9387,60 +9508,13 @@
                         <a:t>)</a:t>
                       </a:r>
                     </a:p>
-                  </a:txBody>
-                  <a:tcPr anchor="ctr">
-                    <a:noFill/>
-                  </a:tcPr>
-                </a:tc>
-                <a:tc>
-                  <a:txBody>
-                    <a:bodyPr/>
-                    <a:lstStyle/>
                     <a:p>
                       <a:pPr algn="ctr"/>
-                      <a:r>
-                        <a:rPr lang="es-ES" b="1" dirty="0" err="1">
-                          <a:solidFill>
-                            <a:schemeClr val="tx1"/>
-                          </a:solidFill>
-                        </a:rPr>
-                        <a:t>Ctrl</a:t>
-                      </a:r>
-                      <a:r>
-                        <a:rPr lang="es-ES" b="1" dirty="0">
-                          <a:solidFill>
-                            <a:schemeClr val="tx1"/>
-                          </a:solidFill>
-                        </a:rPr>
-                        <a:t> Z</a:t>
-                      </a:r>
-                    </a:p>
-                    <a:p>
-                      <a:pPr algn="ctr"/>
-                      <a:r>
-                        <a:rPr lang="es-ES" b="1" i="1" dirty="0">
-                          <a:solidFill>
-                            <a:schemeClr val="tx1"/>
-                          </a:solidFill>
-                        </a:rPr>
-                        <a:t>(</a:t>
-                      </a:r>
-                      <a:r>
-                        <a:rPr lang="es-ES" b="1" i="1" dirty="0" err="1">
-                          <a:solidFill>
-                            <a:schemeClr val="tx1"/>
-                          </a:solidFill>
-                        </a:rPr>
-                        <a:t>Undo</a:t>
-                      </a:r>
-                      <a:r>
-                        <a:rPr lang="es-ES" b="1" i="1" dirty="0">
-                          <a:solidFill>
-                            <a:schemeClr val="tx1"/>
-                          </a:solidFill>
-                        </a:rPr>
-                        <a:t>)</a:t>
-                      </a:r>
+                      <a:endParaRPr lang="es-ES" b="1" i="1" dirty="0">
+                        <a:solidFill>
+                          <a:schemeClr val="tx1"/>
+                        </a:solidFill>
+                      </a:endParaRPr>
                     </a:p>
                   </a:txBody>
                   <a:tcPr anchor="ctr">
@@ -9454,13 +9528,56 @@
                     <a:p>
                       <a:pPr algn="ctr"/>
                       <a:r>
+                        <a:rPr lang="es-ES" b="1" dirty="0" err="1">
+                          <a:solidFill>
+                            <a:schemeClr val="tx1"/>
+                          </a:solidFill>
+                        </a:rPr>
+                        <a:t>Ctrl</a:t>
+                      </a:r>
+                      <a:r>
                         <a:rPr lang="es-ES" b="1" dirty="0">
                           <a:solidFill>
                             <a:schemeClr val="tx1"/>
                           </a:solidFill>
                         </a:rPr>
-                        <a:t>Alt</a:t>
-                      </a:r>
+                        <a:t> Z</a:t>
+                      </a:r>
+                    </a:p>
+                    <a:p>
+                      <a:pPr algn="ctr"/>
+                      <a:r>
+                        <a:rPr lang="es-ES" b="1" i="1" dirty="0">
+                          <a:solidFill>
+                            <a:schemeClr val="tx1"/>
+                          </a:solidFill>
+                        </a:rPr>
+                        <a:t>(</a:t>
+                      </a:r>
+                      <a:r>
+                        <a:rPr lang="es-ES" b="1" i="1" dirty="0" err="1">
+                          <a:solidFill>
+                            <a:schemeClr val="tx1"/>
+                          </a:solidFill>
+                        </a:rPr>
+                        <a:t>Undo</a:t>
+                      </a:r>
+                      <a:r>
+                        <a:rPr lang="es-ES" b="1" i="1" dirty="0">
+                          <a:solidFill>
+                            <a:schemeClr val="tx1"/>
+                          </a:solidFill>
+                        </a:rPr>
+                        <a:t>)</a:t>
+                      </a:r>
+                    </a:p>
+                    <a:p>
+                      <a:pPr algn="ctr"/>
+                      <a:endParaRPr lang="es-ES" b="1" i="1" dirty="0">
+                        <a:solidFill>
+                          <a:schemeClr val="tx1"/>
+                        </a:solidFill>
+                      </a:endParaRPr>
                     </a:p>
                   </a:txBody>
                   <a:tcPr anchor="ctr">
@@ -9473,12 +9590,40 @@
                     <a:lstStyle/>
                     <a:p>
                       <a:pPr algn="ctr"/>
+                      <a:r>
+                        <a:rPr lang="es-ES" b="1" dirty="0">
+                          <a:solidFill>
+                            <a:schemeClr val="tx1"/>
+                          </a:solidFill>
+                        </a:rPr>
+                        <a:t>Alt</a:t>
+                      </a:r>
+                    </a:p>
+                    <a:p>
+                      <a:pPr algn="ctr"/>
                       <a:endParaRPr lang="es-ES" b="1" dirty="0">
                         <a:solidFill>
                           <a:schemeClr val="tx1"/>
                         </a:solidFill>
                       </a:endParaRPr>
                     </a:p>
+                    <a:p>
+                      <a:pPr algn="ctr"/>
+                      <a:endParaRPr lang="es-ES" b="1" dirty="0">
+                        <a:solidFill>
+                          <a:schemeClr val="tx1"/>
+                        </a:solidFill>
+                      </a:endParaRPr>
+                    </a:p>
+                  </a:txBody>
+                  <a:tcPr anchor="ctr">
+                    <a:noFill/>
+                  </a:tcPr>
+                </a:tc>
+                <a:tc>
+                  <a:txBody>
+                    <a:bodyPr/>
+                    <a:lstStyle/>
                     <a:p>
                       <a:pPr algn="ctr"/>
                       <a:r>
@@ -9554,7 +9699,7 @@
         </p:nvSpPr>
         <p:spPr>
           <a:xfrm>
-            <a:off x="8088297" y="1755091"/>
+            <a:off x="8035543" y="1333060"/>
             <a:ext cx="1526220" cy="1508763"/>
           </a:xfrm>
           <a:prstGeom prst="ellipse">
@@ -9635,7 +9780,7 @@
         </p:nvSpPr>
         <p:spPr>
           <a:xfrm>
-            <a:off x="8088297" y="4984111"/>
+            <a:off x="8035543" y="4562080"/>
             <a:ext cx="1526220" cy="1508763"/>
           </a:xfrm>
           <a:prstGeom prst="ellipse">
@@ -9704,7 +9849,7 @@
         </p:nvSpPr>
         <p:spPr>
           <a:xfrm>
-            <a:off x="8088297" y="3369601"/>
+            <a:off x="8035543" y="2947570"/>
             <a:ext cx="1526220" cy="1508763"/>
           </a:xfrm>
           <a:prstGeom prst="ellipse">
@@ -9780,7 +9925,7 @@
         </p:nvSpPr>
         <p:spPr>
           <a:xfrm>
-            <a:off x="9721787" y="2133770"/>
+            <a:off x="9669033" y="1711739"/>
             <a:ext cx="2067758" cy="646331"/>
           </a:xfrm>
           <a:prstGeom prst="rect">
@@ -9887,7 +10032,7 @@
         </p:nvSpPr>
         <p:spPr>
           <a:xfrm>
-            <a:off x="9721787" y="3691448"/>
+            <a:off x="9669033" y="3269417"/>
             <a:ext cx="2067758" cy="646331"/>
           </a:xfrm>
           <a:prstGeom prst="rect">
@@ -9986,7 +10131,7 @@
         </p:nvSpPr>
         <p:spPr>
           <a:xfrm>
-            <a:off x="9721787" y="5346781"/>
+            <a:off x="9669033" y="4924750"/>
             <a:ext cx="2067758" cy="646331"/>
           </a:xfrm>
           <a:prstGeom prst="rect">
@@ -10079,10 +10224,2919 @@
           </a:p>
         </p:txBody>
       </p:sp>
+      <p:sp>
+        <p:nvSpPr>
+          <p:cNvPr id="3" name="Título 1">
+            <a:extLst>
+              <a:ext uri="{FF2B5EF4-FFF2-40B4-BE49-F238E27FC236}">
+                <a16:creationId xmlns:a16="http://schemas.microsoft.com/office/drawing/2014/main" id="{DE08E2A4-3FFB-53A1-7929-1987309787BE}"/>
+              </a:ext>
+            </a:extLst>
+          </p:cNvPr>
+          <p:cNvSpPr txBox="1">
+            <a:spLocks/>
+          </p:cNvSpPr>
+          <p:nvPr/>
+        </p:nvSpPr>
+        <p:spPr>
+          <a:xfrm>
+            <a:off x="1199284" y="6070843"/>
+            <a:ext cx="8806362" cy="773392"/>
+          </a:xfrm>
+          <a:prstGeom prst="rect">
+            <a:avLst/>
+          </a:prstGeom>
+        </p:spPr>
+        <p:txBody>
+          <a:bodyPr vert="horz" lIns="91440" tIns="45720" rIns="91440" bIns="45720" rtlCol="0" anchor="ctr">
+            <a:normAutofit/>
+          </a:bodyPr>
+          <a:lstStyle>
+            <a:lvl1pPr algn="l" defTabSz="914400" rtl="0" eaLnBrk="1" latinLnBrk="0" hangingPunct="1">
+              <a:lnSpc>
+                <a:spcPct val="90000"/>
+              </a:lnSpc>
+              <a:spcBef>
+                <a:spcPct val="0"/>
+              </a:spcBef>
+              <a:buNone/>
+              <a:defRPr sz="4400" kern="1200">
+                <a:solidFill>
+                  <a:schemeClr val="tx1"/>
+                </a:solidFill>
+                <a:latin typeface="+mj-lt"/>
+                <a:ea typeface="+mj-ea"/>
+                <a:cs typeface="+mj-cs"/>
+              </a:defRPr>
+            </a:lvl1pPr>
+          </a:lstStyle>
+          <a:p>
+            <a:r>
+              <a:rPr lang="es-ES" sz="2400" b="1" dirty="0" err="1">
+                <a:solidFill>
+                  <a:schemeClr val="accent2">
+                    <a:lumMod val="50000"/>
+                  </a:schemeClr>
+                </a:solidFill>
+                <a:latin typeface="+mn-lt"/>
+                <a:ea typeface="+mn-ea"/>
+                <a:cs typeface="+mn-cs"/>
+              </a:rPr>
+              <a:t>LocalShift</a:t>
+            </a:r>
+            <a:r>
+              <a:rPr lang="es-ES" sz="2000" i="1" dirty="0"/>
+              <a:t>: Change </a:t>
+            </a:r>
+            <a:r>
+              <a:rPr lang="es-ES" sz="2000" i="1" dirty="0" err="1"/>
+              <a:t>settings</a:t>
+            </a:r>
+            <a:r>
+              <a:rPr lang="es-ES" sz="2000" i="1" dirty="0"/>
+              <a:t> </a:t>
+            </a:r>
+            <a:r>
+              <a:rPr lang="es-ES" sz="2000" i="1" dirty="0" err="1"/>
+              <a:t>to</a:t>
+            </a:r>
+            <a:r>
+              <a:rPr lang="es-ES" sz="2000" i="1" dirty="0"/>
+              <a:t> </a:t>
+            </a:r>
+            <a:r>
+              <a:rPr lang="es-ES" sz="2000" i="1" dirty="0" err="1"/>
+              <a:t>the</a:t>
+            </a:r>
+            <a:r>
+              <a:rPr lang="es-ES" sz="2000" i="1" dirty="0"/>
+              <a:t> alternative </a:t>
+            </a:r>
+            <a:r>
+              <a:rPr lang="es-ES" sz="2000" i="1" dirty="0" err="1"/>
+              <a:t>configuration</a:t>
+            </a:r>
+            <a:r>
+              <a:rPr lang="es-ES" sz="2000" i="1" dirty="0"/>
+              <a:t> (</a:t>
+            </a:r>
+            <a:r>
+              <a:rPr lang="es-ES" sz="2000" i="1" dirty="0" err="1"/>
+              <a:t>See</a:t>
+            </a:r>
+            <a:r>
+              <a:rPr lang="es-ES" sz="2000" i="1" dirty="0"/>
+              <a:t> </a:t>
+            </a:r>
+            <a:r>
+              <a:rPr lang="es-ES" sz="2000" i="1" dirty="0" err="1"/>
+              <a:t>next</a:t>
+            </a:r>
+            <a:r>
+              <a:rPr lang="es-ES" sz="2000" i="1" dirty="0"/>
+              <a:t> page)</a:t>
+            </a:r>
+          </a:p>
+        </p:txBody>
+      </p:sp>
     </p:spTree>
     <p:extLst>
       <p:ext uri="{BB962C8B-B14F-4D97-AF65-F5344CB8AC3E}">
         <p14:creationId xmlns:p14="http://schemas.microsoft.com/office/powerpoint/2010/main" val="4207699659"/>
+      </p:ext>
+    </p:extLst>
+  </p:cSld>
+  <p:clrMapOvr>
+    <a:masterClrMapping/>
+  </p:clrMapOvr>
+</p:sld>
+</file>
+
+<file path=ppt/slides/slide3.xml><?xml version="1.0" encoding="utf-8"?>
+<p:sld xmlns:a="http://schemas.openxmlformats.org/drawingml/2006/main" xmlns:r="http://schemas.openxmlformats.org/officeDocument/2006/relationships" xmlns:p="http://schemas.openxmlformats.org/presentationml/2006/main">
+  <p:cSld>
+    <p:spTree>
+      <p:nvGrpSpPr>
+        <p:cNvPr id="1" name=""/>
+        <p:cNvGrpSpPr/>
+        <p:nvPr/>
+      </p:nvGrpSpPr>
+      <p:grpSpPr>
+        <a:xfrm>
+          <a:off x="0" y="0"/>
+          <a:ext cx="0" cy="0"/>
+          <a:chOff x="0" y="0"/>
+          <a:chExt cx="0" cy="0"/>
+        </a:xfrm>
+      </p:grpSpPr>
+      <p:graphicFrame>
+        <p:nvGraphicFramePr>
+          <p:cNvPr id="5" name="Tabla 4">
+            <a:extLst>
+              <a:ext uri="{FF2B5EF4-FFF2-40B4-BE49-F238E27FC236}">
+                <a16:creationId xmlns:a16="http://schemas.microsoft.com/office/drawing/2014/main" id="{CC546006-C893-CECC-3757-406643956FD2}"/>
+              </a:ext>
+            </a:extLst>
+          </p:cNvPr>
+          <p:cNvGraphicFramePr>
+            <a:graphicFrameLocks noGrp="1"/>
+          </p:cNvGraphicFramePr>
+          <p:nvPr>
+            <p:extLst>
+              <p:ext uri="{D42A27DB-BD31-4B8C-83A1-F6EECF244321}">
+                <p14:modId xmlns:p14="http://schemas.microsoft.com/office/powerpoint/2010/main" val="634584621"/>
+              </p:ext>
+            </p:extLst>
+          </p:nvPr>
+        </p:nvGraphicFramePr>
+        <p:xfrm>
+          <a:off x="1307180" y="1158520"/>
+          <a:ext cx="6318739" cy="4726924"/>
+        </p:xfrm>
+        <a:graphic>
+          <a:graphicData uri="http://schemas.openxmlformats.org/drawingml/2006/table">
+            <a:tbl>
+              <a:tblPr firstRow="1" bandRow="1">
+                <a:tableStyleId>{5C22544A-7EE6-4342-B048-85BDC9FD1C3A}</a:tableStyleId>
+              </a:tblPr>
+              <a:tblGrid>
+                <a:gridCol w="1579685">
+                  <a:extLst>
+                    <a:ext uri="{9D8B030D-6E8A-4147-A177-3AD203B41FA5}">
+                      <a16:colId xmlns:a16="http://schemas.microsoft.com/office/drawing/2014/main" val="1839756769"/>
+                    </a:ext>
+                  </a:extLst>
+                </a:gridCol>
+                <a:gridCol w="1577259">
+                  <a:extLst>
+                    <a:ext uri="{9D8B030D-6E8A-4147-A177-3AD203B41FA5}">
+                      <a16:colId xmlns:a16="http://schemas.microsoft.com/office/drawing/2014/main" val="3629000199"/>
+                    </a:ext>
+                  </a:extLst>
+                </a:gridCol>
+                <a:gridCol w="1582110">
+                  <a:extLst>
+                    <a:ext uri="{9D8B030D-6E8A-4147-A177-3AD203B41FA5}">
+                      <a16:colId xmlns:a16="http://schemas.microsoft.com/office/drawing/2014/main" val="230538060"/>
+                    </a:ext>
+                  </a:extLst>
+                </a:gridCol>
+                <a:gridCol w="1579685">
+                  <a:extLst>
+                    <a:ext uri="{9D8B030D-6E8A-4147-A177-3AD203B41FA5}">
+                      <a16:colId xmlns:a16="http://schemas.microsoft.com/office/drawing/2014/main" val="2555434188"/>
+                    </a:ext>
+                  </a:extLst>
+                </a:gridCol>
+              </a:tblGrid>
+              <a:tr h="1181731">
+                <a:tc>
+                  <a:txBody>
+                    <a:bodyPr/>
+                    <a:lstStyle/>
+                    <a:p>
+                      <a:r>
+                        <a:rPr lang="es-ES" sz="1800" b="1" i="1" dirty="0">
+                          <a:gradFill flip="none" rotWithShape="1">
+                            <a:gsLst>
+                              <a:gs pos="35000">
+                                <a:srgbClr val="E0A883"/>
+                              </a:gs>
+                              <a:gs pos="0">
+                                <a:schemeClr val="accent2">
+                                  <a:lumMod val="40000"/>
+                                  <a:lumOff val="60000"/>
+                                </a:schemeClr>
+                              </a:gs>
+                              <a:gs pos="100000">
+                                <a:schemeClr val="accent2">
+                                  <a:lumMod val="60000"/>
+                                </a:schemeClr>
+                              </a:gs>
+                            </a:gsLst>
+                            <a:lin ang="16200000" scaled="0"/>
+                            <a:tileRect/>
+                          </a:gradFill>
+                        </a:rPr>
+                        <a:t>1</a:t>
+                      </a:r>
+                    </a:p>
+                  </a:txBody>
+                  <a:tcPr>
+                    <a:gradFill>
+                      <a:gsLst>
+                        <a:gs pos="0">
+                          <a:schemeClr val="accent1">
+                            <a:lumMod val="5000"/>
+                            <a:lumOff val="95000"/>
+                          </a:schemeClr>
+                        </a:gs>
+                        <a:gs pos="74000">
+                          <a:schemeClr val="accent1">
+                            <a:lumMod val="45000"/>
+                            <a:lumOff val="55000"/>
+                          </a:schemeClr>
+                        </a:gs>
+                        <a:gs pos="83000">
+                          <a:schemeClr val="accent1">
+                            <a:lumMod val="45000"/>
+                            <a:lumOff val="55000"/>
+                          </a:schemeClr>
+                        </a:gs>
+                        <a:gs pos="100000">
+                          <a:schemeClr val="accent1">
+                            <a:lumMod val="30000"/>
+                            <a:lumOff val="70000"/>
+                          </a:schemeClr>
+                        </a:gs>
+                      </a:gsLst>
+                      <a:lin ang="5400000" scaled="1"/>
+                    </a:gradFill>
+                  </a:tcPr>
+                </a:tc>
+                <a:tc>
+                  <a:txBody>
+                    <a:bodyPr/>
+                    <a:lstStyle/>
+                    <a:p>
+                      <a:r>
+                        <a:rPr lang="es-ES" sz="1800" b="1" i="1" dirty="0">
+                          <a:gradFill flip="none" rotWithShape="1">
+                            <a:gsLst>
+                              <a:gs pos="35000">
+                                <a:srgbClr val="E0A883"/>
+                              </a:gs>
+                              <a:gs pos="0">
+                                <a:schemeClr val="accent2">
+                                  <a:lumMod val="40000"/>
+                                  <a:lumOff val="60000"/>
+                                </a:schemeClr>
+                              </a:gs>
+                              <a:gs pos="100000">
+                                <a:schemeClr val="accent2">
+                                  <a:lumMod val="60000"/>
+                                </a:schemeClr>
+                              </a:gs>
+                            </a:gsLst>
+                            <a:lin ang="16200000" scaled="0"/>
+                            <a:tileRect/>
+                          </a:gradFill>
+                        </a:rPr>
+                        <a:t>2</a:t>
+                      </a:r>
+                    </a:p>
+                  </a:txBody>
+                  <a:tcPr>
+                    <a:gradFill>
+                      <a:gsLst>
+                        <a:gs pos="0">
+                          <a:schemeClr val="accent1">
+                            <a:lumMod val="5000"/>
+                            <a:lumOff val="95000"/>
+                          </a:schemeClr>
+                        </a:gs>
+                        <a:gs pos="74000">
+                          <a:schemeClr val="accent1">
+                            <a:lumMod val="45000"/>
+                            <a:lumOff val="55000"/>
+                          </a:schemeClr>
+                        </a:gs>
+                        <a:gs pos="83000">
+                          <a:schemeClr val="accent1">
+                            <a:lumMod val="45000"/>
+                            <a:lumOff val="55000"/>
+                          </a:schemeClr>
+                        </a:gs>
+                        <a:gs pos="100000">
+                          <a:schemeClr val="accent1">
+                            <a:lumMod val="30000"/>
+                            <a:lumOff val="70000"/>
+                          </a:schemeClr>
+                        </a:gs>
+                      </a:gsLst>
+                      <a:lin ang="5400000" scaled="1"/>
+                    </a:gradFill>
+                  </a:tcPr>
+                </a:tc>
+                <a:tc>
+                  <a:txBody>
+                    <a:bodyPr/>
+                    <a:lstStyle/>
+                    <a:p>
+                      <a:r>
+                        <a:rPr lang="es-ES" sz="1800" b="1" i="1" dirty="0">
+                          <a:gradFill flip="none" rotWithShape="1">
+                            <a:gsLst>
+                              <a:gs pos="35000">
+                                <a:srgbClr val="E0A883"/>
+                              </a:gs>
+                              <a:gs pos="0">
+                                <a:schemeClr val="accent2">
+                                  <a:lumMod val="40000"/>
+                                  <a:lumOff val="60000"/>
+                                </a:schemeClr>
+                              </a:gs>
+                              <a:gs pos="100000">
+                                <a:schemeClr val="accent2">
+                                  <a:lumMod val="60000"/>
+                                </a:schemeClr>
+                              </a:gs>
+                            </a:gsLst>
+                            <a:lin ang="16200000" scaled="0"/>
+                            <a:tileRect/>
+                          </a:gradFill>
+                        </a:rPr>
+                        <a:t>3</a:t>
+                      </a:r>
+                    </a:p>
+                  </a:txBody>
+                  <a:tcPr>
+                    <a:gradFill>
+                      <a:gsLst>
+                        <a:gs pos="0">
+                          <a:schemeClr val="accent1">
+                            <a:lumMod val="5000"/>
+                            <a:lumOff val="95000"/>
+                          </a:schemeClr>
+                        </a:gs>
+                        <a:gs pos="74000">
+                          <a:schemeClr val="accent1">
+                            <a:lumMod val="45000"/>
+                            <a:lumOff val="55000"/>
+                          </a:schemeClr>
+                        </a:gs>
+                        <a:gs pos="83000">
+                          <a:schemeClr val="accent1">
+                            <a:lumMod val="45000"/>
+                            <a:lumOff val="55000"/>
+                          </a:schemeClr>
+                        </a:gs>
+                        <a:gs pos="100000">
+                          <a:schemeClr val="accent1">
+                            <a:lumMod val="30000"/>
+                            <a:lumOff val="70000"/>
+                          </a:schemeClr>
+                        </a:gs>
+                      </a:gsLst>
+                      <a:lin ang="5400000" scaled="1"/>
+                    </a:gradFill>
+                  </a:tcPr>
+                </a:tc>
+                <a:tc>
+                  <a:txBody>
+                    <a:bodyPr/>
+                    <a:lstStyle/>
+                    <a:p>
+                      <a:r>
+                        <a:rPr lang="es-ES" sz="1800" b="1" i="1" dirty="0">
+                          <a:gradFill flip="none" rotWithShape="1">
+                            <a:gsLst>
+                              <a:gs pos="35000">
+                                <a:srgbClr val="E0A883"/>
+                              </a:gs>
+                              <a:gs pos="0">
+                                <a:schemeClr val="accent2">
+                                  <a:lumMod val="40000"/>
+                                  <a:lumOff val="60000"/>
+                                </a:schemeClr>
+                              </a:gs>
+                              <a:gs pos="100000">
+                                <a:schemeClr val="accent2">
+                                  <a:lumMod val="60000"/>
+                                </a:schemeClr>
+                              </a:gs>
+                            </a:gsLst>
+                            <a:lin ang="16200000" scaled="0"/>
+                            <a:tileRect/>
+                          </a:gradFill>
+                        </a:rPr>
+                        <a:t>A</a:t>
+                      </a:r>
+                    </a:p>
+                  </a:txBody>
+                  <a:tcPr>
+                    <a:gradFill>
+                      <a:gsLst>
+                        <a:gs pos="0">
+                          <a:schemeClr val="accent1">
+                            <a:lumMod val="5000"/>
+                            <a:lumOff val="95000"/>
+                          </a:schemeClr>
+                        </a:gs>
+                        <a:gs pos="74000">
+                          <a:schemeClr val="accent1">
+                            <a:lumMod val="45000"/>
+                            <a:lumOff val="55000"/>
+                          </a:schemeClr>
+                        </a:gs>
+                        <a:gs pos="83000">
+                          <a:schemeClr val="accent1">
+                            <a:lumMod val="45000"/>
+                            <a:lumOff val="55000"/>
+                          </a:schemeClr>
+                        </a:gs>
+                        <a:gs pos="100000">
+                          <a:schemeClr val="accent1">
+                            <a:lumMod val="30000"/>
+                            <a:lumOff val="70000"/>
+                          </a:schemeClr>
+                        </a:gs>
+                      </a:gsLst>
+                      <a:lin ang="5400000" scaled="1"/>
+                    </a:gradFill>
+                  </a:tcPr>
+                </a:tc>
+                <a:extLst>
+                  <a:ext uri="{0D108BD9-81ED-4DB2-BD59-A6C34878D82A}">
+                    <a16:rowId xmlns:a16="http://schemas.microsoft.com/office/drawing/2014/main" val="1942957527"/>
+                  </a:ext>
+                </a:extLst>
+              </a:tr>
+              <a:tr h="1181731">
+                <a:tc>
+                  <a:txBody>
+                    <a:bodyPr/>
+                    <a:lstStyle/>
+                    <a:p>
+                      <a:r>
+                        <a:rPr lang="es-ES" sz="1800" b="1" i="1" dirty="0">
+                          <a:gradFill flip="none" rotWithShape="1">
+                            <a:gsLst>
+                              <a:gs pos="35000">
+                                <a:srgbClr val="E0A883"/>
+                              </a:gs>
+                              <a:gs pos="0">
+                                <a:schemeClr val="accent2">
+                                  <a:lumMod val="40000"/>
+                                  <a:lumOff val="60000"/>
+                                </a:schemeClr>
+                              </a:gs>
+                              <a:gs pos="100000">
+                                <a:schemeClr val="accent2">
+                                  <a:lumMod val="60000"/>
+                                </a:schemeClr>
+                              </a:gs>
+                            </a:gsLst>
+                            <a:lin ang="16200000" scaled="0"/>
+                            <a:tileRect/>
+                          </a:gradFill>
+                        </a:rPr>
+                        <a:t>4</a:t>
+                      </a:r>
+                    </a:p>
+                  </a:txBody>
+                  <a:tcPr>
+                    <a:gradFill>
+                      <a:gsLst>
+                        <a:gs pos="0">
+                          <a:schemeClr val="accent1">
+                            <a:lumMod val="5000"/>
+                            <a:lumOff val="95000"/>
+                          </a:schemeClr>
+                        </a:gs>
+                        <a:gs pos="74000">
+                          <a:schemeClr val="accent1">
+                            <a:lumMod val="45000"/>
+                            <a:lumOff val="55000"/>
+                          </a:schemeClr>
+                        </a:gs>
+                        <a:gs pos="83000">
+                          <a:schemeClr val="accent1">
+                            <a:lumMod val="45000"/>
+                            <a:lumOff val="55000"/>
+                          </a:schemeClr>
+                        </a:gs>
+                        <a:gs pos="100000">
+                          <a:schemeClr val="accent1">
+                            <a:lumMod val="30000"/>
+                            <a:lumOff val="70000"/>
+                          </a:schemeClr>
+                        </a:gs>
+                      </a:gsLst>
+                      <a:lin ang="5400000" scaled="1"/>
+                    </a:gradFill>
+                  </a:tcPr>
+                </a:tc>
+                <a:tc>
+                  <a:txBody>
+                    <a:bodyPr/>
+                    <a:lstStyle/>
+                    <a:p>
+                      <a:r>
+                        <a:rPr lang="es-ES" sz="1800" b="1" i="1" dirty="0">
+                          <a:gradFill flip="none" rotWithShape="1">
+                            <a:gsLst>
+                              <a:gs pos="35000">
+                                <a:srgbClr val="E0A883"/>
+                              </a:gs>
+                              <a:gs pos="0">
+                                <a:schemeClr val="accent2">
+                                  <a:lumMod val="40000"/>
+                                  <a:lumOff val="60000"/>
+                                </a:schemeClr>
+                              </a:gs>
+                              <a:gs pos="100000">
+                                <a:schemeClr val="accent2">
+                                  <a:lumMod val="60000"/>
+                                </a:schemeClr>
+                              </a:gs>
+                            </a:gsLst>
+                            <a:lin ang="16200000" scaled="0"/>
+                            <a:tileRect/>
+                          </a:gradFill>
+                        </a:rPr>
+                        <a:t>5</a:t>
+                      </a:r>
+                    </a:p>
+                  </a:txBody>
+                  <a:tcPr>
+                    <a:gradFill>
+                      <a:gsLst>
+                        <a:gs pos="0">
+                          <a:schemeClr val="accent1">
+                            <a:lumMod val="5000"/>
+                            <a:lumOff val="95000"/>
+                          </a:schemeClr>
+                        </a:gs>
+                        <a:gs pos="74000">
+                          <a:schemeClr val="accent1">
+                            <a:lumMod val="45000"/>
+                            <a:lumOff val="55000"/>
+                          </a:schemeClr>
+                        </a:gs>
+                        <a:gs pos="83000">
+                          <a:schemeClr val="accent1">
+                            <a:lumMod val="45000"/>
+                            <a:lumOff val="55000"/>
+                          </a:schemeClr>
+                        </a:gs>
+                        <a:gs pos="100000">
+                          <a:schemeClr val="accent1">
+                            <a:lumMod val="30000"/>
+                            <a:lumOff val="70000"/>
+                          </a:schemeClr>
+                        </a:gs>
+                      </a:gsLst>
+                      <a:lin ang="5400000" scaled="1"/>
+                    </a:gradFill>
+                  </a:tcPr>
+                </a:tc>
+                <a:tc>
+                  <a:txBody>
+                    <a:bodyPr/>
+                    <a:lstStyle/>
+                    <a:p>
+                      <a:r>
+                        <a:rPr lang="es-ES" sz="1800" b="1" i="1" dirty="0">
+                          <a:gradFill flip="none" rotWithShape="1">
+                            <a:gsLst>
+                              <a:gs pos="35000">
+                                <a:srgbClr val="E0A883"/>
+                              </a:gs>
+                              <a:gs pos="0">
+                                <a:schemeClr val="accent2">
+                                  <a:lumMod val="40000"/>
+                                  <a:lumOff val="60000"/>
+                                </a:schemeClr>
+                              </a:gs>
+                              <a:gs pos="100000">
+                                <a:schemeClr val="accent2">
+                                  <a:lumMod val="60000"/>
+                                </a:schemeClr>
+                              </a:gs>
+                            </a:gsLst>
+                            <a:lin ang="16200000" scaled="0"/>
+                            <a:tileRect/>
+                          </a:gradFill>
+                        </a:rPr>
+                        <a:t>6</a:t>
+                      </a:r>
+                    </a:p>
+                  </a:txBody>
+                  <a:tcPr>
+                    <a:gradFill>
+                      <a:gsLst>
+                        <a:gs pos="0">
+                          <a:schemeClr val="accent1">
+                            <a:lumMod val="5000"/>
+                            <a:lumOff val="95000"/>
+                          </a:schemeClr>
+                        </a:gs>
+                        <a:gs pos="74000">
+                          <a:schemeClr val="accent1">
+                            <a:lumMod val="45000"/>
+                            <a:lumOff val="55000"/>
+                          </a:schemeClr>
+                        </a:gs>
+                        <a:gs pos="83000">
+                          <a:schemeClr val="accent1">
+                            <a:lumMod val="45000"/>
+                            <a:lumOff val="55000"/>
+                          </a:schemeClr>
+                        </a:gs>
+                        <a:gs pos="100000">
+                          <a:schemeClr val="accent1">
+                            <a:lumMod val="30000"/>
+                            <a:lumOff val="70000"/>
+                          </a:schemeClr>
+                        </a:gs>
+                      </a:gsLst>
+                      <a:lin ang="5400000" scaled="1"/>
+                    </a:gradFill>
+                  </a:tcPr>
+                </a:tc>
+                <a:tc>
+                  <a:txBody>
+                    <a:bodyPr/>
+                    <a:lstStyle/>
+                    <a:p>
+                      <a:r>
+                        <a:rPr lang="es-ES" sz="1800" b="1" i="1" dirty="0">
+                          <a:gradFill flip="none" rotWithShape="1">
+                            <a:gsLst>
+                              <a:gs pos="35000">
+                                <a:srgbClr val="E0A883"/>
+                              </a:gs>
+                              <a:gs pos="0">
+                                <a:schemeClr val="accent2">
+                                  <a:lumMod val="40000"/>
+                                  <a:lumOff val="60000"/>
+                                </a:schemeClr>
+                              </a:gs>
+                              <a:gs pos="100000">
+                                <a:schemeClr val="accent2">
+                                  <a:lumMod val="60000"/>
+                                </a:schemeClr>
+                              </a:gs>
+                            </a:gsLst>
+                            <a:lin ang="16200000" scaled="0"/>
+                            <a:tileRect/>
+                          </a:gradFill>
+                        </a:rPr>
+                        <a:t>B</a:t>
+                      </a:r>
+                    </a:p>
+                  </a:txBody>
+                  <a:tcPr>
+                    <a:gradFill>
+                      <a:gsLst>
+                        <a:gs pos="0">
+                          <a:schemeClr val="accent1">
+                            <a:lumMod val="5000"/>
+                            <a:lumOff val="95000"/>
+                          </a:schemeClr>
+                        </a:gs>
+                        <a:gs pos="74000">
+                          <a:schemeClr val="accent1">
+                            <a:lumMod val="45000"/>
+                            <a:lumOff val="55000"/>
+                          </a:schemeClr>
+                        </a:gs>
+                        <a:gs pos="83000">
+                          <a:schemeClr val="accent1">
+                            <a:lumMod val="45000"/>
+                            <a:lumOff val="55000"/>
+                          </a:schemeClr>
+                        </a:gs>
+                        <a:gs pos="100000">
+                          <a:schemeClr val="accent1">
+                            <a:lumMod val="30000"/>
+                            <a:lumOff val="70000"/>
+                          </a:schemeClr>
+                        </a:gs>
+                      </a:gsLst>
+                      <a:lin ang="5400000" scaled="1"/>
+                    </a:gradFill>
+                  </a:tcPr>
+                </a:tc>
+                <a:extLst>
+                  <a:ext uri="{0D108BD9-81ED-4DB2-BD59-A6C34878D82A}">
+                    <a16:rowId xmlns:a16="http://schemas.microsoft.com/office/drawing/2014/main" val="3370062836"/>
+                  </a:ext>
+                </a:extLst>
+              </a:tr>
+              <a:tr h="1181731">
+                <a:tc>
+                  <a:txBody>
+                    <a:bodyPr/>
+                    <a:lstStyle/>
+                    <a:p>
+                      <a:r>
+                        <a:rPr lang="es-ES" sz="1800" b="1" i="1" dirty="0">
+                          <a:gradFill flip="none" rotWithShape="1">
+                            <a:gsLst>
+                              <a:gs pos="35000">
+                                <a:srgbClr val="E0A883"/>
+                              </a:gs>
+                              <a:gs pos="0">
+                                <a:schemeClr val="accent2">
+                                  <a:lumMod val="40000"/>
+                                  <a:lumOff val="60000"/>
+                                </a:schemeClr>
+                              </a:gs>
+                              <a:gs pos="100000">
+                                <a:schemeClr val="accent2">
+                                  <a:lumMod val="60000"/>
+                                </a:schemeClr>
+                              </a:gs>
+                            </a:gsLst>
+                            <a:lin ang="16200000" scaled="0"/>
+                            <a:tileRect/>
+                          </a:gradFill>
+                        </a:rPr>
+                        <a:t>7</a:t>
+                      </a:r>
+                    </a:p>
+                  </a:txBody>
+                  <a:tcPr>
+                    <a:gradFill>
+                      <a:gsLst>
+                        <a:gs pos="0">
+                          <a:schemeClr val="accent1">
+                            <a:lumMod val="5000"/>
+                            <a:lumOff val="95000"/>
+                          </a:schemeClr>
+                        </a:gs>
+                        <a:gs pos="74000">
+                          <a:schemeClr val="accent1">
+                            <a:lumMod val="45000"/>
+                            <a:lumOff val="55000"/>
+                          </a:schemeClr>
+                        </a:gs>
+                        <a:gs pos="83000">
+                          <a:schemeClr val="accent1">
+                            <a:lumMod val="45000"/>
+                            <a:lumOff val="55000"/>
+                          </a:schemeClr>
+                        </a:gs>
+                        <a:gs pos="100000">
+                          <a:schemeClr val="accent1">
+                            <a:lumMod val="30000"/>
+                            <a:lumOff val="70000"/>
+                          </a:schemeClr>
+                        </a:gs>
+                      </a:gsLst>
+                      <a:lin ang="5400000" scaled="1"/>
+                    </a:gradFill>
+                  </a:tcPr>
+                </a:tc>
+                <a:tc>
+                  <a:txBody>
+                    <a:bodyPr/>
+                    <a:lstStyle/>
+                    <a:p>
+                      <a:r>
+                        <a:rPr lang="es-ES" sz="1800" b="1" i="1" dirty="0">
+                          <a:gradFill flip="none" rotWithShape="1">
+                            <a:gsLst>
+                              <a:gs pos="35000">
+                                <a:srgbClr val="E0A883"/>
+                              </a:gs>
+                              <a:gs pos="0">
+                                <a:schemeClr val="accent2">
+                                  <a:lumMod val="40000"/>
+                                  <a:lumOff val="60000"/>
+                                </a:schemeClr>
+                              </a:gs>
+                              <a:gs pos="100000">
+                                <a:schemeClr val="accent2">
+                                  <a:lumMod val="60000"/>
+                                </a:schemeClr>
+                              </a:gs>
+                            </a:gsLst>
+                            <a:lin ang="16200000" scaled="0"/>
+                            <a:tileRect/>
+                          </a:gradFill>
+                        </a:rPr>
+                        <a:t>8</a:t>
+                      </a:r>
+                    </a:p>
+                  </a:txBody>
+                  <a:tcPr>
+                    <a:gradFill>
+                      <a:gsLst>
+                        <a:gs pos="0">
+                          <a:schemeClr val="accent1">
+                            <a:lumMod val="5000"/>
+                            <a:lumOff val="95000"/>
+                          </a:schemeClr>
+                        </a:gs>
+                        <a:gs pos="74000">
+                          <a:schemeClr val="accent1">
+                            <a:lumMod val="45000"/>
+                            <a:lumOff val="55000"/>
+                          </a:schemeClr>
+                        </a:gs>
+                        <a:gs pos="83000">
+                          <a:schemeClr val="accent1">
+                            <a:lumMod val="45000"/>
+                            <a:lumOff val="55000"/>
+                          </a:schemeClr>
+                        </a:gs>
+                        <a:gs pos="100000">
+                          <a:schemeClr val="accent1">
+                            <a:lumMod val="30000"/>
+                            <a:lumOff val="70000"/>
+                          </a:schemeClr>
+                        </a:gs>
+                      </a:gsLst>
+                      <a:lin ang="5400000" scaled="1"/>
+                    </a:gradFill>
+                  </a:tcPr>
+                </a:tc>
+                <a:tc>
+                  <a:txBody>
+                    <a:bodyPr/>
+                    <a:lstStyle/>
+                    <a:p>
+                      <a:r>
+                        <a:rPr lang="es-ES" sz="1800" b="1" i="1" dirty="0">
+                          <a:gradFill flip="none" rotWithShape="1">
+                            <a:gsLst>
+                              <a:gs pos="35000">
+                                <a:srgbClr val="E0A883"/>
+                              </a:gs>
+                              <a:gs pos="0">
+                                <a:schemeClr val="accent2">
+                                  <a:lumMod val="40000"/>
+                                  <a:lumOff val="60000"/>
+                                </a:schemeClr>
+                              </a:gs>
+                              <a:gs pos="100000">
+                                <a:schemeClr val="accent2">
+                                  <a:lumMod val="60000"/>
+                                </a:schemeClr>
+                              </a:gs>
+                            </a:gsLst>
+                            <a:lin ang="16200000" scaled="0"/>
+                            <a:tileRect/>
+                          </a:gradFill>
+                        </a:rPr>
+                        <a:t>9</a:t>
+                      </a:r>
+                    </a:p>
+                  </a:txBody>
+                  <a:tcPr>
+                    <a:gradFill>
+                      <a:gsLst>
+                        <a:gs pos="0">
+                          <a:schemeClr val="accent1">
+                            <a:lumMod val="5000"/>
+                            <a:lumOff val="95000"/>
+                          </a:schemeClr>
+                        </a:gs>
+                        <a:gs pos="74000">
+                          <a:schemeClr val="accent1">
+                            <a:lumMod val="45000"/>
+                            <a:lumOff val="55000"/>
+                          </a:schemeClr>
+                        </a:gs>
+                        <a:gs pos="83000">
+                          <a:schemeClr val="accent1">
+                            <a:lumMod val="45000"/>
+                            <a:lumOff val="55000"/>
+                          </a:schemeClr>
+                        </a:gs>
+                        <a:gs pos="100000">
+                          <a:schemeClr val="accent1">
+                            <a:lumMod val="30000"/>
+                            <a:lumOff val="70000"/>
+                          </a:schemeClr>
+                        </a:gs>
+                      </a:gsLst>
+                      <a:lin ang="5400000" scaled="1"/>
+                    </a:gradFill>
+                  </a:tcPr>
+                </a:tc>
+                <a:tc>
+                  <a:txBody>
+                    <a:bodyPr/>
+                    <a:lstStyle/>
+                    <a:p>
+                      <a:r>
+                        <a:rPr lang="es-ES" sz="1800" b="1" i="1" dirty="0">
+                          <a:gradFill flip="none" rotWithShape="1">
+                            <a:gsLst>
+                              <a:gs pos="35000">
+                                <a:srgbClr val="E0A883"/>
+                              </a:gs>
+                              <a:gs pos="0">
+                                <a:schemeClr val="accent2">
+                                  <a:lumMod val="40000"/>
+                                  <a:lumOff val="60000"/>
+                                </a:schemeClr>
+                              </a:gs>
+                              <a:gs pos="100000">
+                                <a:schemeClr val="accent2">
+                                  <a:lumMod val="60000"/>
+                                </a:schemeClr>
+                              </a:gs>
+                            </a:gsLst>
+                            <a:lin ang="16200000" scaled="0"/>
+                            <a:tileRect/>
+                          </a:gradFill>
+                        </a:rPr>
+                        <a:t>C</a:t>
+                      </a:r>
+                    </a:p>
+                  </a:txBody>
+                  <a:tcPr>
+                    <a:gradFill>
+                      <a:gsLst>
+                        <a:gs pos="0">
+                          <a:schemeClr val="accent1">
+                            <a:lumMod val="5000"/>
+                            <a:lumOff val="95000"/>
+                          </a:schemeClr>
+                        </a:gs>
+                        <a:gs pos="74000">
+                          <a:schemeClr val="accent1">
+                            <a:lumMod val="45000"/>
+                            <a:lumOff val="55000"/>
+                          </a:schemeClr>
+                        </a:gs>
+                        <a:gs pos="83000">
+                          <a:schemeClr val="accent1">
+                            <a:lumMod val="45000"/>
+                            <a:lumOff val="55000"/>
+                          </a:schemeClr>
+                        </a:gs>
+                        <a:gs pos="100000">
+                          <a:schemeClr val="accent1">
+                            <a:lumMod val="30000"/>
+                            <a:lumOff val="70000"/>
+                          </a:schemeClr>
+                        </a:gs>
+                      </a:gsLst>
+                      <a:lin ang="5400000" scaled="1"/>
+                    </a:gradFill>
+                  </a:tcPr>
+                </a:tc>
+                <a:extLst>
+                  <a:ext uri="{0D108BD9-81ED-4DB2-BD59-A6C34878D82A}">
+                    <a16:rowId xmlns:a16="http://schemas.microsoft.com/office/drawing/2014/main" val="3650298452"/>
+                  </a:ext>
+                </a:extLst>
+              </a:tr>
+              <a:tr h="1181731">
+                <a:tc>
+                  <a:txBody>
+                    <a:bodyPr/>
+                    <a:lstStyle/>
+                    <a:p>
+                      <a:r>
+                        <a:rPr lang="es-ES" sz="1800" b="1" i="1" dirty="0">
+                          <a:gradFill flip="none" rotWithShape="1">
+                            <a:gsLst>
+                              <a:gs pos="35000">
+                                <a:srgbClr val="E0A883"/>
+                              </a:gs>
+                              <a:gs pos="0">
+                                <a:schemeClr val="accent2">
+                                  <a:lumMod val="40000"/>
+                                  <a:lumOff val="60000"/>
+                                </a:schemeClr>
+                              </a:gs>
+                              <a:gs pos="100000">
+                                <a:schemeClr val="accent2">
+                                  <a:lumMod val="60000"/>
+                                </a:schemeClr>
+                              </a:gs>
+                            </a:gsLst>
+                            <a:lin ang="16200000" scaled="0"/>
+                            <a:tileRect/>
+                          </a:gradFill>
+                        </a:rPr>
+                        <a:t>*</a:t>
+                      </a:r>
+                    </a:p>
+                  </a:txBody>
+                  <a:tcPr>
+                    <a:gradFill>
+                      <a:gsLst>
+                        <a:gs pos="0">
+                          <a:schemeClr val="accent1">
+                            <a:lumMod val="5000"/>
+                            <a:lumOff val="95000"/>
+                          </a:schemeClr>
+                        </a:gs>
+                        <a:gs pos="74000">
+                          <a:schemeClr val="accent1">
+                            <a:lumMod val="45000"/>
+                            <a:lumOff val="55000"/>
+                          </a:schemeClr>
+                        </a:gs>
+                        <a:gs pos="83000">
+                          <a:schemeClr val="accent1">
+                            <a:lumMod val="45000"/>
+                            <a:lumOff val="55000"/>
+                          </a:schemeClr>
+                        </a:gs>
+                        <a:gs pos="100000">
+                          <a:schemeClr val="accent1">
+                            <a:lumMod val="30000"/>
+                            <a:lumOff val="70000"/>
+                          </a:schemeClr>
+                        </a:gs>
+                      </a:gsLst>
+                      <a:lin ang="5400000" scaled="1"/>
+                    </a:gradFill>
+                  </a:tcPr>
+                </a:tc>
+                <a:tc>
+                  <a:txBody>
+                    <a:bodyPr/>
+                    <a:lstStyle/>
+                    <a:p>
+                      <a:r>
+                        <a:rPr lang="es-ES" sz="1800" b="1" i="1" dirty="0">
+                          <a:gradFill flip="none" rotWithShape="1">
+                            <a:gsLst>
+                              <a:gs pos="35000">
+                                <a:srgbClr val="E0A883"/>
+                              </a:gs>
+                              <a:gs pos="0">
+                                <a:schemeClr val="accent2">
+                                  <a:lumMod val="40000"/>
+                                  <a:lumOff val="60000"/>
+                                </a:schemeClr>
+                              </a:gs>
+                              <a:gs pos="100000">
+                                <a:schemeClr val="accent2">
+                                  <a:lumMod val="60000"/>
+                                </a:schemeClr>
+                              </a:gs>
+                            </a:gsLst>
+                            <a:lin ang="16200000" scaled="0"/>
+                            <a:tileRect/>
+                          </a:gradFill>
+                        </a:rPr>
+                        <a:t>0</a:t>
+                      </a:r>
+                    </a:p>
+                  </a:txBody>
+                  <a:tcPr>
+                    <a:gradFill>
+                      <a:gsLst>
+                        <a:gs pos="0">
+                          <a:schemeClr val="accent1">
+                            <a:lumMod val="5000"/>
+                            <a:lumOff val="95000"/>
+                          </a:schemeClr>
+                        </a:gs>
+                        <a:gs pos="74000">
+                          <a:schemeClr val="accent1">
+                            <a:lumMod val="45000"/>
+                            <a:lumOff val="55000"/>
+                          </a:schemeClr>
+                        </a:gs>
+                        <a:gs pos="83000">
+                          <a:schemeClr val="accent1">
+                            <a:lumMod val="45000"/>
+                            <a:lumOff val="55000"/>
+                          </a:schemeClr>
+                        </a:gs>
+                        <a:gs pos="100000">
+                          <a:schemeClr val="accent1">
+                            <a:lumMod val="30000"/>
+                            <a:lumOff val="70000"/>
+                          </a:schemeClr>
+                        </a:gs>
+                      </a:gsLst>
+                      <a:lin ang="5400000" scaled="1"/>
+                    </a:gradFill>
+                  </a:tcPr>
+                </a:tc>
+                <a:tc>
+                  <a:txBody>
+                    <a:bodyPr/>
+                    <a:lstStyle/>
+                    <a:p>
+                      <a:r>
+                        <a:rPr lang="es-ES" sz="1800" b="1" i="1" dirty="0">
+                          <a:gradFill flip="none" rotWithShape="1">
+                            <a:gsLst>
+                              <a:gs pos="35000">
+                                <a:srgbClr val="E0A883"/>
+                              </a:gs>
+                              <a:gs pos="0">
+                                <a:schemeClr val="accent2">
+                                  <a:lumMod val="40000"/>
+                                  <a:lumOff val="60000"/>
+                                </a:schemeClr>
+                              </a:gs>
+                              <a:gs pos="100000">
+                                <a:schemeClr val="accent2">
+                                  <a:lumMod val="60000"/>
+                                </a:schemeClr>
+                              </a:gs>
+                            </a:gsLst>
+                            <a:lin ang="16200000" scaled="0"/>
+                            <a:tileRect/>
+                          </a:gradFill>
+                        </a:rPr>
+                        <a:t>#</a:t>
+                      </a:r>
+                    </a:p>
+                  </a:txBody>
+                  <a:tcPr>
+                    <a:gradFill>
+                      <a:gsLst>
+                        <a:gs pos="0">
+                          <a:schemeClr val="accent1">
+                            <a:lumMod val="5000"/>
+                            <a:lumOff val="95000"/>
+                          </a:schemeClr>
+                        </a:gs>
+                        <a:gs pos="74000">
+                          <a:schemeClr val="accent1">
+                            <a:lumMod val="45000"/>
+                            <a:lumOff val="55000"/>
+                          </a:schemeClr>
+                        </a:gs>
+                        <a:gs pos="83000">
+                          <a:schemeClr val="accent1">
+                            <a:lumMod val="45000"/>
+                            <a:lumOff val="55000"/>
+                          </a:schemeClr>
+                        </a:gs>
+                        <a:gs pos="100000">
+                          <a:schemeClr val="accent1">
+                            <a:lumMod val="30000"/>
+                            <a:lumOff val="70000"/>
+                          </a:schemeClr>
+                        </a:gs>
+                      </a:gsLst>
+                      <a:lin ang="5400000" scaled="1"/>
+                    </a:gradFill>
+                  </a:tcPr>
+                </a:tc>
+                <a:tc>
+                  <a:txBody>
+                    <a:bodyPr/>
+                    <a:lstStyle/>
+                    <a:p>
+                      <a:r>
+                        <a:rPr lang="es-ES" sz="1800" b="1" i="1" dirty="0">
+                          <a:gradFill flip="none" rotWithShape="1">
+                            <a:gsLst>
+                              <a:gs pos="35000">
+                                <a:srgbClr val="E0A883"/>
+                              </a:gs>
+                              <a:gs pos="0">
+                                <a:schemeClr val="accent2">
+                                  <a:lumMod val="40000"/>
+                                  <a:lumOff val="60000"/>
+                                </a:schemeClr>
+                              </a:gs>
+                              <a:gs pos="100000">
+                                <a:schemeClr val="accent2">
+                                  <a:lumMod val="60000"/>
+                                </a:schemeClr>
+                              </a:gs>
+                            </a:gsLst>
+                            <a:lin ang="16200000" scaled="0"/>
+                            <a:tileRect/>
+                          </a:gradFill>
+                        </a:rPr>
+                        <a:t>D</a:t>
+                      </a:r>
+                    </a:p>
+                  </a:txBody>
+                  <a:tcPr>
+                    <a:gradFill>
+                      <a:gsLst>
+                        <a:gs pos="0">
+                          <a:schemeClr val="accent1">
+                            <a:lumMod val="5000"/>
+                            <a:lumOff val="95000"/>
+                          </a:schemeClr>
+                        </a:gs>
+                        <a:gs pos="74000">
+                          <a:schemeClr val="accent1">
+                            <a:lumMod val="45000"/>
+                            <a:lumOff val="55000"/>
+                          </a:schemeClr>
+                        </a:gs>
+                        <a:gs pos="83000">
+                          <a:schemeClr val="accent1">
+                            <a:lumMod val="45000"/>
+                            <a:lumOff val="55000"/>
+                          </a:schemeClr>
+                        </a:gs>
+                        <a:gs pos="100000">
+                          <a:schemeClr val="accent1">
+                            <a:lumMod val="30000"/>
+                            <a:lumOff val="70000"/>
+                          </a:schemeClr>
+                        </a:gs>
+                      </a:gsLst>
+                      <a:lin ang="5400000" scaled="1"/>
+                    </a:gradFill>
+                  </a:tcPr>
+                </a:tc>
+                <a:extLst>
+                  <a:ext uri="{0D108BD9-81ED-4DB2-BD59-A6C34878D82A}">
+                    <a16:rowId xmlns:a16="http://schemas.microsoft.com/office/drawing/2014/main" val="1648013763"/>
+                  </a:ext>
+                </a:extLst>
+              </a:tr>
+            </a:tbl>
+          </a:graphicData>
+        </a:graphic>
+      </p:graphicFrame>
+      <p:sp>
+        <p:nvSpPr>
+          <p:cNvPr id="2" name="Título 1">
+            <a:extLst>
+              <a:ext uri="{FF2B5EF4-FFF2-40B4-BE49-F238E27FC236}">
+                <a16:creationId xmlns:a16="http://schemas.microsoft.com/office/drawing/2014/main" id="{3533A590-B2E6-8839-4EB3-2B5761FEAB89}"/>
+              </a:ext>
+            </a:extLst>
+          </p:cNvPr>
+          <p:cNvSpPr>
+            <a:spLocks noGrp="1"/>
+          </p:cNvSpPr>
+          <p:nvPr>
+            <p:ph type="title"/>
+          </p:nvPr>
+        </p:nvSpPr>
+        <p:spPr>
+          <a:xfrm>
+            <a:off x="838200" y="197059"/>
+            <a:ext cx="10515600" cy="773392"/>
+          </a:xfrm>
+        </p:spPr>
+        <p:txBody>
+          <a:bodyPr>
+            <a:normAutofit/>
+          </a:bodyPr>
+          <a:lstStyle/>
+          <a:p>
+            <a:pPr algn="ctr"/>
+            <a:r>
+              <a:rPr lang="es-ES" dirty="0"/>
+              <a:t>Key </a:t>
+            </a:r>
+            <a:r>
+              <a:rPr lang="es-ES" dirty="0" err="1"/>
+              <a:t>settings</a:t>
+            </a:r>
+            <a:r>
+              <a:rPr lang="es-ES" dirty="0"/>
+              <a:t> after pressing </a:t>
+            </a:r>
+            <a:r>
+              <a:rPr lang="es-ES" sz="4000" b="1" dirty="0" err="1">
+                <a:solidFill>
+                  <a:schemeClr val="accent2">
+                    <a:lumMod val="50000"/>
+                  </a:schemeClr>
+                </a:solidFill>
+                <a:latin typeface="+mn-lt"/>
+                <a:ea typeface="+mn-ea"/>
+                <a:cs typeface="+mn-cs"/>
+              </a:rPr>
+              <a:t>localShift</a:t>
+            </a:r>
+            <a:endParaRPr lang="es-ES" sz="4000" b="1" dirty="0">
+              <a:solidFill>
+                <a:schemeClr val="accent2">
+                  <a:lumMod val="50000"/>
+                </a:schemeClr>
+              </a:solidFill>
+              <a:latin typeface="+mn-lt"/>
+              <a:ea typeface="+mn-ea"/>
+              <a:cs typeface="+mn-cs"/>
+            </a:endParaRPr>
+          </a:p>
+        </p:txBody>
+      </p:sp>
+      <p:graphicFrame>
+        <p:nvGraphicFramePr>
+          <p:cNvPr id="4" name="Tabla 4">
+            <a:extLst>
+              <a:ext uri="{FF2B5EF4-FFF2-40B4-BE49-F238E27FC236}">
+                <a16:creationId xmlns:a16="http://schemas.microsoft.com/office/drawing/2014/main" id="{61E8BD4F-4464-B49F-26DB-1587CD31FD6E}"/>
+              </a:ext>
+            </a:extLst>
+          </p:cNvPr>
+          <p:cNvGraphicFramePr>
+            <a:graphicFrameLocks noGrp="1"/>
+          </p:cNvGraphicFramePr>
+          <p:nvPr>
+            <p:extLst>
+              <p:ext uri="{D42A27DB-BD31-4B8C-83A1-F6EECF244321}">
+                <p14:modId xmlns:p14="http://schemas.microsoft.com/office/powerpoint/2010/main" val="890445452"/>
+              </p:ext>
+            </p:extLst>
+          </p:nvPr>
+        </p:nvGraphicFramePr>
+        <p:xfrm>
+          <a:off x="1307179" y="1166957"/>
+          <a:ext cx="6318739" cy="5008233"/>
+        </p:xfrm>
+        <a:graphic>
+          <a:graphicData uri="http://schemas.openxmlformats.org/drawingml/2006/table">
+            <a:tbl>
+              <a:tblPr firstRow="1" bandRow="1">
+                <a:tableStyleId>{5C22544A-7EE6-4342-B048-85BDC9FD1C3A}</a:tableStyleId>
+              </a:tblPr>
+              <a:tblGrid>
+                <a:gridCol w="1579685">
+                  <a:extLst>
+                    <a:ext uri="{9D8B030D-6E8A-4147-A177-3AD203B41FA5}">
+                      <a16:colId xmlns:a16="http://schemas.microsoft.com/office/drawing/2014/main" val="1839756769"/>
+                    </a:ext>
+                  </a:extLst>
+                </a:gridCol>
+                <a:gridCol w="1577259">
+                  <a:extLst>
+                    <a:ext uri="{9D8B030D-6E8A-4147-A177-3AD203B41FA5}">
+                      <a16:colId xmlns:a16="http://schemas.microsoft.com/office/drawing/2014/main" val="3629000199"/>
+                    </a:ext>
+                  </a:extLst>
+                </a:gridCol>
+                <a:gridCol w="1582110">
+                  <a:extLst>
+                    <a:ext uri="{9D8B030D-6E8A-4147-A177-3AD203B41FA5}">
+                      <a16:colId xmlns:a16="http://schemas.microsoft.com/office/drawing/2014/main" val="230538060"/>
+                    </a:ext>
+                  </a:extLst>
+                </a:gridCol>
+                <a:gridCol w="1579685">
+                  <a:extLst>
+                    <a:ext uri="{9D8B030D-6E8A-4147-A177-3AD203B41FA5}">
+                      <a16:colId xmlns:a16="http://schemas.microsoft.com/office/drawing/2014/main" val="2555434188"/>
+                    </a:ext>
+                  </a:extLst>
+                </a:gridCol>
+              </a:tblGrid>
+              <a:tr h="1181731">
+                <a:tc>
+                  <a:txBody>
+                    <a:bodyPr/>
+                    <a:lstStyle/>
+                    <a:p>
+                      <a:pPr algn="ctr"/>
+                      <a:r>
+                        <a:rPr lang="es-ES" sz="1600" b="1" dirty="0">
+                          <a:solidFill>
+                            <a:schemeClr val="tx1"/>
+                          </a:solidFill>
+                        </a:rPr>
+                        <a:t>M</a:t>
+                      </a:r>
+                    </a:p>
+                    <a:p>
+                      <a:pPr algn="ctr"/>
+                      <a:r>
+                        <a:rPr lang="es-ES" sz="1600" b="1" dirty="0">
+                          <a:solidFill>
+                            <a:schemeClr val="tx1"/>
+                          </a:solidFill>
+                        </a:rPr>
+                        <a:t>(</a:t>
+                      </a:r>
+                      <a:r>
+                        <a:rPr lang="es-ES" sz="1600" b="1" dirty="0" err="1">
+                          <a:solidFill>
+                            <a:schemeClr val="tx1"/>
+                          </a:solidFill>
+                        </a:rPr>
+                        <a:t>Mirror</a:t>
+                      </a:r>
+                      <a:r>
+                        <a:rPr lang="es-ES" sz="1600" b="1" dirty="0">
+                          <a:solidFill>
+                            <a:schemeClr val="tx1"/>
+                          </a:solidFill>
+                        </a:rPr>
+                        <a:t>)</a:t>
+                      </a:r>
+                    </a:p>
+                    <a:p>
+                      <a:pPr marL="0" marR="0" lvl="0" indent="0" algn="ctr" defTabSz="914400" rtl="0" eaLnBrk="1" fontAlgn="auto" latinLnBrk="0" hangingPunct="1">
+                        <a:lnSpc>
+                          <a:spcPct val="100000"/>
+                        </a:lnSpc>
+                        <a:spcBef>
+                          <a:spcPts val="0"/>
+                        </a:spcBef>
+                        <a:spcAft>
+                          <a:spcPts val="0"/>
+                        </a:spcAft>
+                        <a:buClrTx/>
+                        <a:buSzTx/>
+                        <a:buFontTx/>
+                        <a:buNone/>
+                        <a:tabLst/>
+                        <a:defRPr/>
+                      </a:pPr>
+                      <a:endParaRPr lang="es-ES" sz="1700" b="1" dirty="0">
+                        <a:solidFill>
+                          <a:schemeClr val="tx1"/>
+                        </a:solidFill>
+                      </a:endParaRPr>
+                    </a:p>
+                  </a:txBody>
+                  <a:tcPr anchor="ctr">
+                    <a:noFill/>
+                  </a:tcPr>
+                </a:tc>
+                <a:tc>
+                  <a:txBody>
+                    <a:bodyPr/>
+                    <a:lstStyle/>
+                    <a:p>
+                      <a:pPr algn="ctr"/>
+                      <a:r>
+                        <a:rPr lang="es-ES" b="1" i="0" dirty="0" err="1">
+                          <a:solidFill>
+                            <a:schemeClr val="tx1"/>
+                          </a:solidFill>
+                        </a:rPr>
+                        <a:t>Ctrl</a:t>
+                      </a:r>
+                      <a:r>
+                        <a:rPr lang="es-ES" b="1" i="0" dirty="0">
+                          <a:solidFill>
+                            <a:schemeClr val="tx1"/>
+                          </a:solidFill>
+                        </a:rPr>
+                        <a:t> T</a:t>
+                      </a:r>
+                    </a:p>
+                    <a:p>
+                      <a:pPr algn="ctr"/>
+                      <a:r>
+                        <a:rPr lang="es-ES" b="1" i="1" dirty="0">
+                          <a:solidFill>
+                            <a:schemeClr val="tx1"/>
+                          </a:solidFill>
+                        </a:rPr>
+                        <a:t>(</a:t>
+                      </a:r>
+                      <a:r>
+                        <a:rPr lang="es-ES" b="1" i="1" dirty="0" err="1">
+                          <a:solidFill>
+                            <a:schemeClr val="tx1"/>
+                          </a:solidFill>
+                        </a:rPr>
+                        <a:t>Transform</a:t>
+                      </a:r>
+                      <a:r>
+                        <a:rPr lang="es-ES" b="1" i="1" dirty="0">
+                          <a:solidFill>
+                            <a:schemeClr val="tx1"/>
+                          </a:solidFill>
+                        </a:rPr>
+                        <a:t> </a:t>
+                      </a:r>
+                      <a:r>
+                        <a:rPr lang="es-ES" b="1" i="1" dirty="0" err="1">
+                          <a:solidFill>
+                            <a:schemeClr val="tx1"/>
+                          </a:solidFill>
+                        </a:rPr>
+                        <a:t>tool</a:t>
+                      </a:r>
+                      <a:r>
+                        <a:rPr lang="es-ES" b="1" i="1" dirty="0">
+                          <a:solidFill>
+                            <a:schemeClr val="tx1"/>
+                          </a:solidFill>
+                        </a:rPr>
+                        <a:t>)</a:t>
+                      </a:r>
+                    </a:p>
+                  </a:txBody>
+                  <a:tcPr anchor="ctr">
+                    <a:noFill/>
+                  </a:tcPr>
+                </a:tc>
+                <a:tc>
+                  <a:txBody>
+                    <a:bodyPr/>
+                    <a:lstStyle/>
+                    <a:p>
+                      <a:pPr algn="ctr"/>
+                      <a:r>
+                        <a:rPr lang="es-ES" b="1">
+                          <a:solidFill>
+                            <a:schemeClr val="tx1"/>
+                          </a:solidFill>
+                        </a:rPr>
+                        <a:t>F3</a:t>
+                      </a:r>
+                    </a:p>
+                    <a:p>
+                      <a:pPr algn="ctr"/>
+                      <a:r>
+                        <a:rPr lang="es-ES" b="1" i="1">
+                          <a:solidFill>
+                            <a:schemeClr val="tx1"/>
+                          </a:solidFill>
+                        </a:rPr>
+                        <a:t>(Properties)</a:t>
+                      </a:r>
+                    </a:p>
+                    <a:p>
+                      <a:pPr algn="ctr"/>
+                      <a:endParaRPr lang="es-ES" b="1" i="1" dirty="0">
+                        <a:solidFill>
+                          <a:schemeClr val="tx1"/>
+                        </a:solidFill>
+                      </a:endParaRPr>
+                    </a:p>
+                  </a:txBody>
+                  <a:tcPr anchor="ctr">
+                    <a:noFill/>
+                  </a:tcPr>
+                </a:tc>
+                <a:tc>
+                  <a:txBody>
+                    <a:bodyPr/>
+                    <a:lstStyle/>
+                    <a:p>
+                      <a:pPr marL="0" marR="0" lvl="0" indent="0" algn="ctr" defTabSz="914400" rtl="0" eaLnBrk="1" fontAlgn="auto" latinLnBrk="0" hangingPunct="1">
+                        <a:lnSpc>
+                          <a:spcPct val="100000"/>
+                        </a:lnSpc>
+                        <a:spcBef>
+                          <a:spcPts val="0"/>
+                        </a:spcBef>
+                        <a:spcAft>
+                          <a:spcPts val="0"/>
+                        </a:spcAft>
+                        <a:buClrTx/>
+                        <a:buSzTx/>
+                        <a:buFontTx/>
+                        <a:buNone/>
+                        <a:tabLst/>
+                        <a:defRPr/>
+                      </a:pPr>
+                      <a:r>
+                        <a:rPr lang="es-ES" sz="2000" b="1" i="1" u="sng" dirty="0">
+                          <a:solidFill>
+                            <a:schemeClr val="accent2">
+                              <a:lumMod val="50000"/>
+                            </a:schemeClr>
+                          </a:solidFill>
+                        </a:rPr>
+                        <a:t>Local Shift</a:t>
+                      </a:r>
+                    </a:p>
+                    <a:p>
+                      <a:pPr algn="ctr"/>
+                      <a:endParaRPr lang="es-ES" b="1" i="1" dirty="0">
+                        <a:solidFill>
+                          <a:schemeClr val="tx1"/>
+                        </a:solidFill>
+                      </a:endParaRPr>
+                    </a:p>
+                  </a:txBody>
+                  <a:tcPr anchor="ctr">
+                    <a:noFill/>
+                  </a:tcPr>
+                </a:tc>
+                <a:extLst>
+                  <a:ext uri="{0D108BD9-81ED-4DB2-BD59-A6C34878D82A}">
+                    <a16:rowId xmlns:a16="http://schemas.microsoft.com/office/drawing/2014/main" val="1942957527"/>
+                  </a:ext>
+                </a:extLst>
+              </a:tr>
+              <a:tr h="1181731">
+                <a:tc>
+                  <a:txBody>
+                    <a:bodyPr/>
+                    <a:lstStyle/>
+                    <a:p>
+                      <a:pPr algn="ctr"/>
+                      <a:r>
+                        <a:rPr lang="es-ES" b="1">
+                          <a:solidFill>
+                            <a:schemeClr val="tx1"/>
+                          </a:solidFill>
+                        </a:rPr>
+                        <a:t>Ctrl A</a:t>
+                      </a:r>
+                    </a:p>
+                    <a:p>
+                      <a:pPr algn="ctr"/>
+                      <a:r>
+                        <a:rPr lang="es-ES" b="1" i="1">
+                          <a:solidFill>
+                            <a:schemeClr val="tx1"/>
+                          </a:solidFill>
+                        </a:rPr>
+                        <a:t>(Select all)</a:t>
+                      </a:r>
+                    </a:p>
+                    <a:p>
+                      <a:pPr algn="ctr"/>
+                      <a:endParaRPr lang="es-ES" b="1" i="1" dirty="0">
+                        <a:solidFill>
+                          <a:schemeClr val="tx1"/>
+                        </a:solidFill>
+                      </a:endParaRPr>
+                    </a:p>
+                  </a:txBody>
+                  <a:tcPr anchor="ctr">
+                    <a:noFill/>
+                  </a:tcPr>
+                </a:tc>
+                <a:tc>
+                  <a:txBody>
+                    <a:bodyPr/>
+                    <a:lstStyle/>
+                    <a:p>
+                      <a:pPr algn="ctr"/>
+                      <a:r>
+                        <a:rPr lang="es-ES" b="1">
+                          <a:solidFill>
+                            <a:schemeClr val="tx1"/>
+                          </a:solidFill>
+                        </a:rPr>
+                        <a:t>Ctrl G</a:t>
+                      </a:r>
+                    </a:p>
+                    <a:p>
+                      <a:pPr algn="ctr"/>
+                      <a:r>
+                        <a:rPr lang="es-ES" b="1" i="1">
+                          <a:solidFill>
+                            <a:schemeClr val="tx1"/>
+                          </a:solidFill>
+                        </a:rPr>
+                        <a:t>(Group)</a:t>
+                      </a:r>
+                    </a:p>
+                    <a:p>
+                      <a:pPr algn="ctr"/>
+                      <a:endParaRPr lang="es-ES" b="1" i="1" dirty="0">
+                        <a:solidFill>
+                          <a:schemeClr val="tx1"/>
+                        </a:solidFill>
+                      </a:endParaRPr>
+                    </a:p>
+                  </a:txBody>
+                  <a:tcPr anchor="ctr">
+                    <a:noFill/>
+                  </a:tcPr>
+                </a:tc>
+                <a:tc>
+                  <a:txBody>
+                    <a:bodyPr/>
+                    <a:lstStyle/>
+                    <a:p>
+                      <a:pPr algn="ctr"/>
+                      <a:r>
+                        <a:rPr lang="es-ES" b="1">
+                          <a:solidFill>
+                            <a:schemeClr val="tx1"/>
+                          </a:solidFill>
+                        </a:rPr>
+                        <a:t>Alt G</a:t>
+                      </a:r>
+                    </a:p>
+                    <a:p>
+                      <a:pPr algn="ctr"/>
+                      <a:r>
+                        <a:rPr lang="es-ES" b="1" i="1">
+                          <a:solidFill>
+                            <a:schemeClr val="tx1"/>
+                          </a:solidFill>
+                        </a:rPr>
+                        <a:t>(Clipping  Group)</a:t>
+                      </a:r>
+                      <a:endParaRPr lang="es-ES" b="1" i="1" dirty="0">
+                        <a:solidFill>
+                          <a:schemeClr val="tx1"/>
+                        </a:solidFill>
+                      </a:endParaRPr>
+                    </a:p>
+                  </a:txBody>
+                  <a:tcPr anchor="ctr">
+                    <a:noFill/>
+                  </a:tcPr>
+                </a:tc>
+                <a:tc>
+                  <a:txBody>
+                    <a:bodyPr/>
+                    <a:lstStyle/>
+                    <a:p>
+                      <a:pPr algn="ctr"/>
+                      <a:r>
+                        <a:rPr lang="es-ES" b="1">
+                          <a:solidFill>
+                            <a:schemeClr val="tx1"/>
+                          </a:solidFill>
+                        </a:rPr>
+                        <a:t>Enter + B</a:t>
+                      </a:r>
+                    </a:p>
+                    <a:p>
+                      <a:pPr algn="ctr"/>
+                      <a:r>
+                        <a:rPr lang="es-ES" b="1" i="1">
+                          <a:solidFill>
+                            <a:schemeClr val="tx1"/>
+                          </a:solidFill>
+                        </a:rPr>
+                        <a:t>(Enter and Brush tool)</a:t>
+                      </a:r>
+                      <a:endParaRPr lang="es-ES" b="1" i="1" dirty="0">
+                        <a:solidFill>
+                          <a:schemeClr val="tx1"/>
+                        </a:solidFill>
+                      </a:endParaRPr>
+                    </a:p>
+                  </a:txBody>
+                  <a:tcPr anchor="ctr">
+                    <a:noFill/>
+                  </a:tcPr>
+                </a:tc>
+                <a:extLst>
+                  <a:ext uri="{0D108BD9-81ED-4DB2-BD59-A6C34878D82A}">
+                    <a16:rowId xmlns:a16="http://schemas.microsoft.com/office/drawing/2014/main" val="3370062836"/>
+                  </a:ext>
+                </a:extLst>
+              </a:tr>
+              <a:tr h="1181731">
+                <a:tc>
+                  <a:txBody>
+                    <a:bodyPr/>
+                    <a:lstStyle/>
+                    <a:p>
+                      <a:pPr algn="ctr"/>
+                      <a:r>
+                        <a:rPr lang="es-ES" b="1">
+                          <a:solidFill>
+                            <a:schemeClr val="tx1"/>
+                          </a:solidFill>
+                        </a:rPr>
+                        <a:t>X</a:t>
+                      </a:r>
+                    </a:p>
+                    <a:p>
+                      <a:pPr algn="ctr"/>
+                      <a:r>
+                        <a:rPr lang="es-ES" b="1">
+                          <a:solidFill>
+                            <a:schemeClr val="tx1"/>
+                          </a:solidFill>
+                        </a:rPr>
+                        <a:t>(Exchange fg/bg color)</a:t>
+                      </a:r>
+                      <a:endParaRPr lang="es-ES" b="1" dirty="0">
+                        <a:solidFill>
+                          <a:schemeClr val="tx1"/>
+                        </a:solidFill>
+                      </a:endParaRPr>
+                    </a:p>
+                  </a:txBody>
+                  <a:tcPr anchor="ctr">
+                    <a:noFill/>
+                  </a:tcPr>
+                </a:tc>
+                <a:tc>
+                  <a:txBody>
+                    <a:bodyPr/>
+                    <a:lstStyle/>
+                    <a:p>
+                      <a:pPr marL="0" marR="0" lvl="0" indent="0" algn="ctr" defTabSz="914400" rtl="0" eaLnBrk="1" fontAlgn="auto" latinLnBrk="0" hangingPunct="1">
+                        <a:lnSpc>
+                          <a:spcPct val="100000"/>
+                        </a:lnSpc>
+                        <a:spcBef>
+                          <a:spcPts val="0"/>
+                        </a:spcBef>
+                        <a:spcAft>
+                          <a:spcPts val="0"/>
+                        </a:spcAft>
+                        <a:buClrTx/>
+                        <a:buSzTx/>
+                        <a:buFontTx/>
+                        <a:buNone/>
+                        <a:tabLst/>
+                        <a:defRPr/>
+                      </a:pPr>
+                      <a:r>
+                        <a:rPr lang="es-ES" b="1" dirty="0" err="1">
+                          <a:solidFill>
+                            <a:schemeClr val="tx1"/>
+                          </a:solidFill>
+                        </a:rPr>
+                        <a:t>Ctrl</a:t>
+                      </a:r>
+                      <a:r>
+                        <a:rPr lang="es-ES" b="1" dirty="0">
+                          <a:solidFill>
+                            <a:schemeClr val="tx1"/>
+                          </a:solidFill>
+                        </a:rPr>
+                        <a:t> B</a:t>
+                      </a:r>
+                    </a:p>
+                    <a:p>
+                      <a:pPr marL="0" marR="0" lvl="0" indent="0" algn="ctr" defTabSz="914400" rtl="0" eaLnBrk="1" fontAlgn="auto" latinLnBrk="0" hangingPunct="1">
+                        <a:lnSpc>
+                          <a:spcPct val="100000"/>
+                        </a:lnSpc>
+                        <a:spcBef>
+                          <a:spcPts val="0"/>
+                        </a:spcBef>
+                        <a:spcAft>
+                          <a:spcPts val="0"/>
+                        </a:spcAft>
+                        <a:buClrTx/>
+                        <a:buSzTx/>
+                        <a:buFontTx/>
+                        <a:buNone/>
+                        <a:tabLst/>
+                        <a:defRPr/>
+                      </a:pPr>
+                      <a:r>
+                        <a:rPr lang="es-ES" sz="1800" b="1" dirty="0">
+                          <a:solidFill>
+                            <a:schemeClr val="tx1"/>
+                          </a:solidFill>
+                        </a:rPr>
+                        <a:t>(Color balance)</a:t>
+                      </a:r>
+                    </a:p>
+                  </a:txBody>
+                  <a:tcPr anchor="ctr">
+                    <a:noFill/>
+                  </a:tcPr>
+                </a:tc>
+                <a:tc>
+                  <a:txBody>
+                    <a:bodyPr/>
+                    <a:lstStyle/>
+                    <a:p>
+                      <a:pPr algn="ctr"/>
+                      <a:r>
+                        <a:rPr lang="es-ES" b="1">
+                          <a:solidFill>
+                            <a:schemeClr val="tx1"/>
+                          </a:solidFill>
+                        </a:rPr>
+                        <a:t>Ctrl K</a:t>
+                      </a:r>
+                    </a:p>
+                    <a:p>
+                      <a:pPr algn="ctr"/>
+                      <a:r>
+                        <a:rPr lang="es-ES" b="1">
+                          <a:solidFill>
+                            <a:schemeClr val="tx1"/>
+                          </a:solidFill>
+                        </a:rPr>
+                        <a:t>(Invert selecction)</a:t>
+                      </a:r>
+                      <a:endParaRPr lang="es-ES" b="1" dirty="0">
+                        <a:solidFill>
+                          <a:schemeClr val="tx1"/>
+                        </a:solidFill>
+                      </a:endParaRPr>
+                    </a:p>
+                  </a:txBody>
+                  <a:tcPr anchor="ctr">
+                    <a:noFill/>
+                  </a:tcPr>
+                </a:tc>
+                <a:tc>
+                  <a:txBody>
+                    <a:bodyPr/>
+                    <a:lstStyle/>
+                    <a:p>
+                      <a:pPr marL="0" marR="0" lvl="0" indent="0" algn="ctr" defTabSz="914400" rtl="0" eaLnBrk="1" fontAlgn="auto" latinLnBrk="0" hangingPunct="1">
+                        <a:lnSpc>
+                          <a:spcPct val="100000"/>
+                        </a:lnSpc>
+                        <a:spcBef>
+                          <a:spcPts val="0"/>
+                        </a:spcBef>
+                        <a:spcAft>
+                          <a:spcPts val="0"/>
+                        </a:spcAft>
+                        <a:buClrTx/>
+                        <a:buSzTx/>
+                        <a:buFontTx/>
+                        <a:buNone/>
+                        <a:tabLst/>
+                        <a:defRPr/>
+                      </a:pPr>
+                      <a:r>
+                        <a:rPr lang="es-ES" sz="1800" b="1" dirty="0" err="1">
+                          <a:solidFill>
+                            <a:schemeClr val="tx1"/>
+                          </a:solidFill>
+                        </a:rPr>
+                        <a:t>Ctrl</a:t>
+                      </a:r>
+                      <a:r>
+                        <a:rPr lang="es-ES" sz="1800" b="1" dirty="0">
+                          <a:solidFill>
+                            <a:schemeClr val="tx1"/>
+                          </a:solidFill>
+                        </a:rPr>
+                        <a:t> L</a:t>
+                      </a:r>
+                    </a:p>
+                    <a:p>
+                      <a:pPr marL="0" marR="0" lvl="0" indent="0" algn="ctr" defTabSz="914400" rtl="0" eaLnBrk="1" fontAlgn="auto" latinLnBrk="0" hangingPunct="1">
+                        <a:lnSpc>
+                          <a:spcPct val="100000"/>
+                        </a:lnSpc>
+                        <a:spcBef>
+                          <a:spcPts val="0"/>
+                        </a:spcBef>
+                        <a:spcAft>
+                          <a:spcPts val="0"/>
+                        </a:spcAft>
+                        <a:buClrTx/>
+                        <a:buSzTx/>
+                        <a:buFontTx/>
+                        <a:buNone/>
+                        <a:tabLst/>
+                        <a:defRPr/>
+                      </a:pPr>
+                      <a:r>
+                        <a:rPr lang="es-ES" sz="1800" b="1" dirty="0">
+                          <a:solidFill>
+                            <a:schemeClr val="tx1"/>
+                          </a:solidFill>
+                        </a:rPr>
+                        <a:t>(</a:t>
+                      </a:r>
+                      <a:r>
+                        <a:rPr lang="es-ES" sz="1800" b="1" dirty="0" err="1">
+                          <a:solidFill>
+                            <a:schemeClr val="tx1"/>
+                          </a:solidFill>
+                        </a:rPr>
+                        <a:t>Levels</a:t>
+                      </a:r>
+                      <a:r>
+                        <a:rPr lang="es-ES" sz="1800" b="1" dirty="0">
+                          <a:solidFill>
+                            <a:schemeClr val="tx1"/>
+                          </a:solidFill>
+                        </a:rPr>
+                        <a:t>)</a:t>
+                      </a:r>
+                    </a:p>
+                    <a:p>
+                      <a:pPr marL="0" marR="0" lvl="0" indent="0" algn="ctr" defTabSz="914400" rtl="0" eaLnBrk="1" fontAlgn="auto" latinLnBrk="0" hangingPunct="1">
+                        <a:lnSpc>
+                          <a:spcPct val="100000"/>
+                        </a:lnSpc>
+                        <a:spcBef>
+                          <a:spcPts val="0"/>
+                        </a:spcBef>
+                        <a:spcAft>
+                          <a:spcPts val="0"/>
+                        </a:spcAft>
+                        <a:buClrTx/>
+                        <a:buSzTx/>
+                        <a:buFontTx/>
+                        <a:buNone/>
+                        <a:tabLst/>
+                        <a:defRPr/>
+                      </a:pPr>
+                      <a:endParaRPr lang="es-ES" sz="1800" b="1" dirty="0">
+                        <a:solidFill>
+                          <a:schemeClr val="tx1"/>
+                        </a:solidFill>
+                      </a:endParaRPr>
+                    </a:p>
+                  </a:txBody>
+                  <a:tcPr anchor="ctr">
+                    <a:noFill/>
+                  </a:tcPr>
+                </a:tc>
+                <a:extLst>
+                  <a:ext uri="{0D108BD9-81ED-4DB2-BD59-A6C34878D82A}">
+                    <a16:rowId xmlns:a16="http://schemas.microsoft.com/office/drawing/2014/main" val="3650298452"/>
+                  </a:ext>
+                </a:extLst>
+              </a:tr>
+              <a:tr h="1181731">
+                <a:tc>
+                  <a:txBody>
+                    <a:bodyPr/>
+                    <a:lstStyle/>
+                    <a:p>
+                      <a:pPr algn="ctr"/>
+                      <a:r>
+                        <a:rPr lang="es-ES" b="1">
+                          <a:solidFill>
+                            <a:schemeClr val="tx1"/>
+                          </a:solidFill>
+                        </a:rPr>
+                        <a:t>Ctrl X</a:t>
+                      </a:r>
+                    </a:p>
+                    <a:p>
+                      <a:pPr algn="ctr"/>
+                      <a:r>
+                        <a:rPr lang="es-ES" b="1" i="1">
+                          <a:solidFill>
+                            <a:schemeClr val="tx1"/>
+                          </a:solidFill>
+                        </a:rPr>
+                        <a:t>(Cut)</a:t>
+                      </a:r>
+                    </a:p>
+                    <a:p>
+                      <a:pPr algn="ctr"/>
+                      <a:endParaRPr lang="es-ES" b="1" i="1" dirty="0">
+                        <a:solidFill>
+                          <a:schemeClr val="tx1"/>
+                        </a:solidFill>
+                      </a:endParaRPr>
+                    </a:p>
+                  </a:txBody>
+                  <a:tcPr anchor="ctr">
+                    <a:noFill/>
+                  </a:tcPr>
+                </a:tc>
+                <a:tc>
+                  <a:txBody>
+                    <a:bodyPr/>
+                    <a:lstStyle/>
+                    <a:p>
+                      <a:pPr algn="ctr"/>
+                      <a:r>
+                        <a:rPr lang="es-ES" b="1">
+                          <a:solidFill>
+                            <a:schemeClr val="tx1"/>
+                          </a:solidFill>
+                        </a:rPr>
+                        <a:t>Ctrl C</a:t>
+                      </a:r>
+                    </a:p>
+                    <a:p>
+                      <a:pPr algn="ctr"/>
+                      <a:r>
+                        <a:rPr lang="es-ES" b="1" i="1">
+                          <a:solidFill>
+                            <a:schemeClr val="tx1"/>
+                          </a:solidFill>
+                        </a:rPr>
+                        <a:t>(Copy)</a:t>
+                      </a:r>
+                    </a:p>
+                    <a:p>
+                      <a:pPr algn="ctr"/>
+                      <a:endParaRPr lang="es-ES" b="1" i="1" dirty="0">
+                        <a:solidFill>
+                          <a:schemeClr val="tx1"/>
+                        </a:solidFill>
+                      </a:endParaRPr>
+                    </a:p>
+                  </a:txBody>
+                  <a:tcPr anchor="ctr">
+                    <a:noFill/>
+                  </a:tcPr>
+                </a:tc>
+                <a:tc>
+                  <a:txBody>
+                    <a:bodyPr/>
+                    <a:lstStyle/>
+                    <a:p>
+                      <a:pPr algn="ctr"/>
+                      <a:r>
+                        <a:rPr lang="es-ES" b="1">
+                          <a:solidFill>
+                            <a:schemeClr val="tx1"/>
+                          </a:solidFill>
+                        </a:rPr>
+                        <a:t>Ctrl V</a:t>
+                      </a:r>
+                    </a:p>
+                    <a:p>
+                      <a:pPr algn="ctr"/>
+                      <a:r>
+                        <a:rPr lang="es-ES" b="1">
+                          <a:solidFill>
+                            <a:schemeClr val="tx1"/>
+                          </a:solidFill>
+                        </a:rPr>
+                        <a:t>(Paste)</a:t>
+                      </a:r>
+                    </a:p>
+                    <a:p>
+                      <a:pPr algn="ctr"/>
+                      <a:endParaRPr lang="es-ES" b="1" dirty="0">
+                        <a:solidFill>
+                          <a:schemeClr val="tx1"/>
+                        </a:solidFill>
+                      </a:endParaRPr>
+                    </a:p>
+                  </a:txBody>
+                  <a:tcPr anchor="ctr">
+                    <a:noFill/>
+                  </a:tcPr>
+                </a:tc>
+                <a:tc>
+                  <a:txBody>
+                    <a:bodyPr/>
+                    <a:lstStyle/>
+                    <a:p>
+                      <a:pPr algn="ctr"/>
+                      <a:endParaRPr lang="es-ES" b="1" dirty="0">
+                        <a:solidFill>
+                          <a:schemeClr val="tx1"/>
+                        </a:solidFill>
+                      </a:endParaRPr>
+                    </a:p>
+                    <a:p>
+                      <a:pPr algn="ctr"/>
+                      <a:r>
+                        <a:rPr lang="es-ES" b="1" i="0" dirty="0">
+                          <a:solidFill>
+                            <a:schemeClr val="tx1"/>
+                          </a:solidFill>
+                        </a:rPr>
+                        <a:t>Shift V</a:t>
+                      </a:r>
+                    </a:p>
+                    <a:p>
+                      <a:pPr algn="ctr"/>
+                      <a:r>
+                        <a:rPr lang="es-ES" b="1" i="1" dirty="0">
+                          <a:solidFill>
+                            <a:schemeClr val="tx1"/>
+                          </a:solidFill>
+                        </a:rPr>
+                        <a:t>(Paste in </a:t>
+                      </a:r>
+                      <a:r>
+                        <a:rPr lang="es-ES" b="1" i="1" dirty="0" err="1">
+                          <a:solidFill>
+                            <a:schemeClr val="tx1"/>
+                          </a:solidFill>
+                        </a:rPr>
+                        <a:t>same</a:t>
+                      </a:r>
+                      <a:r>
+                        <a:rPr lang="es-ES" b="1" i="1" dirty="0">
+                          <a:solidFill>
+                            <a:schemeClr val="tx1"/>
+                          </a:solidFill>
+                        </a:rPr>
+                        <a:t> </a:t>
+                      </a:r>
+                      <a:r>
+                        <a:rPr lang="es-ES" b="1" i="1" dirty="0" err="1">
+                          <a:solidFill>
+                            <a:schemeClr val="tx1"/>
+                          </a:solidFill>
+                        </a:rPr>
+                        <a:t>layer</a:t>
+                      </a:r>
+                      <a:r>
+                        <a:rPr lang="es-ES" b="1" i="1" dirty="0">
+                          <a:solidFill>
+                            <a:schemeClr val="tx1"/>
+                          </a:solidFill>
+                        </a:rPr>
+                        <a:t>)</a:t>
+                      </a:r>
+                    </a:p>
+                    <a:p>
+                      <a:pPr algn="ctr"/>
+                      <a:endParaRPr lang="es-ES" b="1" dirty="0">
+                        <a:solidFill>
+                          <a:schemeClr val="tx1"/>
+                        </a:solidFill>
+                      </a:endParaRPr>
+                    </a:p>
+                  </a:txBody>
+                  <a:tcPr anchor="ctr">
+                    <a:noFill/>
+                  </a:tcPr>
+                </a:tc>
+                <a:extLst>
+                  <a:ext uri="{0D108BD9-81ED-4DB2-BD59-A6C34878D82A}">
+                    <a16:rowId xmlns:a16="http://schemas.microsoft.com/office/drawing/2014/main" val="1648013763"/>
+                  </a:ext>
+                </a:extLst>
+              </a:tr>
+            </a:tbl>
+          </a:graphicData>
+        </a:graphic>
+      </p:graphicFrame>
+      <p:sp>
+        <p:nvSpPr>
+          <p:cNvPr id="6" name="Elipse 5">
+            <a:extLst>
+              <a:ext uri="{FF2B5EF4-FFF2-40B4-BE49-F238E27FC236}">
+                <a16:creationId xmlns:a16="http://schemas.microsoft.com/office/drawing/2014/main" id="{FFEBBBF0-B498-A520-A5AC-63EFE62A4DBB}"/>
+              </a:ext>
+            </a:extLst>
+          </p:cNvPr>
+          <p:cNvSpPr/>
+          <p:nvPr/>
+        </p:nvSpPr>
+        <p:spPr>
+          <a:xfrm>
+            <a:off x="8088297" y="1138518"/>
+            <a:ext cx="1526220" cy="1508763"/>
+          </a:xfrm>
+          <a:prstGeom prst="ellipse">
+            <a:avLst/>
+          </a:prstGeom>
+        </p:spPr>
+        <p:style>
+          <a:lnRef idx="2">
+            <a:schemeClr val="accent1">
+              <a:shade val="50000"/>
+            </a:schemeClr>
+          </a:lnRef>
+          <a:fillRef idx="1">
+            <a:schemeClr val="accent1"/>
+          </a:fillRef>
+          <a:effectRef idx="0">
+            <a:schemeClr val="accent1"/>
+          </a:effectRef>
+          <a:fontRef idx="minor">
+            <a:schemeClr val="lt1"/>
+          </a:fontRef>
+        </p:style>
+        <p:txBody>
+          <a:bodyPr rtlCol="0" anchor="ctr"/>
+          <a:lstStyle/>
+          <a:p>
+            <a:pPr marL="342900" indent="-342900" algn="ctr">
+              <a:buAutoNum type="arabicPlain" startAt="4"/>
+            </a:pPr>
+            <a:r>
+              <a:rPr lang="es-ES" b="1" dirty="0">
+                <a:solidFill>
+                  <a:schemeClr val="tx1"/>
+                </a:solidFill>
+              </a:rPr>
+              <a:t>  6</a:t>
+            </a:r>
+          </a:p>
+          <a:p>
+            <a:pPr marL="342900" indent="-342900" algn="ctr">
+              <a:buAutoNum type="arabicPlain" startAt="4"/>
+            </a:pPr>
+            <a:endParaRPr lang="es-ES" b="1" dirty="0">
+              <a:solidFill>
+                <a:schemeClr val="tx1"/>
+              </a:solidFill>
+            </a:endParaRPr>
+          </a:p>
+          <a:p>
+            <a:pPr algn="ctr"/>
+            <a:r>
+              <a:rPr lang="es-ES" dirty="0" err="1"/>
+              <a:t>Rotate</a:t>
+            </a:r>
+            <a:endParaRPr lang="es-ES" dirty="0"/>
+          </a:p>
+          <a:p>
+            <a:pPr algn="ctr"/>
+            <a:r>
+              <a:rPr lang="es-ES" dirty="0" err="1"/>
+              <a:t>canvas</a:t>
+            </a:r>
+            <a:endParaRPr lang="es-ES" dirty="0"/>
+          </a:p>
+        </p:txBody>
+      </p:sp>
+      <p:sp>
+        <p:nvSpPr>
+          <p:cNvPr id="7" name="Elipse 6">
+            <a:extLst>
+              <a:ext uri="{FF2B5EF4-FFF2-40B4-BE49-F238E27FC236}">
+                <a16:creationId xmlns:a16="http://schemas.microsoft.com/office/drawing/2014/main" id="{8C18D28F-F00C-1DF9-20DC-B654E00BD93C}"/>
+              </a:ext>
+            </a:extLst>
+          </p:cNvPr>
+          <p:cNvSpPr/>
+          <p:nvPr/>
+        </p:nvSpPr>
+        <p:spPr>
+          <a:xfrm>
+            <a:off x="8088297" y="4367538"/>
+            <a:ext cx="1526220" cy="1508763"/>
+          </a:xfrm>
+          <a:prstGeom prst="ellipse">
+            <a:avLst/>
+          </a:prstGeom>
+        </p:spPr>
+        <p:style>
+          <a:lnRef idx="2">
+            <a:schemeClr val="accent1">
+              <a:shade val="50000"/>
+            </a:schemeClr>
+          </a:lnRef>
+          <a:fillRef idx="1">
+            <a:schemeClr val="accent1"/>
+          </a:fillRef>
+          <a:effectRef idx="0">
+            <a:schemeClr val="accent1"/>
+          </a:effectRef>
+          <a:fontRef idx="minor">
+            <a:schemeClr val="lt1"/>
+          </a:fontRef>
+        </p:style>
+        <p:txBody>
+          <a:bodyPr rtlCol="0" anchor="ctr"/>
+          <a:lstStyle/>
+          <a:p>
+            <a:pPr algn="ctr"/>
+            <a:r>
+              <a:rPr lang="es-ES" b="1" dirty="0">
+                <a:solidFill>
+                  <a:schemeClr val="tx1"/>
+                </a:solidFill>
+              </a:rPr>
+              <a:t>7      9</a:t>
+            </a:r>
+          </a:p>
+          <a:p>
+            <a:pPr algn="ctr"/>
+            <a:endParaRPr lang="es-ES" dirty="0"/>
+          </a:p>
+          <a:p>
+            <a:pPr algn="ctr"/>
+            <a:r>
+              <a:rPr lang="es-ES" dirty="0"/>
+              <a:t>Brush </a:t>
+            </a:r>
+            <a:r>
+              <a:rPr lang="es-ES" dirty="0" err="1"/>
+              <a:t>size</a:t>
+            </a:r>
+            <a:endParaRPr lang="es-ES" dirty="0"/>
+          </a:p>
+        </p:txBody>
+      </p:sp>
+      <p:sp>
+        <p:nvSpPr>
+          <p:cNvPr id="8" name="Elipse 7">
+            <a:extLst>
+              <a:ext uri="{FF2B5EF4-FFF2-40B4-BE49-F238E27FC236}">
+                <a16:creationId xmlns:a16="http://schemas.microsoft.com/office/drawing/2014/main" id="{D293218C-13D0-60EB-47E2-D05389D8EF6B}"/>
+              </a:ext>
+            </a:extLst>
+          </p:cNvPr>
+          <p:cNvSpPr/>
+          <p:nvPr/>
+        </p:nvSpPr>
+        <p:spPr>
+          <a:xfrm>
+            <a:off x="8088297" y="2753028"/>
+            <a:ext cx="1526220" cy="1508763"/>
+          </a:xfrm>
+          <a:prstGeom prst="ellipse">
+            <a:avLst/>
+          </a:prstGeom>
+        </p:spPr>
+        <p:style>
+          <a:lnRef idx="2">
+            <a:schemeClr val="accent1">
+              <a:shade val="50000"/>
+            </a:schemeClr>
+          </a:lnRef>
+          <a:fillRef idx="1">
+            <a:schemeClr val="accent1"/>
+          </a:fillRef>
+          <a:effectRef idx="0">
+            <a:schemeClr val="accent1"/>
+          </a:effectRef>
+          <a:fontRef idx="minor">
+            <a:schemeClr val="lt1"/>
+          </a:fontRef>
+        </p:style>
+        <p:txBody>
+          <a:bodyPr rtlCol="0" anchor="ctr"/>
+          <a:lstStyle/>
+          <a:p>
+            <a:pPr algn="ctr"/>
+            <a:r>
+              <a:rPr lang="es-ES" b="1" dirty="0">
+                <a:solidFill>
+                  <a:schemeClr val="tx1"/>
+                </a:solidFill>
+              </a:rPr>
+              <a:t>-        +</a:t>
+            </a:r>
+          </a:p>
+          <a:p>
+            <a:pPr algn="ctr"/>
+            <a:endParaRPr lang="es-ES" b="1" dirty="0">
+              <a:solidFill>
+                <a:schemeClr val="tx1"/>
+              </a:solidFill>
+            </a:endParaRPr>
+          </a:p>
+          <a:p>
+            <a:pPr algn="ctr"/>
+            <a:r>
+              <a:rPr lang="es-ES" dirty="0"/>
+              <a:t>Zoom</a:t>
+            </a:r>
+          </a:p>
+          <a:p>
+            <a:pPr algn="ctr"/>
+            <a:r>
+              <a:rPr lang="es-ES" dirty="0" err="1"/>
+              <a:t>canvas</a:t>
+            </a:r>
+            <a:endParaRPr lang="es-ES" dirty="0"/>
+          </a:p>
+        </p:txBody>
+      </p:sp>
+      <p:sp>
+        <p:nvSpPr>
+          <p:cNvPr id="9" name="CuadroTexto 8">
+            <a:extLst>
+              <a:ext uri="{FF2B5EF4-FFF2-40B4-BE49-F238E27FC236}">
+                <a16:creationId xmlns:a16="http://schemas.microsoft.com/office/drawing/2014/main" id="{0B5DE58B-5085-0A9E-F2C8-BE967A620B0F}"/>
+              </a:ext>
+            </a:extLst>
+          </p:cNvPr>
+          <p:cNvSpPr txBox="1"/>
+          <p:nvPr/>
+        </p:nvSpPr>
+        <p:spPr>
+          <a:xfrm>
+            <a:off x="9721787" y="1517197"/>
+            <a:ext cx="2067758" cy="646331"/>
+          </a:xfrm>
+          <a:prstGeom prst="rect">
+            <a:avLst/>
+          </a:prstGeom>
+          <a:noFill/>
+        </p:spPr>
+        <p:txBody>
+          <a:bodyPr wrap="square" rtlCol="0">
+            <a:spAutoFit/>
+          </a:bodyPr>
+          <a:lstStyle/>
+          <a:p>
+            <a:r>
+              <a:rPr lang="es-ES" b="1" i="1" dirty="0" err="1">
+                <a:gradFill flip="none" rotWithShape="1">
+                  <a:gsLst>
+                    <a:gs pos="35000">
+                      <a:srgbClr val="E0A883"/>
+                    </a:gs>
+                    <a:gs pos="0">
+                      <a:schemeClr val="accent2">
+                        <a:lumMod val="40000"/>
+                        <a:lumOff val="60000"/>
+                      </a:schemeClr>
+                    </a:gs>
+                    <a:gs pos="100000">
+                      <a:schemeClr val="accent2">
+                        <a:lumMod val="60000"/>
+                      </a:schemeClr>
+                    </a:gs>
+                  </a:gsLst>
+                  <a:lin ang="16200000" scaled="0"/>
+                  <a:tileRect/>
+                </a:gradFill>
+              </a:rPr>
+              <a:t>Push</a:t>
+            </a:r>
+            <a:r>
+              <a:rPr lang="es-ES" b="1" i="1" dirty="0">
+                <a:gradFill flip="none" rotWithShape="1">
+                  <a:gsLst>
+                    <a:gs pos="35000">
+                      <a:srgbClr val="E0A883"/>
+                    </a:gs>
+                    <a:gs pos="0">
+                      <a:schemeClr val="accent2">
+                        <a:lumMod val="40000"/>
+                        <a:lumOff val="60000"/>
+                      </a:schemeClr>
+                    </a:gs>
+                    <a:gs pos="100000">
+                      <a:schemeClr val="accent2">
+                        <a:lumMod val="60000"/>
+                      </a:schemeClr>
+                    </a:gs>
+                  </a:gsLst>
+                  <a:lin ang="16200000" scaled="0"/>
+                  <a:tileRect/>
+                </a:gradFill>
+              </a:rPr>
+              <a:t>:</a:t>
+            </a:r>
+          </a:p>
+          <a:p>
+            <a:r>
+              <a:rPr lang="es-ES" dirty="0"/>
+              <a:t>5 </a:t>
+            </a:r>
+            <a:r>
+              <a:rPr lang="es-ES" i="1" dirty="0"/>
+              <a:t>(</a:t>
+            </a:r>
+            <a:r>
+              <a:rPr lang="es-ES" i="1" dirty="0" err="1"/>
+              <a:t>Reset</a:t>
+            </a:r>
+            <a:r>
+              <a:rPr lang="es-ES" i="1" dirty="0"/>
+              <a:t> </a:t>
+            </a:r>
+            <a:r>
+              <a:rPr lang="es-ES" i="1" dirty="0" err="1"/>
+              <a:t>rotation</a:t>
+            </a:r>
+            <a:r>
+              <a:rPr lang="es-ES" i="1" dirty="0"/>
+              <a:t>)</a:t>
+            </a:r>
+          </a:p>
+        </p:txBody>
+      </p:sp>
+      <p:sp>
+        <p:nvSpPr>
+          <p:cNvPr id="12" name="CuadroTexto 11">
+            <a:extLst>
+              <a:ext uri="{FF2B5EF4-FFF2-40B4-BE49-F238E27FC236}">
+                <a16:creationId xmlns:a16="http://schemas.microsoft.com/office/drawing/2014/main" id="{1C222B8E-8DC4-E329-8CEC-01244D5262E6}"/>
+              </a:ext>
+            </a:extLst>
+          </p:cNvPr>
+          <p:cNvSpPr txBox="1"/>
+          <p:nvPr/>
+        </p:nvSpPr>
+        <p:spPr>
+          <a:xfrm>
+            <a:off x="9721787" y="3074875"/>
+            <a:ext cx="2067758" cy="646331"/>
+          </a:xfrm>
+          <a:prstGeom prst="rect">
+            <a:avLst/>
+          </a:prstGeom>
+          <a:noFill/>
+        </p:spPr>
+        <p:txBody>
+          <a:bodyPr wrap="square" rtlCol="0">
+            <a:spAutoFit/>
+          </a:bodyPr>
+          <a:lstStyle/>
+          <a:p>
+            <a:r>
+              <a:rPr lang="es-ES" b="1" i="1" dirty="0" err="1">
+                <a:gradFill flip="none" rotWithShape="1">
+                  <a:gsLst>
+                    <a:gs pos="35000">
+                      <a:srgbClr val="E0A883"/>
+                    </a:gs>
+                    <a:gs pos="0">
+                      <a:schemeClr val="accent2">
+                        <a:lumMod val="40000"/>
+                        <a:lumOff val="60000"/>
+                      </a:schemeClr>
+                    </a:gs>
+                    <a:gs pos="100000">
+                      <a:schemeClr val="accent2">
+                        <a:lumMod val="60000"/>
+                      </a:schemeClr>
+                    </a:gs>
+                  </a:gsLst>
+                  <a:lin ang="16200000" scaled="0"/>
+                  <a:tileRect/>
+                </a:gradFill>
+              </a:rPr>
+              <a:t>Push</a:t>
+            </a:r>
+            <a:r>
+              <a:rPr lang="es-ES" b="1" i="1" dirty="0">
+                <a:gradFill flip="none" rotWithShape="1">
+                  <a:gsLst>
+                    <a:gs pos="35000">
+                      <a:srgbClr val="E0A883"/>
+                    </a:gs>
+                    <a:gs pos="0">
+                      <a:schemeClr val="accent2">
+                        <a:lumMod val="40000"/>
+                        <a:lumOff val="60000"/>
+                      </a:schemeClr>
+                    </a:gs>
+                    <a:gs pos="100000">
+                      <a:schemeClr val="accent2">
+                        <a:lumMod val="60000"/>
+                      </a:schemeClr>
+                    </a:gs>
+                  </a:gsLst>
+                  <a:lin ang="16200000" scaled="0"/>
+                  <a:tileRect/>
+                </a:gradFill>
+              </a:rPr>
+              <a:t>:</a:t>
+            </a:r>
+          </a:p>
+          <a:p>
+            <a:r>
+              <a:rPr lang="es-ES" dirty="0"/>
+              <a:t>2 </a:t>
+            </a:r>
+            <a:r>
+              <a:rPr lang="es-ES" i="1" dirty="0"/>
+              <a:t>(</a:t>
+            </a:r>
+            <a:r>
+              <a:rPr lang="es-ES" i="1" dirty="0" err="1"/>
+              <a:t>Fit</a:t>
+            </a:r>
+            <a:r>
+              <a:rPr lang="es-ES" i="1" dirty="0"/>
+              <a:t> page)</a:t>
+            </a:r>
+          </a:p>
+        </p:txBody>
+      </p:sp>
+      <p:sp>
+        <p:nvSpPr>
+          <p:cNvPr id="13" name="CuadroTexto 12">
+            <a:extLst>
+              <a:ext uri="{FF2B5EF4-FFF2-40B4-BE49-F238E27FC236}">
+                <a16:creationId xmlns:a16="http://schemas.microsoft.com/office/drawing/2014/main" id="{F5D9CC27-A10A-90F2-C458-E8E9F2B58BC4}"/>
+              </a:ext>
+            </a:extLst>
+          </p:cNvPr>
+          <p:cNvSpPr txBox="1"/>
+          <p:nvPr/>
+        </p:nvSpPr>
+        <p:spPr>
+          <a:xfrm>
+            <a:off x="9721787" y="4730208"/>
+            <a:ext cx="2067758" cy="646331"/>
+          </a:xfrm>
+          <a:prstGeom prst="rect">
+            <a:avLst/>
+          </a:prstGeom>
+          <a:noFill/>
+        </p:spPr>
+        <p:txBody>
+          <a:bodyPr wrap="square" rtlCol="0">
+            <a:spAutoFit/>
+          </a:bodyPr>
+          <a:lstStyle/>
+          <a:p>
+            <a:r>
+              <a:rPr lang="es-ES" b="1" i="1" dirty="0" err="1">
+                <a:gradFill flip="none" rotWithShape="1">
+                  <a:gsLst>
+                    <a:gs pos="35000">
+                      <a:srgbClr val="E0A883"/>
+                    </a:gs>
+                    <a:gs pos="0">
+                      <a:schemeClr val="accent2">
+                        <a:lumMod val="40000"/>
+                        <a:lumOff val="60000"/>
+                      </a:schemeClr>
+                    </a:gs>
+                    <a:gs pos="100000">
+                      <a:schemeClr val="accent2">
+                        <a:lumMod val="60000"/>
+                      </a:schemeClr>
+                    </a:gs>
+                  </a:gsLst>
+                  <a:lin ang="16200000" scaled="0"/>
+                  <a:tileRect/>
+                </a:gradFill>
+              </a:rPr>
+              <a:t>Push</a:t>
+            </a:r>
+            <a:r>
+              <a:rPr lang="es-ES" b="1" i="1" dirty="0">
+                <a:gradFill flip="none" rotWithShape="1">
+                  <a:gsLst>
+                    <a:gs pos="35000">
+                      <a:srgbClr val="E0A883"/>
+                    </a:gs>
+                    <a:gs pos="0">
+                      <a:schemeClr val="accent2">
+                        <a:lumMod val="40000"/>
+                        <a:lumOff val="60000"/>
+                      </a:schemeClr>
+                    </a:gs>
+                    <a:gs pos="100000">
+                      <a:schemeClr val="accent2">
+                        <a:lumMod val="60000"/>
+                      </a:schemeClr>
+                    </a:gs>
+                  </a:gsLst>
+                  <a:lin ang="16200000" scaled="0"/>
+                  <a:tileRect/>
+                </a:gradFill>
+              </a:rPr>
+              <a:t>:</a:t>
+            </a:r>
+          </a:p>
+          <a:p>
+            <a:r>
+              <a:rPr lang="es-ES" dirty="0"/>
+              <a:t>E </a:t>
+            </a:r>
+            <a:r>
+              <a:rPr lang="es-ES" i="1" dirty="0"/>
+              <a:t>(</a:t>
+            </a:r>
+            <a:r>
+              <a:rPr lang="es-ES" i="1" dirty="0" err="1"/>
+              <a:t>Toggle</a:t>
+            </a:r>
+            <a:r>
+              <a:rPr lang="es-ES" i="1" dirty="0"/>
+              <a:t> </a:t>
+            </a:r>
+            <a:r>
+              <a:rPr lang="es-ES" i="1" dirty="0" err="1"/>
+              <a:t>eraser</a:t>
+            </a:r>
+            <a:r>
+              <a:rPr lang="es-ES" i="1" dirty="0"/>
+              <a:t>)</a:t>
+            </a:r>
+          </a:p>
+        </p:txBody>
+      </p:sp>
+      <p:sp>
+        <p:nvSpPr>
+          <p:cNvPr id="3" name="Título 1">
+            <a:extLst>
+              <a:ext uri="{FF2B5EF4-FFF2-40B4-BE49-F238E27FC236}">
+                <a16:creationId xmlns:a16="http://schemas.microsoft.com/office/drawing/2014/main" id="{1D159F38-13C4-A762-4970-1F02DC6EC19C}"/>
+              </a:ext>
+            </a:extLst>
+          </p:cNvPr>
+          <p:cNvSpPr txBox="1">
+            <a:spLocks/>
+          </p:cNvSpPr>
+          <p:nvPr/>
+        </p:nvSpPr>
+        <p:spPr>
+          <a:xfrm>
+            <a:off x="1307179" y="5923285"/>
+            <a:ext cx="8806362" cy="773392"/>
+          </a:xfrm>
+          <a:prstGeom prst="rect">
+            <a:avLst/>
+          </a:prstGeom>
+        </p:spPr>
+        <p:txBody>
+          <a:bodyPr vert="horz" lIns="91440" tIns="45720" rIns="91440" bIns="45720" rtlCol="0" anchor="ctr">
+            <a:normAutofit/>
+          </a:bodyPr>
+          <a:lstStyle>
+            <a:lvl1pPr algn="l" defTabSz="914400" rtl="0" eaLnBrk="1" latinLnBrk="0" hangingPunct="1">
+              <a:lnSpc>
+                <a:spcPct val="90000"/>
+              </a:lnSpc>
+              <a:spcBef>
+                <a:spcPct val="0"/>
+              </a:spcBef>
+              <a:buNone/>
+              <a:defRPr sz="4400" kern="1200">
+                <a:solidFill>
+                  <a:schemeClr val="tx1"/>
+                </a:solidFill>
+                <a:latin typeface="+mj-lt"/>
+                <a:ea typeface="+mj-ea"/>
+                <a:cs typeface="+mj-cs"/>
+              </a:defRPr>
+            </a:lvl1pPr>
+          </a:lstStyle>
+          <a:p>
+            <a:r>
+              <a:rPr lang="es-ES" sz="2400" b="1" dirty="0" err="1">
+                <a:solidFill>
+                  <a:schemeClr val="accent2">
+                    <a:lumMod val="50000"/>
+                  </a:schemeClr>
+                </a:solidFill>
+                <a:latin typeface="+mn-lt"/>
+                <a:ea typeface="+mn-ea"/>
+                <a:cs typeface="+mn-cs"/>
+              </a:rPr>
+              <a:t>LocalShift</a:t>
+            </a:r>
+            <a:r>
+              <a:rPr lang="es-ES" sz="2000" i="1" dirty="0"/>
+              <a:t>: </a:t>
+            </a:r>
+            <a:r>
+              <a:rPr lang="es-ES" sz="2000" i="1" dirty="0" err="1"/>
+              <a:t>Return</a:t>
+            </a:r>
+            <a:r>
+              <a:rPr lang="es-ES" sz="2000" i="1" dirty="0"/>
+              <a:t> </a:t>
+            </a:r>
+            <a:r>
+              <a:rPr lang="es-ES" sz="2000" i="1" dirty="0" err="1"/>
+              <a:t>to</a:t>
+            </a:r>
+            <a:r>
+              <a:rPr lang="es-ES" sz="2000" i="1" dirty="0"/>
+              <a:t> </a:t>
+            </a:r>
+            <a:r>
+              <a:rPr lang="es-ES" sz="2000" i="1" dirty="0" err="1"/>
+              <a:t>main</a:t>
+            </a:r>
+            <a:r>
+              <a:rPr lang="es-ES" sz="2000" i="1" dirty="0"/>
+              <a:t> </a:t>
+            </a:r>
+            <a:r>
+              <a:rPr lang="es-ES" sz="2000" i="1" dirty="0" err="1"/>
+              <a:t>settings</a:t>
+            </a:r>
+            <a:r>
+              <a:rPr lang="es-ES" sz="2000" i="1" dirty="0"/>
+              <a:t> </a:t>
+            </a:r>
+            <a:r>
+              <a:rPr lang="es-ES" sz="2000" i="1" dirty="0" err="1"/>
+              <a:t>configuration</a:t>
+            </a:r>
+            <a:r>
+              <a:rPr lang="es-ES" sz="2000" i="1" dirty="0"/>
+              <a:t> (</a:t>
+            </a:r>
+            <a:r>
+              <a:rPr lang="es-ES" sz="2000" i="1" dirty="0" err="1"/>
+              <a:t>See</a:t>
+            </a:r>
+            <a:r>
+              <a:rPr lang="es-ES" sz="2000" i="1" dirty="0"/>
+              <a:t> </a:t>
+            </a:r>
+            <a:r>
+              <a:rPr lang="es-ES" sz="2000" i="1" dirty="0" err="1"/>
+              <a:t>previous</a:t>
+            </a:r>
+            <a:r>
+              <a:rPr lang="es-ES" sz="2000" i="1" dirty="0"/>
+              <a:t> page)</a:t>
+            </a:r>
+          </a:p>
+        </p:txBody>
+      </p:sp>
+    </p:spTree>
+    <p:extLst>
+      <p:ext uri="{BB962C8B-B14F-4D97-AF65-F5344CB8AC3E}">
+        <p14:creationId xmlns:p14="http://schemas.microsoft.com/office/powerpoint/2010/main" val="3277217568"/>
       </p:ext>
     </p:extLst>
   </p:cSld>

</xml_diff>